<commit_message>
Ajuste Aula 05 Microntroladores Portas IO, Conversores, Comunicação Serial 19042023
</commit_message>
<xml_diff>
--- a/01 Classes/Aula 05 - Programação Microcontroladores - Periféricos Integrados - Portas e Conversores.pptx
+++ b/01 Classes/Aula 05 - Programação Microcontroladores - Periféricos Integrados - Portas e Conversores.pptx
@@ -5,7 +5,7 @@
     <p:sldMasterId id="2147483648" r:id="rId1"/>
   </p:sldMasterIdLst>
   <p:notesMasterIdLst>
-    <p:notesMasterId r:id="rId31"/>
+    <p:notesMasterId r:id="rId33"/>
   </p:notesMasterIdLst>
   <p:sldIdLst>
     <p:sldId id="256" r:id="rId2"/>
@@ -35,8 +35,10 @@
     <p:sldId id="333" r:id="rId26"/>
     <p:sldId id="323" r:id="rId27"/>
     <p:sldId id="334" r:id="rId28"/>
-    <p:sldId id="337" r:id="rId29"/>
-    <p:sldId id="309" r:id="rId30"/>
+    <p:sldId id="363" r:id="rId29"/>
+    <p:sldId id="362" r:id="rId30"/>
+    <p:sldId id="337" r:id="rId31"/>
+    <p:sldId id="309" r:id="rId32"/>
   </p:sldIdLst>
   <p:sldSz cx="9144000" cy="5143500" type="screen16x9"/>
   <p:notesSz cx="6858000" cy="9144000"/>
@@ -1772,6 +1774,138 @@
 </file>
 
 <file path=ppt/notesSlides/notesSlide27.xml><?xml version="1.0" encoding="utf-8"?>
+<p:notes xmlns:a="http://schemas.openxmlformats.org/drawingml/2006/main" xmlns:r="http://schemas.openxmlformats.org/officeDocument/2006/relationships" xmlns:p="http://schemas.openxmlformats.org/presentationml/2006/main">
+  <p:cSld>
+    <p:spTree>
+      <p:nvGrpSpPr>
+        <p:cNvPr id="1" name=""/>
+        <p:cNvGrpSpPr/>
+        <p:nvPr/>
+      </p:nvGrpSpPr>
+      <p:grpSpPr>
+        <a:xfrm>
+          <a:off x="0" y="0"/>
+          <a:ext cx="0" cy="0"/>
+          <a:chOff x="0" y="0"/>
+          <a:chExt cx="0" cy="0"/>
+        </a:xfrm>
+      </p:grpSpPr>
+      <p:sp>
+        <p:nvSpPr>
+          <p:cNvPr id="2" name="Espaço Reservado para Imagem de Slide 1"/>
+          <p:cNvSpPr>
+            <a:spLocks noGrp="1" noRot="1" noChangeAspect="1"/>
+          </p:cNvSpPr>
+          <p:nvPr>
+            <p:ph type="sldImg"/>
+          </p:nvPr>
+        </p:nvSpPr>
+        <p:spPr>
+          <a:xfrm>
+            <a:off x="381000" y="685800"/>
+            <a:ext cx="6096000" cy="3429000"/>
+          </a:xfrm>
+        </p:spPr>
+      </p:sp>
+      <p:sp>
+        <p:nvSpPr>
+          <p:cNvPr id="3" name="Espaço Reservado para Anotações 2"/>
+          <p:cNvSpPr>
+            <a:spLocks noGrp="1"/>
+          </p:cNvSpPr>
+          <p:nvPr>
+            <p:ph type="body" idx="1"/>
+          </p:nvPr>
+        </p:nvSpPr>
+        <p:spPr/>
+        <p:txBody>
+          <a:bodyPr/>
+          <a:lstStyle/>
+          <a:p>
+            <a:endParaRPr lang="pt-BR" dirty="0"/>
+          </a:p>
+        </p:txBody>
+      </p:sp>
+    </p:spTree>
+    <p:extLst>
+      <p:ext uri="{BB962C8B-B14F-4D97-AF65-F5344CB8AC3E}">
+        <p14:creationId xmlns:p14="http://schemas.microsoft.com/office/powerpoint/2010/main" val="3925245260"/>
+      </p:ext>
+    </p:extLst>
+  </p:cSld>
+  <p:clrMapOvr>
+    <a:masterClrMapping/>
+  </p:clrMapOvr>
+</p:notes>
+</file>
+
+<file path=ppt/notesSlides/notesSlide28.xml><?xml version="1.0" encoding="utf-8"?>
+<p:notes xmlns:a="http://schemas.openxmlformats.org/drawingml/2006/main" xmlns:r="http://schemas.openxmlformats.org/officeDocument/2006/relationships" xmlns:p="http://schemas.openxmlformats.org/presentationml/2006/main">
+  <p:cSld>
+    <p:spTree>
+      <p:nvGrpSpPr>
+        <p:cNvPr id="1" name=""/>
+        <p:cNvGrpSpPr/>
+        <p:nvPr/>
+      </p:nvGrpSpPr>
+      <p:grpSpPr>
+        <a:xfrm>
+          <a:off x="0" y="0"/>
+          <a:ext cx="0" cy="0"/>
+          <a:chOff x="0" y="0"/>
+          <a:chExt cx="0" cy="0"/>
+        </a:xfrm>
+      </p:grpSpPr>
+      <p:sp>
+        <p:nvSpPr>
+          <p:cNvPr id="2" name="Espaço Reservado para Imagem de Slide 1"/>
+          <p:cNvSpPr>
+            <a:spLocks noGrp="1" noRot="1" noChangeAspect="1"/>
+          </p:cNvSpPr>
+          <p:nvPr>
+            <p:ph type="sldImg"/>
+          </p:nvPr>
+        </p:nvSpPr>
+        <p:spPr>
+          <a:xfrm>
+            <a:off x="381000" y="685800"/>
+            <a:ext cx="6096000" cy="3429000"/>
+          </a:xfrm>
+        </p:spPr>
+      </p:sp>
+      <p:sp>
+        <p:nvSpPr>
+          <p:cNvPr id="3" name="Espaço Reservado para Anotações 2"/>
+          <p:cNvSpPr>
+            <a:spLocks noGrp="1"/>
+          </p:cNvSpPr>
+          <p:nvPr>
+            <p:ph type="body" idx="1"/>
+          </p:nvPr>
+        </p:nvSpPr>
+        <p:spPr/>
+        <p:txBody>
+          <a:bodyPr/>
+          <a:lstStyle/>
+          <a:p>
+            <a:endParaRPr lang="pt-BR" dirty="0"/>
+          </a:p>
+        </p:txBody>
+      </p:sp>
+    </p:spTree>
+    <p:extLst>
+      <p:ext uri="{BB962C8B-B14F-4D97-AF65-F5344CB8AC3E}">
+        <p14:creationId xmlns:p14="http://schemas.microsoft.com/office/powerpoint/2010/main" val="1705778428"/>
+      </p:ext>
+    </p:extLst>
+  </p:cSld>
+  <p:clrMapOvr>
+    <a:masterClrMapping/>
+  </p:clrMapOvr>
+</p:notes>
+</file>
+
+<file path=ppt/notesSlides/notesSlide29.xml><?xml version="1.0" encoding="utf-8"?>
 <p:notes xmlns:a="http://schemas.openxmlformats.org/drawingml/2006/main" xmlns:r="http://schemas.openxmlformats.org/officeDocument/2006/relationships" xmlns:p="http://schemas.openxmlformats.org/presentationml/2006/main">
   <p:cSld>
     <p:spTree>
@@ -10807,208 +10941,372 @@
               <a:buNone/>
             </a:pPr>
             <a:r>
-              <a:rPr lang="pt-BR" dirty="0">
-                <a:latin typeface="Times New Roman" panose="02020603050405020304" pitchFamily="18" charset="0"/>
-                <a:cs typeface="Times New Roman" panose="02020603050405020304" pitchFamily="18" charset="0"/>
-              </a:rPr>
-              <a:t>Criar </a:t>
-            </a:r>
-            <a:r>
-              <a:rPr lang="pt-BR" b="1" dirty="0">
+              <a:rPr lang="pt-BR" sz="1800" b="1" dirty="0">
+                <a:latin typeface="Times New Roman" panose="02020603050405020304" pitchFamily="18" charset="0"/>
+                <a:cs typeface="Times New Roman" panose="02020603050405020304" pitchFamily="18" charset="0"/>
+              </a:rPr>
+              <a:t>Componentes</a:t>
+            </a:r>
+            <a:r>
+              <a:rPr lang="pt-BR" sz="1800" dirty="0">
+                <a:latin typeface="Times New Roman" panose="02020603050405020304" pitchFamily="18" charset="0"/>
+                <a:cs typeface="Times New Roman" panose="02020603050405020304" pitchFamily="18" charset="0"/>
+              </a:rPr>
+              <a:t>: 01 Placa Arduino Uno R3; 01 Protoboard; 01 Led; 02 botões; 03 resistores (</a:t>
+            </a:r>
+            <a:r>
+              <a:rPr lang="pt-BR" sz="1800" b="1" dirty="0">
                 <a:solidFill>
                   <a:srgbClr val="FF0000"/>
                 </a:solidFill>
                 <a:latin typeface="Times New Roman" panose="02020603050405020304" pitchFamily="18" charset="0"/>
                 <a:cs typeface="Times New Roman" panose="02020603050405020304" pitchFamily="18" charset="0"/>
               </a:rPr>
-              <a:t>projeto</a:t>
-            </a:r>
-            <a:r>
-              <a:rPr lang="pt-BR" dirty="0">
+              <a:t>120</a:t>
+            </a:r>
+            <a:r>
+              <a:rPr lang="el-GR" sz="1800" b="1" dirty="0">
                 <a:solidFill>
                   <a:srgbClr val="FF0000"/>
                 </a:solidFill>
                 <a:latin typeface="Times New Roman" panose="02020603050405020304" pitchFamily="18" charset="0"/>
                 <a:cs typeface="Times New Roman" panose="02020603050405020304" pitchFamily="18" charset="0"/>
               </a:rPr>
+              <a:t>Ω</a:t>
+            </a:r>
+            <a:r>
+              <a:rPr lang="pt-BR" sz="1800" dirty="0">
+                <a:latin typeface="Times New Roman" panose="02020603050405020304" pitchFamily="18" charset="0"/>
+                <a:cs typeface="Times New Roman" panose="02020603050405020304" pitchFamily="18" charset="0"/>
+              </a:rPr>
+              <a:t>)</a:t>
+            </a:r>
+          </a:p>
+          <a:p>
+            <a:pPr marL="0" indent="0" algn="just">
+              <a:buNone/>
+            </a:pPr>
+            <a:r>
+              <a:rPr lang="pt-BR" sz="1800" dirty="0">
+                <a:latin typeface="Times New Roman" panose="02020603050405020304" pitchFamily="18" charset="0"/>
+                <a:cs typeface="Times New Roman" panose="02020603050405020304" pitchFamily="18" charset="0"/>
+              </a:rPr>
+              <a:t>// Programa: Introdução aos operadores lógicos (C++)</a:t>
+            </a:r>
+          </a:p>
+          <a:p>
+            <a:pPr marL="0" indent="0" algn="just">
+              <a:buNone/>
+            </a:pPr>
+            <a:r>
+              <a:rPr lang="pt-BR" sz="1800" dirty="0">
+                <a:latin typeface="Times New Roman" panose="02020603050405020304" pitchFamily="18" charset="0"/>
+                <a:cs typeface="Times New Roman" panose="02020603050405020304" pitchFamily="18" charset="0"/>
+              </a:rPr>
+              <a:t>// Aqui, definimos os pinos que serão utilizados no programa</a:t>
+            </a:r>
+          </a:p>
+          <a:p>
+            <a:pPr marL="0" indent="0" algn="just">
+              <a:buNone/>
+            </a:pPr>
+            <a:r>
+              <a:rPr lang="pt-BR" sz="1800" b="1" dirty="0" err="1">
+                <a:latin typeface="Times New Roman" panose="02020603050405020304" pitchFamily="18" charset="0"/>
+                <a:cs typeface="Times New Roman" panose="02020603050405020304" pitchFamily="18" charset="0"/>
+              </a:rPr>
+              <a:t>int</a:t>
+            </a:r>
+            <a:r>
+              <a:rPr lang="pt-BR" sz="1800" dirty="0">
+                <a:latin typeface="Times New Roman" panose="02020603050405020304" pitchFamily="18" charset="0"/>
+                <a:cs typeface="Times New Roman" panose="02020603050405020304" pitchFamily="18" charset="0"/>
+              </a:rPr>
               <a:t> </a:t>
             </a:r>
             <a:r>
-              <a:rPr lang="pt-BR" b="1" dirty="0">
+              <a:rPr lang="pt-BR" sz="1800" dirty="0" err="1">
+                <a:latin typeface="Times New Roman" panose="02020603050405020304" pitchFamily="18" charset="0"/>
+                <a:cs typeface="Times New Roman" panose="02020603050405020304" pitchFamily="18" charset="0"/>
+              </a:rPr>
+              <a:t>pinoLED</a:t>
+            </a:r>
+            <a:r>
+              <a:rPr lang="pt-BR" sz="1800" dirty="0">
+                <a:latin typeface="Times New Roman" panose="02020603050405020304" pitchFamily="18" charset="0"/>
+                <a:cs typeface="Times New Roman" panose="02020603050405020304" pitchFamily="18" charset="0"/>
+              </a:rPr>
+              <a:t> = 2;</a:t>
+            </a:r>
+          </a:p>
+          <a:p>
+            <a:pPr marL="0" indent="0" algn="just">
+              <a:buNone/>
+            </a:pPr>
+            <a:r>
+              <a:rPr lang="pt-BR" sz="1800" b="1" dirty="0" err="1">
+                <a:latin typeface="Times New Roman" panose="02020603050405020304" pitchFamily="18" charset="0"/>
+                <a:cs typeface="Times New Roman" panose="02020603050405020304" pitchFamily="18" charset="0"/>
+              </a:rPr>
+              <a:t>int</a:t>
+            </a:r>
+            <a:r>
+              <a:rPr lang="pt-BR" sz="1800" dirty="0">
+                <a:latin typeface="Times New Roman" panose="02020603050405020304" pitchFamily="18" charset="0"/>
+                <a:cs typeface="Times New Roman" panose="02020603050405020304" pitchFamily="18" charset="0"/>
+              </a:rPr>
+              <a:t> </a:t>
+            </a:r>
+            <a:r>
+              <a:rPr lang="pt-BR" sz="1800" dirty="0" err="1">
+                <a:latin typeface="Times New Roman" panose="02020603050405020304" pitchFamily="18" charset="0"/>
+                <a:cs typeface="Times New Roman" panose="02020603050405020304" pitchFamily="18" charset="0"/>
+              </a:rPr>
+              <a:t>BotaoA</a:t>
+            </a:r>
+            <a:r>
+              <a:rPr lang="pt-BR" sz="1800" dirty="0">
+                <a:latin typeface="Times New Roman" panose="02020603050405020304" pitchFamily="18" charset="0"/>
+                <a:cs typeface="Times New Roman" panose="02020603050405020304" pitchFamily="18" charset="0"/>
+              </a:rPr>
+              <a:t> = 3;</a:t>
+            </a:r>
+          </a:p>
+          <a:p>
+            <a:pPr marL="0" indent="0" algn="just">
+              <a:buNone/>
+            </a:pPr>
+            <a:r>
+              <a:rPr lang="pt-BR" sz="1800" b="1" dirty="0" err="1">
+                <a:latin typeface="Times New Roman" panose="02020603050405020304" pitchFamily="18" charset="0"/>
+                <a:cs typeface="Times New Roman" panose="02020603050405020304" pitchFamily="18" charset="0"/>
+              </a:rPr>
+              <a:t>int</a:t>
+            </a:r>
+            <a:r>
+              <a:rPr lang="pt-BR" sz="1800" dirty="0">
+                <a:latin typeface="Times New Roman" panose="02020603050405020304" pitchFamily="18" charset="0"/>
+                <a:cs typeface="Times New Roman" panose="02020603050405020304" pitchFamily="18" charset="0"/>
+              </a:rPr>
+              <a:t> </a:t>
+            </a:r>
+            <a:r>
+              <a:rPr lang="pt-BR" sz="1800" dirty="0" err="1">
+                <a:latin typeface="Times New Roman" panose="02020603050405020304" pitchFamily="18" charset="0"/>
+                <a:cs typeface="Times New Roman" panose="02020603050405020304" pitchFamily="18" charset="0"/>
+              </a:rPr>
+              <a:t>BotaoB</a:t>
+            </a:r>
+            <a:r>
+              <a:rPr lang="pt-BR" sz="1800" dirty="0">
+                <a:latin typeface="Times New Roman" panose="02020603050405020304" pitchFamily="18" charset="0"/>
+                <a:cs typeface="Times New Roman" panose="02020603050405020304" pitchFamily="18" charset="0"/>
+              </a:rPr>
+              <a:t> = 4;</a:t>
+            </a:r>
+          </a:p>
+          <a:p>
+            <a:pPr marL="0" indent="0" algn="just">
+              <a:buNone/>
+            </a:pPr>
+            <a:r>
+              <a:rPr lang="pt-BR" sz="1800" b="1" dirty="0" err="1">
                 <a:solidFill>
                   <a:srgbClr val="FF0000"/>
                 </a:solidFill>
                 <a:latin typeface="Times New Roman" panose="02020603050405020304" pitchFamily="18" charset="0"/>
                 <a:cs typeface="Times New Roman" panose="02020603050405020304" pitchFamily="18" charset="0"/>
               </a:rPr>
-              <a:t>Arduino</a:t>
-            </a:r>
-            <a:r>
-              <a:rPr lang="pt-BR" dirty="0">
-                <a:latin typeface="Times New Roman" panose="02020603050405020304" pitchFamily="18" charset="0"/>
-                <a:cs typeface="Times New Roman" panose="02020603050405020304" pitchFamily="18" charset="0"/>
-              </a:rPr>
-              <a:t> para:</a:t>
+              <a:t>void</a:t>
+            </a:r>
+            <a:r>
+              <a:rPr lang="pt-BR" sz="1800" b="1" dirty="0">
+                <a:solidFill>
+                  <a:srgbClr val="FF0000"/>
+                </a:solidFill>
+                <a:latin typeface="Times New Roman" panose="02020603050405020304" pitchFamily="18" charset="0"/>
+                <a:cs typeface="Times New Roman" panose="02020603050405020304" pitchFamily="18" charset="0"/>
+              </a:rPr>
+              <a:t> setup() </a:t>
+            </a:r>
+            <a:r>
+              <a:rPr lang="pt-BR" sz="1800" dirty="0">
+                <a:latin typeface="Times New Roman" panose="02020603050405020304" pitchFamily="18" charset="0"/>
+                <a:cs typeface="Times New Roman" panose="02020603050405020304" pitchFamily="18" charset="0"/>
+              </a:rPr>
+              <a:t>{</a:t>
             </a:r>
           </a:p>
           <a:p>
             <a:pPr marL="0" indent="0" algn="just">
               <a:buNone/>
             </a:pPr>
-            <a:endParaRPr lang="pt-BR" dirty="0">
-              <a:latin typeface="Times New Roman" panose="02020603050405020304" pitchFamily="18" charset="0"/>
-              <a:cs typeface="Times New Roman" panose="02020603050405020304" pitchFamily="18" charset="0"/>
-            </a:endParaRPr>
-          </a:p>
-          <a:p>
-            <a:pPr algn="just">
-              <a:buFontTx/>
-              <a:buChar char="-"/>
-            </a:pPr>
-            <a:r>
-              <a:rPr lang="pt-BR" dirty="0">
-                <a:latin typeface="Times New Roman" panose="02020603050405020304" pitchFamily="18" charset="0"/>
-                <a:cs typeface="Times New Roman" panose="02020603050405020304" pitchFamily="18" charset="0"/>
-              </a:rPr>
-              <a:t>Imprimir na porta serial </a:t>
-            </a:r>
-            <a:r>
-              <a:rPr lang="pt-BR" b="1" dirty="0" err="1">
-                <a:latin typeface="Times New Roman" panose="02020603050405020304" pitchFamily="18" charset="0"/>
-                <a:cs typeface="Times New Roman" panose="02020603050405020304" pitchFamily="18" charset="0"/>
-              </a:rPr>
-              <a:t>Hello</a:t>
-            </a:r>
-            <a:r>
-              <a:rPr lang="pt-BR" b="1" dirty="0">
-                <a:latin typeface="Times New Roman" panose="02020603050405020304" pitchFamily="18" charset="0"/>
-                <a:cs typeface="Times New Roman" panose="02020603050405020304" pitchFamily="18" charset="0"/>
-              </a:rPr>
-              <a:t> World</a:t>
-            </a:r>
-            <a:r>
-              <a:rPr lang="pt-BR" dirty="0">
-                <a:latin typeface="Times New Roman" panose="02020603050405020304" pitchFamily="18" charset="0"/>
-                <a:cs typeface="Times New Roman" panose="02020603050405020304" pitchFamily="18" charset="0"/>
-              </a:rPr>
-              <a:t>;</a:t>
-            </a:r>
-          </a:p>
-          <a:p>
-            <a:pPr algn="just">
-              <a:buFontTx/>
-              <a:buChar char="-"/>
-            </a:pPr>
-            <a:r>
-              <a:rPr lang="pt-BR" dirty="0">
-                <a:latin typeface="Times New Roman" panose="02020603050405020304" pitchFamily="18" charset="0"/>
-                <a:cs typeface="Times New Roman" panose="02020603050405020304" pitchFamily="18" charset="0"/>
-              </a:rPr>
-              <a:t>Fazer o led do pino 15 piscar, </a:t>
-            </a:r>
-            <a:r>
-              <a:rPr lang="pt-BR" b="1" dirty="0" err="1">
-                <a:latin typeface="Times New Roman" panose="02020603050405020304" pitchFamily="18" charset="0"/>
-                <a:cs typeface="Times New Roman" panose="02020603050405020304" pitchFamily="18" charset="0"/>
-              </a:rPr>
-              <a:t>Blink</a:t>
-            </a:r>
-            <a:r>
-              <a:rPr lang="pt-BR" dirty="0">
-                <a:latin typeface="Times New Roman" panose="02020603050405020304" pitchFamily="18" charset="0"/>
-                <a:cs typeface="Times New Roman" panose="02020603050405020304" pitchFamily="18" charset="0"/>
-              </a:rPr>
-              <a:t>;</a:t>
-            </a:r>
-          </a:p>
-          <a:p>
-            <a:pPr algn="just">
-              <a:buFontTx/>
-              <a:buChar char="-"/>
-            </a:pPr>
-            <a:r>
-              <a:rPr lang="pt-BR" dirty="0">
-                <a:latin typeface="Times New Roman" panose="02020603050405020304" pitchFamily="18" charset="0"/>
-                <a:cs typeface="Times New Roman" panose="02020603050405020304" pitchFamily="18" charset="0"/>
-              </a:rPr>
-              <a:t>Fazer </a:t>
-            </a:r>
-            <a:r>
-              <a:rPr lang="pt-BR" b="1" dirty="0">
-                <a:latin typeface="Times New Roman" panose="02020603050405020304" pitchFamily="18" charset="0"/>
-                <a:cs typeface="Times New Roman" panose="02020603050405020304" pitchFamily="18" charset="0"/>
-              </a:rPr>
-              <a:t>piscar 4 leds</a:t>
-            </a:r>
-          </a:p>
-          <a:p>
-            <a:pPr algn="just">
-              <a:buFontTx/>
-              <a:buChar char="-"/>
-            </a:pPr>
-            <a:r>
-              <a:rPr lang="pt-BR" dirty="0">
-                <a:latin typeface="Times New Roman" panose="02020603050405020304" pitchFamily="18" charset="0"/>
-                <a:cs typeface="Times New Roman" panose="02020603050405020304" pitchFamily="18" charset="0"/>
-              </a:rPr>
-              <a:t>Acender</a:t>
-            </a:r>
-            <a:r>
-              <a:rPr lang="pt-BR" b="1" dirty="0">
-                <a:latin typeface="Times New Roman" panose="02020603050405020304" pitchFamily="18" charset="0"/>
-                <a:cs typeface="Times New Roman" panose="02020603050405020304" pitchFamily="18" charset="0"/>
-              </a:rPr>
-              <a:t> uma lâmpada</a:t>
-            </a:r>
-            <a:r>
-              <a:rPr lang="pt-BR" dirty="0">
-                <a:latin typeface="Times New Roman" panose="02020603050405020304" pitchFamily="18" charset="0"/>
-                <a:cs typeface="Times New Roman" panose="02020603050405020304" pitchFamily="18" charset="0"/>
-              </a:rPr>
-              <a:t>;</a:t>
-            </a:r>
-          </a:p>
-          <a:p>
-            <a:pPr algn="just">
-              <a:buFontTx/>
-              <a:buChar char="-"/>
-            </a:pPr>
-            <a:r>
-              <a:rPr lang="pt-BR" dirty="0">
-                <a:latin typeface="Times New Roman" panose="02020603050405020304" pitchFamily="18" charset="0"/>
-                <a:cs typeface="Times New Roman" panose="02020603050405020304" pitchFamily="18" charset="0"/>
-              </a:rPr>
-              <a:t>Contador no </a:t>
-            </a:r>
-            <a:r>
-              <a:rPr lang="pt-BR" b="1" dirty="0">
-                <a:latin typeface="Times New Roman" panose="02020603050405020304" pitchFamily="18" charset="0"/>
-                <a:cs typeface="Times New Roman" panose="02020603050405020304" pitchFamily="18" charset="0"/>
-              </a:rPr>
-              <a:t>display LCD I2C</a:t>
-            </a:r>
-          </a:p>
-          <a:p>
-            <a:pPr algn="just">
-              <a:buFontTx/>
-              <a:buChar char="-"/>
-            </a:pPr>
-            <a:r>
-              <a:rPr lang="pt-BR" dirty="0">
-                <a:latin typeface="Times New Roman" panose="02020603050405020304" pitchFamily="18" charset="0"/>
-                <a:cs typeface="Times New Roman" panose="02020603050405020304" pitchFamily="18" charset="0"/>
-              </a:rPr>
-              <a:t>Projeto Livre</a:t>
+            <a:r>
+              <a:rPr lang="pt-BR" sz="1800" b="1" dirty="0">
+                <a:latin typeface="Times New Roman" panose="02020603050405020304" pitchFamily="18" charset="0"/>
+                <a:cs typeface="Times New Roman" panose="02020603050405020304" pitchFamily="18" charset="0"/>
+              </a:rPr>
+              <a:t>	</a:t>
+            </a:r>
+            <a:r>
+              <a:rPr lang="pt-BR" sz="1800" b="1" dirty="0" err="1">
+                <a:latin typeface="Times New Roman" panose="02020603050405020304" pitchFamily="18" charset="0"/>
+                <a:cs typeface="Times New Roman" panose="02020603050405020304" pitchFamily="18" charset="0"/>
+              </a:rPr>
+              <a:t>pinMode</a:t>
+            </a:r>
+            <a:r>
+              <a:rPr lang="pt-BR" sz="1800" dirty="0">
+                <a:latin typeface="Times New Roman" panose="02020603050405020304" pitchFamily="18" charset="0"/>
+                <a:cs typeface="Times New Roman" panose="02020603050405020304" pitchFamily="18" charset="0"/>
+              </a:rPr>
+              <a:t>(</a:t>
+            </a:r>
+            <a:r>
+              <a:rPr lang="pt-BR" sz="1800" dirty="0" err="1">
+                <a:latin typeface="Times New Roman" panose="02020603050405020304" pitchFamily="18" charset="0"/>
+                <a:cs typeface="Times New Roman" panose="02020603050405020304" pitchFamily="18" charset="0"/>
+              </a:rPr>
+              <a:t>pinoLED</a:t>
+            </a:r>
+            <a:r>
+              <a:rPr lang="pt-BR" sz="1800" dirty="0">
+                <a:latin typeface="Times New Roman" panose="02020603050405020304" pitchFamily="18" charset="0"/>
+                <a:cs typeface="Times New Roman" panose="02020603050405020304" pitchFamily="18" charset="0"/>
+              </a:rPr>
+              <a:t>, </a:t>
+            </a:r>
+            <a:r>
+              <a:rPr lang="pt-BR" sz="1800" b="1" dirty="0">
+                <a:solidFill>
+                  <a:srgbClr val="FF0000"/>
+                </a:solidFill>
+                <a:latin typeface="Times New Roman" panose="02020603050405020304" pitchFamily="18" charset="0"/>
+                <a:cs typeface="Times New Roman" panose="02020603050405020304" pitchFamily="18" charset="0"/>
+              </a:rPr>
+              <a:t>OUTPUT</a:t>
+            </a:r>
+            <a:r>
+              <a:rPr lang="pt-BR" sz="1800" dirty="0">
+                <a:latin typeface="Times New Roman" panose="02020603050405020304" pitchFamily="18" charset="0"/>
+                <a:cs typeface="Times New Roman" panose="02020603050405020304" pitchFamily="18" charset="0"/>
+              </a:rPr>
+              <a:t>); // Define o pino do LED como saída</a:t>
             </a:r>
           </a:p>
           <a:p>
             <a:pPr marL="0" indent="0" algn="just">
               <a:buNone/>
             </a:pPr>
-            <a:endParaRPr lang="pt-BR" dirty="0">
-              <a:latin typeface="Times New Roman" panose="02020603050405020304" pitchFamily="18" charset="0"/>
-              <a:cs typeface="Times New Roman" panose="02020603050405020304" pitchFamily="18" charset="0"/>
-            </a:endParaRPr>
+            <a:r>
+              <a:rPr lang="pt-BR" sz="1800" b="1" dirty="0">
+                <a:latin typeface="Times New Roman" panose="02020603050405020304" pitchFamily="18" charset="0"/>
+                <a:cs typeface="Times New Roman" panose="02020603050405020304" pitchFamily="18" charset="0"/>
+              </a:rPr>
+              <a:t>	</a:t>
+            </a:r>
+            <a:r>
+              <a:rPr lang="pt-BR" sz="1800" b="1" dirty="0" err="1">
+                <a:latin typeface="Times New Roman" panose="02020603050405020304" pitchFamily="18" charset="0"/>
+                <a:cs typeface="Times New Roman" panose="02020603050405020304" pitchFamily="18" charset="0"/>
+              </a:rPr>
+              <a:t>pinMode</a:t>
+            </a:r>
+            <a:r>
+              <a:rPr lang="pt-BR" sz="1800" dirty="0">
+                <a:latin typeface="Times New Roman" panose="02020603050405020304" pitchFamily="18" charset="0"/>
+                <a:cs typeface="Times New Roman" panose="02020603050405020304" pitchFamily="18" charset="0"/>
+              </a:rPr>
+              <a:t>(</a:t>
+            </a:r>
+            <a:r>
+              <a:rPr lang="pt-BR" sz="1800" dirty="0" err="1">
+                <a:latin typeface="Times New Roman" panose="02020603050405020304" pitchFamily="18" charset="0"/>
+                <a:cs typeface="Times New Roman" panose="02020603050405020304" pitchFamily="18" charset="0"/>
+              </a:rPr>
+              <a:t>BotaoA</a:t>
+            </a:r>
+            <a:r>
+              <a:rPr lang="pt-BR" sz="1800" dirty="0">
+                <a:latin typeface="Times New Roman" panose="02020603050405020304" pitchFamily="18" charset="0"/>
+                <a:cs typeface="Times New Roman" panose="02020603050405020304" pitchFamily="18" charset="0"/>
+              </a:rPr>
+              <a:t>, </a:t>
+            </a:r>
+            <a:r>
+              <a:rPr lang="pt-BR" sz="1800" b="1" dirty="0">
+                <a:solidFill>
+                  <a:srgbClr val="FF0000"/>
+                </a:solidFill>
+                <a:latin typeface="Times New Roman" panose="02020603050405020304" pitchFamily="18" charset="0"/>
+                <a:cs typeface="Times New Roman" panose="02020603050405020304" pitchFamily="18" charset="0"/>
+              </a:rPr>
+              <a:t>INPUT</a:t>
+            </a:r>
+            <a:r>
+              <a:rPr lang="pt-BR" sz="1800" dirty="0">
+                <a:latin typeface="Times New Roman" panose="02020603050405020304" pitchFamily="18" charset="0"/>
+                <a:cs typeface="Times New Roman" panose="02020603050405020304" pitchFamily="18" charset="0"/>
+              </a:rPr>
+              <a:t>); // Define os botões como entrada</a:t>
+            </a:r>
+          </a:p>
+          <a:p>
+            <a:pPr marL="0" indent="0" algn="just">
+              <a:buNone/>
+            </a:pPr>
+            <a:r>
+              <a:rPr lang="pt-BR" sz="1800" b="1" dirty="0">
+                <a:latin typeface="Times New Roman" panose="02020603050405020304" pitchFamily="18" charset="0"/>
+                <a:cs typeface="Times New Roman" panose="02020603050405020304" pitchFamily="18" charset="0"/>
+              </a:rPr>
+              <a:t>	</a:t>
+            </a:r>
+            <a:r>
+              <a:rPr lang="pt-BR" sz="1800" b="1" dirty="0" err="1">
+                <a:latin typeface="Times New Roman" panose="02020603050405020304" pitchFamily="18" charset="0"/>
+                <a:cs typeface="Times New Roman" panose="02020603050405020304" pitchFamily="18" charset="0"/>
+              </a:rPr>
+              <a:t>pinMode</a:t>
+            </a:r>
+            <a:r>
+              <a:rPr lang="pt-BR" sz="1800" dirty="0">
+                <a:latin typeface="Times New Roman" panose="02020603050405020304" pitchFamily="18" charset="0"/>
+                <a:cs typeface="Times New Roman" panose="02020603050405020304" pitchFamily="18" charset="0"/>
+              </a:rPr>
+              <a:t>(</a:t>
+            </a:r>
+            <a:r>
+              <a:rPr lang="pt-BR" sz="1800" dirty="0" err="1">
+                <a:latin typeface="Times New Roman" panose="02020603050405020304" pitchFamily="18" charset="0"/>
+                <a:cs typeface="Times New Roman" panose="02020603050405020304" pitchFamily="18" charset="0"/>
+              </a:rPr>
+              <a:t>BotaoB</a:t>
+            </a:r>
+            <a:r>
+              <a:rPr lang="pt-BR" sz="1800" dirty="0">
+                <a:latin typeface="Times New Roman" panose="02020603050405020304" pitchFamily="18" charset="0"/>
+                <a:cs typeface="Times New Roman" panose="02020603050405020304" pitchFamily="18" charset="0"/>
+              </a:rPr>
+              <a:t>, </a:t>
+            </a:r>
+            <a:r>
+              <a:rPr lang="pt-BR" sz="1800" b="1" dirty="0">
+                <a:solidFill>
+                  <a:srgbClr val="FF0000"/>
+                </a:solidFill>
+                <a:latin typeface="Times New Roman" panose="02020603050405020304" pitchFamily="18" charset="0"/>
+                <a:cs typeface="Times New Roman" panose="02020603050405020304" pitchFamily="18" charset="0"/>
+              </a:rPr>
+              <a:t>INPUT</a:t>
+            </a:r>
+            <a:r>
+              <a:rPr lang="pt-BR" sz="1800" dirty="0">
+                <a:latin typeface="Times New Roman" panose="02020603050405020304" pitchFamily="18" charset="0"/>
+                <a:cs typeface="Times New Roman" panose="02020603050405020304" pitchFamily="18" charset="0"/>
+              </a:rPr>
+              <a:t>);	}   </a:t>
+            </a:r>
           </a:p>
         </p:txBody>
       </p:sp>
@@ -11071,6 +11369,1193 @@
                   <a:srgbClr val="0070C0"/>
                 </a:solidFill>
               </a:rPr>
+              <a:t>Dinâmica</a:t>
+            </a:r>
+            <a:r>
+              <a:rPr lang="en-US" b="1" dirty="0">
+                <a:solidFill>
+                  <a:srgbClr val="0070C0"/>
+                </a:solidFill>
+              </a:rPr>
+              <a:t>/</a:t>
+            </a:r>
+            <a:r>
+              <a:rPr lang="en-US" b="1" dirty="0" err="1">
+                <a:solidFill>
+                  <a:srgbClr val="0070C0"/>
+                </a:solidFill>
+              </a:rPr>
+              <a:t>Atividades</a:t>
+            </a:r>
+            <a:r>
+              <a:rPr lang="en-US" b="1" dirty="0">
+                <a:solidFill>
+                  <a:srgbClr val="0070C0"/>
+                </a:solidFill>
+              </a:rPr>
+              <a:t> - </a:t>
+            </a:r>
+            <a:r>
+              <a:rPr lang="en-US" b="1" dirty="0" err="1">
+                <a:solidFill>
+                  <a:srgbClr val="0070C0"/>
+                </a:solidFill>
+              </a:rPr>
+              <a:t>Exercícios</a:t>
+            </a:r>
+            <a:endParaRPr lang="en-US" b="1" dirty="0">
+              <a:solidFill>
+                <a:srgbClr val="0070C0"/>
+              </a:solidFill>
+            </a:endParaRPr>
+          </a:p>
+        </p:txBody>
+      </p:sp>
+      <p:sp>
+        <p:nvSpPr>
+          <p:cNvPr id="8" name="Text Placeholder 2"/>
+          <p:cNvSpPr>
+            <a:spLocks noGrp="1"/>
+          </p:cNvSpPr>
+          <p:nvPr>
+            <p:ph type="body" sz="half" idx="1"/>
+          </p:nvPr>
+        </p:nvSpPr>
+        <p:spPr>
+          <a:xfrm>
+            <a:off x="139472" y="1063230"/>
+            <a:ext cx="8865056" cy="3996450"/>
+          </a:xfrm>
+        </p:spPr>
+        <p:txBody>
+          <a:bodyPr>
+            <a:noAutofit/>
+          </a:bodyPr>
+          <a:lstStyle/>
+          <a:p>
+            <a:pPr marL="0" indent="0" algn="just">
+              <a:buNone/>
+            </a:pPr>
+            <a:r>
+              <a:rPr lang="pt-BR" sz="1800" b="1" dirty="0" err="1">
+                <a:solidFill>
+                  <a:srgbClr val="FF0000"/>
+                </a:solidFill>
+                <a:latin typeface="Times New Roman" panose="02020603050405020304" pitchFamily="18" charset="0"/>
+                <a:cs typeface="Times New Roman" panose="02020603050405020304" pitchFamily="18" charset="0"/>
+              </a:rPr>
+              <a:t>void</a:t>
+            </a:r>
+            <a:r>
+              <a:rPr lang="pt-BR" sz="1800" b="1" dirty="0">
+                <a:solidFill>
+                  <a:srgbClr val="FF0000"/>
+                </a:solidFill>
+                <a:latin typeface="Times New Roman" panose="02020603050405020304" pitchFamily="18" charset="0"/>
+                <a:cs typeface="Times New Roman" panose="02020603050405020304" pitchFamily="18" charset="0"/>
+              </a:rPr>
+              <a:t> loop()</a:t>
+            </a:r>
+            <a:r>
+              <a:rPr lang="pt-BR" sz="1800" dirty="0">
+                <a:latin typeface="Times New Roman" panose="02020603050405020304" pitchFamily="18" charset="0"/>
+                <a:cs typeface="Times New Roman" panose="02020603050405020304" pitchFamily="18" charset="0"/>
+              </a:rPr>
+              <a:t> {</a:t>
+            </a:r>
+          </a:p>
+          <a:p>
+            <a:pPr marL="0" indent="0" algn="just">
+              <a:buNone/>
+            </a:pPr>
+            <a:r>
+              <a:rPr lang="pt-BR" sz="1800" dirty="0">
+                <a:latin typeface="Times New Roman" panose="02020603050405020304" pitchFamily="18" charset="0"/>
+                <a:cs typeface="Times New Roman" panose="02020603050405020304" pitchFamily="18" charset="0"/>
+              </a:rPr>
+              <a:t>    // Passa o valor dos botões para as variáveis</a:t>
+            </a:r>
+          </a:p>
+          <a:p>
+            <a:pPr marL="0" indent="0" algn="just">
+              <a:buNone/>
+            </a:pPr>
+            <a:r>
+              <a:rPr lang="pt-BR" sz="1800" dirty="0">
+                <a:latin typeface="Times New Roman" panose="02020603050405020304" pitchFamily="18" charset="0"/>
+                <a:cs typeface="Times New Roman" panose="02020603050405020304" pitchFamily="18" charset="0"/>
+              </a:rPr>
+              <a:t>    </a:t>
+            </a:r>
+            <a:r>
+              <a:rPr lang="pt-BR" sz="1800" b="1" dirty="0" err="1">
+                <a:latin typeface="Times New Roman" panose="02020603050405020304" pitchFamily="18" charset="0"/>
+                <a:cs typeface="Times New Roman" panose="02020603050405020304" pitchFamily="18" charset="0"/>
+              </a:rPr>
+              <a:t>boolean</a:t>
+            </a:r>
+            <a:r>
+              <a:rPr lang="pt-BR" sz="1800" dirty="0">
+                <a:latin typeface="Times New Roman" panose="02020603050405020304" pitchFamily="18" charset="0"/>
+                <a:cs typeface="Times New Roman" panose="02020603050405020304" pitchFamily="18" charset="0"/>
+              </a:rPr>
+              <a:t> A = </a:t>
+            </a:r>
+            <a:r>
+              <a:rPr lang="pt-BR" sz="1800" b="1" dirty="0" err="1">
+                <a:latin typeface="Times New Roman" panose="02020603050405020304" pitchFamily="18" charset="0"/>
+                <a:cs typeface="Times New Roman" panose="02020603050405020304" pitchFamily="18" charset="0"/>
+              </a:rPr>
+              <a:t>digitalRead</a:t>
+            </a:r>
+            <a:r>
+              <a:rPr lang="pt-BR" sz="1800" dirty="0">
+                <a:latin typeface="Times New Roman" panose="02020603050405020304" pitchFamily="18" charset="0"/>
+                <a:cs typeface="Times New Roman" panose="02020603050405020304" pitchFamily="18" charset="0"/>
+              </a:rPr>
+              <a:t>(</a:t>
+            </a:r>
+            <a:r>
+              <a:rPr lang="pt-BR" sz="1800" dirty="0" err="1">
+                <a:latin typeface="Times New Roman" panose="02020603050405020304" pitchFamily="18" charset="0"/>
+                <a:cs typeface="Times New Roman" panose="02020603050405020304" pitchFamily="18" charset="0"/>
+              </a:rPr>
+              <a:t>BotaoA</a:t>
+            </a:r>
+            <a:r>
+              <a:rPr lang="pt-BR" sz="1800" dirty="0">
+                <a:latin typeface="Times New Roman" panose="02020603050405020304" pitchFamily="18" charset="0"/>
+                <a:cs typeface="Times New Roman" panose="02020603050405020304" pitchFamily="18" charset="0"/>
+              </a:rPr>
+              <a:t>); // Foi escolhido </a:t>
+            </a:r>
+            <a:r>
+              <a:rPr lang="pt-BR" sz="1800" dirty="0" err="1">
+                <a:latin typeface="Times New Roman" panose="02020603050405020304" pitchFamily="18" charset="0"/>
+                <a:cs typeface="Times New Roman" panose="02020603050405020304" pitchFamily="18" charset="0"/>
+              </a:rPr>
+              <a:t>boolean</a:t>
+            </a:r>
+            <a:r>
+              <a:rPr lang="pt-BR" sz="1800" dirty="0">
+                <a:latin typeface="Times New Roman" panose="02020603050405020304" pitchFamily="18" charset="0"/>
+                <a:cs typeface="Times New Roman" panose="02020603050405020304" pitchFamily="18" charset="0"/>
+              </a:rPr>
+              <a:t> que só assume o valor 0 ou 1</a:t>
+            </a:r>
+          </a:p>
+          <a:p>
+            <a:pPr marL="0" indent="0" algn="just">
+              <a:buNone/>
+            </a:pPr>
+            <a:r>
+              <a:rPr lang="pt-BR" sz="1800" dirty="0">
+                <a:latin typeface="Times New Roman" panose="02020603050405020304" pitchFamily="18" charset="0"/>
+                <a:cs typeface="Times New Roman" panose="02020603050405020304" pitchFamily="18" charset="0"/>
+              </a:rPr>
+              <a:t>    </a:t>
+            </a:r>
+            <a:r>
+              <a:rPr lang="pt-BR" sz="1800" b="1" dirty="0" err="1">
+                <a:latin typeface="Times New Roman" panose="02020603050405020304" pitchFamily="18" charset="0"/>
+                <a:cs typeface="Times New Roman" panose="02020603050405020304" pitchFamily="18" charset="0"/>
+              </a:rPr>
+              <a:t>boolean</a:t>
+            </a:r>
+            <a:r>
+              <a:rPr lang="pt-BR" sz="1800" dirty="0">
+                <a:latin typeface="Times New Roman" panose="02020603050405020304" pitchFamily="18" charset="0"/>
+                <a:cs typeface="Times New Roman" panose="02020603050405020304" pitchFamily="18" charset="0"/>
+              </a:rPr>
+              <a:t> B = </a:t>
+            </a:r>
+            <a:r>
+              <a:rPr lang="pt-BR" sz="1800" b="1" dirty="0" err="1">
+                <a:latin typeface="Times New Roman" panose="02020603050405020304" pitchFamily="18" charset="0"/>
+                <a:cs typeface="Times New Roman" panose="02020603050405020304" pitchFamily="18" charset="0"/>
+              </a:rPr>
+              <a:t>digitalRead</a:t>
+            </a:r>
+            <a:r>
+              <a:rPr lang="pt-BR" sz="1800" dirty="0">
+                <a:latin typeface="Times New Roman" panose="02020603050405020304" pitchFamily="18" charset="0"/>
+                <a:cs typeface="Times New Roman" panose="02020603050405020304" pitchFamily="18" charset="0"/>
+              </a:rPr>
+              <a:t>(</a:t>
+            </a:r>
+            <a:r>
+              <a:rPr lang="pt-BR" sz="1800" dirty="0" err="1">
+                <a:latin typeface="Times New Roman" panose="02020603050405020304" pitchFamily="18" charset="0"/>
+                <a:cs typeface="Times New Roman" panose="02020603050405020304" pitchFamily="18" charset="0"/>
+              </a:rPr>
+              <a:t>BotaoB</a:t>
+            </a:r>
+            <a:r>
+              <a:rPr lang="pt-BR" sz="1800" dirty="0">
+                <a:latin typeface="Times New Roman" panose="02020603050405020304" pitchFamily="18" charset="0"/>
+                <a:cs typeface="Times New Roman" panose="02020603050405020304" pitchFamily="18" charset="0"/>
+              </a:rPr>
+              <a:t>); // Também poderia ser um '</a:t>
+            </a:r>
+            <a:r>
+              <a:rPr lang="pt-BR" sz="1800" dirty="0" err="1">
+                <a:latin typeface="Times New Roman" panose="02020603050405020304" pitchFamily="18" charset="0"/>
+                <a:cs typeface="Times New Roman" panose="02020603050405020304" pitchFamily="18" charset="0"/>
+              </a:rPr>
+              <a:t>int</a:t>
+            </a:r>
+            <a:r>
+              <a:rPr lang="pt-BR" sz="1800" dirty="0">
+                <a:latin typeface="Times New Roman" panose="02020603050405020304" pitchFamily="18" charset="0"/>
+                <a:cs typeface="Times New Roman" panose="02020603050405020304" pitchFamily="18" charset="0"/>
+              </a:rPr>
+              <a:t>' ou um 'char' </a:t>
+            </a:r>
+          </a:p>
+          <a:p>
+            <a:pPr marL="0" indent="0" algn="just">
+              <a:buNone/>
+            </a:pPr>
+            <a:r>
+              <a:rPr lang="pt-BR" sz="1800" dirty="0">
+                <a:latin typeface="Times New Roman" panose="02020603050405020304" pitchFamily="18" charset="0"/>
+                <a:cs typeface="Times New Roman" panose="02020603050405020304" pitchFamily="18" charset="0"/>
+              </a:rPr>
+              <a:t> </a:t>
+            </a:r>
+          </a:p>
+          <a:p>
+            <a:pPr marL="0" indent="0" algn="just">
+              <a:buNone/>
+            </a:pPr>
+            <a:r>
+              <a:rPr lang="pt-BR" sz="1800" dirty="0">
+                <a:latin typeface="Times New Roman" panose="02020603050405020304" pitchFamily="18" charset="0"/>
+                <a:cs typeface="Times New Roman" panose="02020603050405020304" pitchFamily="18" charset="0"/>
+              </a:rPr>
+              <a:t>    </a:t>
+            </a:r>
+            <a:r>
+              <a:rPr lang="pt-BR" sz="1800" b="1" dirty="0" err="1">
+                <a:latin typeface="Times New Roman" panose="02020603050405020304" pitchFamily="18" charset="0"/>
+                <a:cs typeface="Times New Roman" panose="02020603050405020304" pitchFamily="18" charset="0"/>
+              </a:rPr>
+              <a:t>if</a:t>
+            </a:r>
+            <a:r>
+              <a:rPr lang="pt-BR" sz="1800" dirty="0">
+                <a:latin typeface="Times New Roman" panose="02020603050405020304" pitchFamily="18" charset="0"/>
+                <a:cs typeface="Times New Roman" panose="02020603050405020304" pitchFamily="18" charset="0"/>
+              </a:rPr>
+              <a:t>(!A) // Se NÃO A, acende o LED; (</a:t>
+            </a:r>
+            <a:r>
+              <a:rPr lang="pt-BR" sz="1800" b="1" dirty="0">
+                <a:latin typeface="Times New Roman" panose="02020603050405020304" pitchFamily="18" charset="0"/>
+                <a:cs typeface="Times New Roman" panose="02020603050405020304" pitchFamily="18" charset="0"/>
+              </a:rPr>
+              <a:t>!A&amp;&amp;B</a:t>
+            </a:r>
+            <a:r>
+              <a:rPr lang="pt-BR" sz="1800" dirty="0">
+                <a:latin typeface="Times New Roman" panose="02020603050405020304" pitchFamily="18" charset="0"/>
+                <a:cs typeface="Times New Roman" panose="02020603050405020304" pitchFamily="18" charset="0"/>
+              </a:rPr>
+              <a:t>); (</a:t>
+            </a:r>
+            <a:r>
+              <a:rPr lang="pt-BR" sz="1800" b="1" dirty="0">
+                <a:solidFill>
+                  <a:srgbClr val="FF0000"/>
+                </a:solidFill>
+                <a:latin typeface="Times New Roman" panose="02020603050405020304" pitchFamily="18" charset="0"/>
+                <a:cs typeface="Times New Roman" panose="02020603050405020304" pitchFamily="18" charset="0"/>
+              </a:rPr>
+              <a:t>A&amp;&amp;B</a:t>
+            </a:r>
+            <a:r>
+              <a:rPr lang="pt-BR" sz="1800" dirty="0">
+                <a:latin typeface="Times New Roman" panose="02020603050405020304" pitchFamily="18" charset="0"/>
+                <a:cs typeface="Times New Roman" panose="02020603050405020304" pitchFamily="18" charset="0"/>
+              </a:rPr>
+              <a:t>); (</a:t>
+            </a:r>
+            <a:r>
+              <a:rPr lang="pt-BR" sz="1800" b="1" dirty="0">
+                <a:latin typeface="Times New Roman" panose="02020603050405020304" pitchFamily="18" charset="0"/>
+                <a:cs typeface="Times New Roman" panose="02020603050405020304" pitchFamily="18" charset="0"/>
+              </a:rPr>
+              <a:t>A&amp;&amp;!B</a:t>
+            </a:r>
+            <a:r>
+              <a:rPr lang="pt-BR" sz="1800" dirty="0">
+                <a:latin typeface="Times New Roman" panose="02020603050405020304" pitchFamily="18" charset="0"/>
+                <a:cs typeface="Times New Roman" panose="02020603050405020304" pitchFamily="18" charset="0"/>
+              </a:rPr>
+              <a:t>); (</a:t>
+            </a:r>
+            <a:r>
+              <a:rPr lang="pt-BR" sz="1800" b="1" dirty="0">
+                <a:solidFill>
+                  <a:srgbClr val="FF0000"/>
+                </a:solidFill>
+                <a:latin typeface="Times New Roman" panose="02020603050405020304" pitchFamily="18" charset="0"/>
+                <a:cs typeface="Times New Roman" panose="02020603050405020304" pitchFamily="18" charset="0"/>
+              </a:rPr>
+              <a:t>A||B</a:t>
+            </a:r>
+            <a:r>
+              <a:rPr lang="pt-BR" sz="1800" dirty="0">
+                <a:latin typeface="Times New Roman" panose="02020603050405020304" pitchFamily="18" charset="0"/>
+                <a:cs typeface="Times New Roman" panose="02020603050405020304" pitchFamily="18" charset="0"/>
+              </a:rPr>
+              <a:t>)</a:t>
+            </a:r>
+          </a:p>
+          <a:p>
+            <a:pPr marL="0" indent="0" algn="just">
+              <a:buNone/>
+            </a:pPr>
+            <a:r>
+              <a:rPr lang="pt-BR" sz="1800" dirty="0">
+                <a:latin typeface="Times New Roman" panose="02020603050405020304" pitchFamily="18" charset="0"/>
+                <a:cs typeface="Times New Roman" panose="02020603050405020304" pitchFamily="18" charset="0"/>
+              </a:rPr>
+              <a:t>      {   </a:t>
+            </a:r>
+            <a:r>
+              <a:rPr lang="pt-BR" sz="1800" b="1" dirty="0" err="1">
+                <a:latin typeface="Times New Roman" panose="02020603050405020304" pitchFamily="18" charset="0"/>
+                <a:cs typeface="Times New Roman" panose="02020603050405020304" pitchFamily="18" charset="0"/>
+              </a:rPr>
+              <a:t>digitalWrite</a:t>
+            </a:r>
+            <a:r>
+              <a:rPr lang="pt-BR" sz="1800" dirty="0">
+                <a:latin typeface="Times New Roman" panose="02020603050405020304" pitchFamily="18" charset="0"/>
+                <a:cs typeface="Times New Roman" panose="02020603050405020304" pitchFamily="18" charset="0"/>
+              </a:rPr>
+              <a:t>(</a:t>
+            </a:r>
+            <a:r>
+              <a:rPr lang="pt-BR" sz="1800" dirty="0" err="1">
+                <a:latin typeface="Times New Roman" panose="02020603050405020304" pitchFamily="18" charset="0"/>
+                <a:cs typeface="Times New Roman" panose="02020603050405020304" pitchFamily="18" charset="0"/>
+              </a:rPr>
+              <a:t>pinoLED</a:t>
+            </a:r>
+            <a:r>
+              <a:rPr lang="pt-BR" sz="1800" dirty="0">
+                <a:latin typeface="Times New Roman" panose="02020603050405020304" pitchFamily="18" charset="0"/>
+                <a:cs typeface="Times New Roman" panose="02020603050405020304" pitchFamily="18" charset="0"/>
+              </a:rPr>
+              <a:t>, </a:t>
+            </a:r>
+            <a:r>
+              <a:rPr lang="pt-BR" sz="1800" b="1" dirty="0">
+                <a:solidFill>
+                  <a:srgbClr val="FF0000"/>
+                </a:solidFill>
+                <a:latin typeface="Times New Roman" panose="02020603050405020304" pitchFamily="18" charset="0"/>
+                <a:cs typeface="Times New Roman" panose="02020603050405020304" pitchFamily="18" charset="0"/>
+              </a:rPr>
+              <a:t>HIGH</a:t>
+            </a:r>
+            <a:r>
+              <a:rPr lang="pt-BR" sz="1800" dirty="0">
+                <a:latin typeface="Times New Roman" panose="02020603050405020304" pitchFamily="18" charset="0"/>
+                <a:cs typeface="Times New Roman" panose="02020603050405020304" pitchFamily="18" charset="0"/>
+              </a:rPr>
+              <a:t>);  }</a:t>
+            </a:r>
+          </a:p>
+          <a:p>
+            <a:pPr marL="0" indent="0" algn="just">
+              <a:buNone/>
+            </a:pPr>
+            <a:r>
+              <a:rPr lang="pt-BR" sz="1800" dirty="0">
+                <a:latin typeface="Times New Roman" panose="02020603050405020304" pitchFamily="18" charset="0"/>
+                <a:cs typeface="Times New Roman" panose="02020603050405020304" pitchFamily="18" charset="0"/>
+              </a:rPr>
+              <a:t>      </a:t>
+            </a:r>
+            <a:r>
+              <a:rPr lang="pt-BR" sz="1800" b="1" dirty="0" err="1">
+                <a:latin typeface="Times New Roman" panose="02020603050405020304" pitchFamily="18" charset="0"/>
+                <a:cs typeface="Times New Roman" panose="02020603050405020304" pitchFamily="18" charset="0"/>
+              </a:rPr>
+              <a:t>else</a:t>
+            </a:r>
+            <a:r>
+              <a:rPr lang="pt-BR" sz="1800" dirty="0">
+                <a:latin typeface="Times New Roman" panose="02020603050405020304" pitchFamily="18" charset="0"/>
+                <a:cs typeface="Times New Roman" panose="02020603050405020304" pitchFamily="18" charset="0"/>
+              </a:rPr>
+              <a:t> // Se a condição não for satisfeita, apaga o LED</a:t>
+            </a:r>
+          </a:p>
+          <a:p>
+            <a:pPr marL="0" indent="0" algn="just">
+              <a:buNone/>
+            </a:pPr>
+            <a:r>
+              <a:rPr lang="pt-BR" sz="1800" dirty="0">
+                <a:latin typeface="Times New Roman" panose="02020603050405020304" pitchFamily="18" charset="0"/>
+                <a:cs typeface="Times New Roman" panose="02020603050405020304" pitchFamily="18" charset="0"/>
+              </a:rPr>
+              <a:t>      {   </a:t>
+            </a:r>
+            <a:r>
+              <a:rPr lang="pt-BR" sz="1800" b="1" dirty="0" err="1">
+                <a:latin typeface="Times New Roman" panose="02020603050405020304" pitchFamily="18" charset="0"/>
+                <a:cs typeface="Times New Roman" panose="02020603050405020304" pitchFamily="18" charset="0"/>
+              </a:rPr>
+              <a:t>digitalWrite</a:t>
+            </a:r>
+            <a:r>
+              <a:rPr lang="pt-BR" sz="1800" dirty="0">
+                <a:latin typeface="Times New Roman" panose="02020603050405020304" pitchFamily="18" charset="0"/>
+                <a:cs typeface="Times New Roman" panose="02020603050405020304" pitchFamily="18" charset="0"/>
+              </a:rPr>
+              <a:t>(</a:t>
+            </a:r>
+            <a:r>
+              <a:rPr lang="pt-BR" sz="1800" dirty="0" err="1">
+                <a:latin typeface="Times New Roman" panose="02020603050405020304" pitchFamily="18" charset="0"/>
+                <a:cs typeface="Times New Roman" panose="02020603050405020304" pitchFamily="18" charset="0"/>
+              </a:rPr>
+              <a:t>pinoLED</a:t>
+            </a:r>
+            <a:r>
+              <a:rPr lang="pt-BR" sz="1800" dirty="0">
+                <a:latin typeface="Times New Roman" panose="02020603050405020304" pitchFamily="18" charset="0"/>
+                <a:cs typeface="Times New Roman" panose="02020603050405020304" pitchFamily="18" charset="0"/>
+              </a:rPr>
+              <a:t>, </a:t>
+            </a:r>
+            <a:r>
+              <a:rPr lang="pt-BR" sz="1800" b="1" dirty="0">
+                <a:solidFill>
+                  <a:srgbClr val="FF0000"/>
+                </a:solidFill>
+                <a:latin typeface="Times New Roman" panose="02020603050405020304" pitchFamily="18" charset="0"/>
+                <a:cs typeface="Times New Roman" panose="02020603050405020304" pitchFamily="18" charset="0"/>
+              </a:rPr>
+              <a:t>LOW</a:t>
+            </a:r>
+            <a:r>
+              <a:rPr lang="pt-BR" sz="1800" dirty="0">
+                <a:latin typeface="Times New Roman" panose="02020603050405020304" pitchFamily="18" charset="0"/>
+                <a:cs typeface="Times New Roman" panose="02020603050405020304" pitchFamily="18" charset="0"/>
+              </a:rPr>
+              <a:t>);   }</a:t>
+            </a:r>
+          </a:p>
+          <a:p>
+            <a:pPr marL="0" indent="0" algn="just">
+              <a:buNone/>
+            </a:pPr>
+            <a:r>
+              <a:rPr lang="pt-BR" sz="1800" dirty="0">
+                <a:latin typeface="Times New Roman" panose="02020603050405020304" pitchFamily="18" charset="0"/>
+                <a:cs typeface="Times New Roman" panose="02020603050405020304" pitchFamily="18" charset="0"/>
+              </a:rPr>
+              <a:t>    </a:t>
+            </a:r>
+            <a:r>
+              <a:rPr lang="pt-BR" sz="1800" b="1" dirty="0">
+                <a:latin typeface="Times New Roman" panose="02020603050405020304" pitchFamily="18" charset="0"/>
+                <a:cs typeface="Times New Roman" panose="02020603050405020304" pitchFamily="18" charset="0"/>
+              </a:rPr>
+              <a:t>delay</a:t>
+            </a:r>
+            <a:r>
+              <a:rPr lang="pt-BR" sz="1800" dirty="0">
+                <a:latin typeface="Times New Roman" panose="02020603050405020304" pitchFamily="18" charset="0"/>
+                <a:cs typeface="Times New Roman" panose="02020603050405020304" pitchFamily="18" charset="0"/>
+              </a:rPr>
+              <a:t>(200);</a:t>
+            </a:r>
+          </a:p>
+          <a:p>
+            <a:pPr marL="0" indent="0" algn="just">
+              <a:buNone/>
+            </a:pPr>
+            <a:r>
+              <a:rPr lang="pt-BR" sz="1800" dirty="0">
+                <a:latin typeface="Times New Roman" panose="02020603050405020304" pitchFamily="18" charset="0"/>
+                <a:cs typeface="Times New Roman" panose="02020603050405020304" pitchFamily="18" charset="0"/>
+              </a:rPr>
+              <a:t>}</a:t>
+            </a:r>
+          </a:p>
+        </p:txBody>
+      </p:sp>
+    </p:spTree>
+    <p:extLst>
+      <p:ext uri="{BB962C8B-B14F-4D97-AF65-F5344CB8AC3E}">
+        <p14:creationId xmlns:p14="http://schemas.microsoft.com/office/powerpoint/2010/main" val="286788889"/>
+      </p:ext>
+    </p:extLst>
+  </p:cSld>
+  <p:clrMapOvr>
+    <a:masterClrMapping/>
+  </p:clrMapOvr>
+  <p:transition spd="med"/>
+</p:sld>
+</file>
+
+<file path=ppt/slides/slide29.xml><?xml version="1.0" encoding="utf-8"?>
+<p:sld xmlns:a="http://schemas.openxmlformats.org/drawingml/2006/main" xmlns:r="http://schemas.openxmlformats.org/officeDocument/2006/relationships" xmlns:p="http://schemas.openxmlformats.org/presentationml/2006/main">
+  <p:cSld>
+    <p:spTree>
+      <p:nvGrpSpPr>
+        <p:cNvPr id="1" name=""/>
+        <p:cNvGrpSpPr/>
+        <p:nvPr/>
+      </p:nvGrpSpPr>
+      <p:grpSpPr>
+        <a:xfrm>
+          <a:off x="0" y="0"/>
+          <a:ext cx="0" cy="0"/>
+          <a:chOff x="0" y="0"/>
+          <a:chExt cx="0" cy="0"/>
+        </a:xfrm>
+      </p:grpSpPr>
+      <p:sp>
+        <p:nvSpPr>
+          <p:cNvPr id="6" name="Title 1"/>
+          <p:cNvSpPr>
+            <a:spLocks noGrp="1"/>
+          </p:cNvSpPr>
+          <p:nvPr>
+            <p:ph type="title"/>
+          </p:nvPr>
+        </p:nvSpPr>
+        <p:spPr>
+          <a:xfrm>
+            <a:off x="457200" y="205980"/>
+            <a:ext cx="8229600" cy="857251"/>
+          </a:xfrm>
+        </p:spPr>
+        <p:txBody>
+          <a:bodyPr>
+            <a:normAutofit/>
+          </a:bodyPr>
+          <a:lstStyle/>
+          <a:p>
+            <a:r>
+              <a:rPr lang="en-US" b="1" dirty="0" err="1">
+                <a:solidFill>
+                  <a:srgbClr val="0070C0"/>
+                </a:solidFill>
+              </a:rPr>
+              <a:t>Dinâmica</a:t>
+            </a:r>
+            <a:r>
+              <a:rPr lang="en-US" b="1" dirty="0">
+                <a:solidFill>
+                  <a:srgbClr val="0070C0"/>
+                </a:solidFill>
+              </a:rPr>
+              <a:t>/</a:t>
+            </a:r>
+            <a:r>
+              <a:rPr lang="en-US" b="1" dirty="0" err="1">
+                <a:solidFill>
+                  <a:srgbClr val="0070C0"/>
+                </a:solidFill>
+              </a:rPr>
+              <a:t>Atividades</a:t>
+            </a:r>
+            <a:r>
+              <a:rPr lang="en-US" b="1" dirty="0">
+                <a:solidFill>
+                  <a:srgbClr val="0070C0"/>
+                </a:solidFill>
+              </a:rPr>
+              <a:t> - </a:t>
+            </a:r>
+            <a:r>
+              <a:rPr lang="en-US" b="1" dirty="0" err="1">
+                <a:solidFill>
+                  <a:srgbClr val="0070C0"/>
+                </a:solidFill>
+              </a:rPr>
+              <a:t>Exercícios</a:t>
+            </a:r>
+            <a:endParaRPr lang="en-US" b="1" dirty="0">
+              <a:solidFill>
+                <a:srgbClr val="0070C0"/>
+              </a:solidFill>
+            </a:endParaRPr>
+          </a:p>
+        </p:txBody>
+      </p:sp>
+      <p:sp>
+        <p:nvSpPr>
+          <p:cNvPr id="8" name="Text Placeholder 2"/>
+          <p:cNvSpPr>
+            <a:spLocks noGrp="1"/>
+          </p:cNvSpPr>
+          <p:nvPr>
+            <p:ph type="body" sz="half" idx="1"/>
+          </p:nvPr>
+        </p:nvSpPr>
+        <p:spPr>
+          <a:xfrm>
+            <a:off x="139472" y="1063230"/>
+            <a:ext cx="8865056" cy="3996450"/>
+          </a:xfrm>
+        </p:spPr>
+        <p:txBody>
+          <a:bodyPr>
+            <a:noAutofit/>
+          </a:bodyPr>
+          <a:lstStyle/>
+          <a:p>
+            <a:pPr marL="0" indent="0" algn="just">
+              <a:buNone/>
+            </a:pPr>
+            <a:r>
+              <a:rPr lang="pt-BR" sz="2400" dirty="0">
+                <a:latin typeface="Times New Roman" panose="02020603050405020304" pitchFamily="18" charset="0"/>
+                <a:cs typeface="Times New Roman" panose="02020603050405020304" pitchFamily="18" charset="0"/>
+              </a:rPr>
+              <a:t>Reproduzir </a:t>
+            </a:r>
+            <a:r>
+              <a:rPr lang="pt-BR" sz="2400" b="1" dirty="0">
+                <a:solidFill>
+                  <a:srgbClr val="FF0000"/>
+                </a:solidFill>
+                <a:latin typeface="Times New Roman" panose="02020603050405020304" pitchFamily="18" charset="0"/>
+                <a:cs typeface="Times New Roman" panose="02020603050405020304" pitchFamily="18" charset="0"/>
+              </a:rPr>
+              <a:t>projeto</a:t>
+            </a:r>
+            <a:r>
+              <a:rPr lang="pt-BR" sz="2400" dirty="0">
+                <a:solidFill>
+                  <a:srgbClr val="FF0000"/>
+                </a:solidFill>
+                <a:latin typeface="Times New Roman" panose="02020603050405020304" pitchFamily="18" charset="0"/>
+                <a:cs typeface="Times New Roman" panose="02020603050405020304" pitchFamily="18" charset="0"/>
+              </a:rPr>
+              <a:t> </a:t>
+            </a:r>
+            <a:r>
+              <a:rPr lang="pt-BR" sz="2400" b="1" dirty="0">
+                <a:solidFill>
+                  <a:srgbClr val="FF0000"/>
+                </a:solidFill>
+                <a:latin typeface="Times New Roman" panose="02020603050405020304" pitchFamily="18" charset="0"/>
+                <a:cs typeface="Times New Roman" panose="02020603050405020304" pitchFamily="18" charset="0"/>
+              </a:rPr>
+              <a:t>Arduino Uno R3 </a:t>
+            </a:r>
+            <a:r>
+              <a:rPr lang="pt-BR" sz="2400" dirty="0">
+                <a:latin typeface="Times New Roman" panose="02020603050405020304" pitchFamily="18" charset="0"/>
+                <a:cs typeface="Times New Roman" panose="02020603050405020304" pitchFamily="18" charset="0"/>
+              </a:rPr>
+              <a:t>para:</a:t>
+            </a:r>
+          </a:p>
+          <a:p>
+            <a:pPr marL="0" indent="0" algn="just">
+              <a:buNone/>
+            </a:pPr>
+            <a:endParaRPr lang="pt-BR" sz="2400" dirty="0">
+              <a:latin typeface="Times New Roman" panose="02020603050405020304" pitchFamily="18" charset="0"/>
+              <a:cs typeface="Times New Roman" panose="02020603050405020304" pitchFamily="18" charset="0"/>
+            </a:endParaRPr>
+          </a:p>
+          <a:p>
+            <a:pPr algn="just">
+              <a:buFontTx/>
+              <a:buChar char="-"/>
+            </a:pPr>
+            <a:r>
+              <a:rPr lang="pt-BR" sz="2400" b="1" dirty="0">
+                <a:latin typeface="Times New Roman" panose="02020603050405020304" pitchFamily="18" charset="0"/>
+                <a:cs typeface="Times New Roman" panose="02020603050405020304" pitchFamily="18" charset="0"/>
+              </a:rPr>
+              <a:t>Montagem do circuito para portas lógicas</a:t>
+            </a:r>
+          </a:p>
+          <a:p>
+            <a:pPr marL="0" indent="0" algn="just">
+              <a:buNone/>
+            </a:pPr>
+            <a:endParaRPr lang="pt-BR" sz="2400" dirty="0">
+              <a:latin typeface="Times New Roman" panose="02020603050405020304" pitchFamily="18" charset="0"/>
+              <a:cs typeface="Times New Roman" panose="02020603050405020304" pitchFamily="18" charset="0"/>
+            </a:endParaRPr>
+          </a:p>
+          <a:p>
+            <a:pPr marL="0" indent="0" algn="just">
+              <a:buNone/>
+            </a:pPr>
+            <a:r>
+              <a:rPr lang="pt-BR" sz="2400" dirty="0">
+                <a:latin typeface="Times New Roman" panose="02020603050405020304" pitchFamily="18" charset="0"/>
+                <a:cs typeface="Times New Roman" panose="02020603050405020304" pitchFamily="18" charset="0"/>
+              </a:rPr>
+              <a:t>	</a:t>
+            </a:r>
+            <a:r>
+              <a:rPr lang="pt-BR" sz="2400" dirty="0">
+                <a:solidFill>
+                  <a:schemeClr val="tx1"/>
+                </a:solidFill>
+                <a:latin typeface="Times New Roman" panose="02020603050405020304" pitchFamily="18" charset="0"/>
+                <a:cs typeface="Times New Roman" panose="02020603050405020304" pitchFamily="18" charset="0"/>
+                <a:hlinkClick r:id="rId3"/>
+              </a:rPr>
+              <a:t>https://www.makerhero.com/blog/introducao-as-portas-logicas/</a:t>
+            </a:r>
+            <a:endParaRPr lang="pt-BR" sz="2400" dirty="0">
+              <a:latin typeface="Times New Roman" panose="02020603050405020304" pitchFamily="18" charset="0"/>
+              <a:cs typeface="Times New Roman" panose="02020603050405020304" pitchFamily="18" charset="0"/>
+            </a:endParaRPr>
+          </a:p>
+        </p:txBody>
+      </p:sp>
+    </p:spTree>
+    <p:extLst>
+      <p:ext uri="{BB962C8B-B14F-4D97-AF65-F5344CB8AC3E}">
+        <p14:creationId xmlns:p14="http://schemas.microsoft.com/office/powerpoint/2010/main" val="3647834137"/>
+      </p:ext>
+    </p:extLst>
+  </p:cSld>
+  <p:clrMapOvr>
+    <a:masterClrMapping/>
+  </p:clrMapOvr>
+  <p:transition spd="med"/>
+</p:sld>
+</file>
+
+<file path=ppt/slides/slide3.xml><?xml version="1.0" encoding="utf-8"?>
+<p:sld xmlns:a="http://schemas.openxmlformats.org/drawingml/2006/main" xmlns:r="http://schemas.openxmlformats.org/officeDocument/2006/relationships" xmlns:p="http://schemas.openxmlformats.org/presentationml/2006/main">
+  <p:cSld>
+    <p:spTree>
+      <p:nvGrpSpPr>
+        <p:cNvPr id="1" name=""/>
+        <p:cNvGrpSpPr/>
+        <p:nvPr/>
+      </p:nvGrpSpPr>
+      <p:grpSpPr>
+        <a:xfrm>
+          <a:off x="0" y="0"/>
+          <a:ext cx="0" cy="0"/>
+          <a:chOff x="0" y="0"/>
+          <a:chExt cx="0" cy="0"/>
+        </a:xfrm>
+      </p:grpSpPr>
+      <p:sp>
+        <p:nvSpPr>
+          <p:cNvPr id="6" name="Title 1"/>
+          <p:cNvSpPr>
+            <a:spLocks noGrp="1"/>
+          </p:cNvSpPr>
+          <p:nvPr>
+            <p:ph type="title"/>
+          </p:nvPr>
+        </p:nvSpPr>
+        <p:spPr>
+          <a:xfrm>
+            <a:off x="457200" y="205980"/>
+            <a:ext cx="8229600" cy="857251"/>
+          </a:xfrm>
+        </p:spPr>
+        <p:txBody>
+          <a:bodyPr>
+            <a:normAutofit/>
+          </a:bodyPr>
+          <a:lstStyle/>
+          <a:p>
+            <a:r>
+              <a:rPr lang="en-US" b="1" dirty="0" err="1">
+                <a:solidFill>
+                  <a:srgbClr val="0070C0"/>
+                </a:solidFill>
+              </a:rPr>
+              <a:t>Periféricos</a:t>
+            </a:r>
+            <a:r>
+              <a:rPr lang="en-US" b="1" dirty="0">
+                <a:solidFill>
+                  <a:srgbClr val="0070C0"/>
+                </a:solidFill>
+              </a:rPr>
+              <a:t> </a:t>
+            </a:r>
+            <a:r>
+              <a:rPr lang="en-US" b="1" dirty="0" err="1">
+                <a:solidFill>
+                  <a:srgbClr val="0070C0"/>
+                </a:solidFill>
+              </a:rPr>
+              <a:t>Integrados</a:t>
+            </a:r>
+            <a:endParaRPr lang="en-US" b="1" dirty="0">
+              <a:solidFill>
+                <a:srgbClr val="0070C0"/>
+              </a:solidFill>
+            </a:endParaRPr>
+          </a:p>
+        </p:txBody>
+      </p:sp>
+      <p:sp>
+        <p:nvSpPr>
+          <p:cNvPr id="8" name="Text Placeholder 2"/>
+          <p:cNvSpPr>
+            <a:spLocks noGrp="1"/>
+          </p:cNvSpPr>
+          <p:nvPr>
+            <p:ph type="body" sz="half" idx="1"/>
+          </p:nvPr>
+        </p:nvSpPr>
+        <p:spPr>
+          <a:xfrm>
+            <a:off x="142865" y="1053846"/>
+            <a:ext cx="8865056" cy="3883674"/>
+          </a:xfrm>
+        </p:spPr>
+        <p:txBody>
+          <a:bodyPr>
+            <a:noAutofit/>
+          </a:bodyPr>
+          <a:lstStyle/>
+          <a:p>
+            <a:pPr marL="0" indent="0" algn="just">
+              <a:buNone/>
+            </a:pPr>
+            <a:r>
+              <a:rPr lang="pt-BR" sz="2000" dirty="0">
+                <a:solidFill>
+                  <a:schemeClr val="tx1"/>
+                </a:solidFill>
+                <a:latin typeface="Times New Roman" panose="02020603050405020304" pitchFamily="18" charset="0"/>
+                <a:cs typeface="Times New Roman" panose="02020603050405020304" pitchFamily="18" charset="0"/>
+              </a:rPr>
+              <a:t>São </a:t>
+            </a:r>
+            <a:r>
+              <a:rPr lang="pt-BR" sz="2000" b="1" dirty="0">
+                <a:solidFill>
+                  <a:srgbClr val="FF0000"/>
+                </a:solidFill>
+                <a:latin typeface="Times New Roman" panose="02020603050405020304" pitchFamily="18" charset="0"/>
+                <a:cs typeface="Times New Roman" panose="02020603050405020304" pitchFamily="18" charset="0"/>
+              </a:rPr>
+              <a:t>placas ou aparelhos</a:t>
+            </a:r>
+            <a:r>
+              <a:rPr lang="pt-BR" sz="2000" dirty="0">
+                <a:solidFill>
+                  <a:schemeClr val="tx1"/>
+                </a:solidFill>
+                <a:latin typeface="Times New Roman" panose="02020603050405020304" pitchFamily="18" charset="0"/>
+                <a:cs typeface="Times New Roman" panose="02020603050405020304" pitchFamily="18" charset="0"/>
+              </a:rPr>
+              <a:t> que recebem ou enviam informações para o computador. Alguns exemplos de periféricos são: Impressoras, Digitalizadores, leitores de CD – DVD, mouses, teclados, câmeras, etc.</a:t>
+            </a:r>
+          </a:p>
+          <a:p>
+            <a:pPr marL="0" indent="0" algn="just">
+              <a:buNone/>
+            </a:pPr>
+            <a:endParaRPr lang="pt-BR" sz="2000" dirty="0">
+              <a:solidFill>
+                <a:schemeClr val="tx1"/>
+              </a:solidFill>
+              <a:latin typeface="Times New Roman" panose="02020603050405020304" pitchFamily="18" charset="0"/>
+              <a:cs typeface="Times New Roman" panose="02020603050405020304" pitchFamily="18" charset="0"/>
+            </a:endParaRPr>
+          </a:p>
+          <a:p>
+            <a:pPr marL="0" indent="0" algn="just">
+              <a:buNone/>
+            </a:pPr>
+            <a:r>
+              <a:rPr lang="pt-BR" sz="2000" dirty="0">
+                <a:solidFill>
+                  <a:schemeClr val="tx1"/>
+                </a:solidFill>
+                <a:latin typeface="Times New Roman" panose="02020603050405020304" pitchFamily="18" charset="0"/>
+                <a:cs typeface="Times New Roman" panose="02020603050405020304" pitchFamily="18" charset="0"/>
+              </a:rPr>
+              <a:t>Um </a:t>
+            </a:r>
+            <a:r>
+              <a:rPr lang="pt-BR" sz="2000" b="1" dirty="0">
+                <a:solidFill>
+                  <a:schemeClr val="tx1"/>
+                </a:solidFill>
+                <a:latin typeface="Times New Roman" panose="02020603050405020304" pitchFamily="18" charset="0"/>
+                <a:cs typeface="Times New Roman" panose="02020603050405020304" pitchFamily="18" charset="0"/>
+              </a:rPr>
+              <a:t>microcontrolador</a:t>
+            </a:r>
+            <a:r>
+              <a:rPr lang="pt-BR" sz="2000" dirty="0">
+                <a:solidFill>
+                  <a:schemeClr val="tx1"/>
+                </a:solidFill>
+                <a:latin typeface="Times New Roman" panose="02020603050405020304" pitchFamily="18" charset="0"/>
+                <a:cs typeface="Times New Roman" panose="02020603050405020304" pitchFamily="18" charset="0"/>
+              </a:rPr>
+              <a:t> é, em última análise, um </a:t>
+            </a:r>
+            <a:r>
+              <a:rPr lang="pt-BR" sz="2000" b="1" dirty="0">
+                <a:solidFill>
+                  <a:srgbClr val="FF0000"/>
+                </a:solidFill>
+                <a:latin typeface="Times New Roman" panose="02020603050405020304" pitchFamily="18" charset="0"/>
+                <a:cs typeface="Times New Roman" panose="02020603050405020304" pitchFamily="18" charset="0"/>
+              </a:rPr>
+              <a:t>computador em um único chip (</a:t>
+            </a:r>
+            <a:r>
+              <a:rPr lang="pt-BR" sz="2000" b="1" dirty="0" err="1">
+                <a:solidFill>
+                  <a:srgbClr val="FF0000"/>
+                </a:solidFill>
+                <a:latin typeface="Times New Roman" panose="02020603050405020304" pitchFamily="18" charset="0"/>
+                <a:cs typeface="Times New Roman" panose="02020603050405020304" pitchFamily="18" charset="0"/>
+              </a:rPr>
+              <a:t>SoC</a:t>
+            </a:r>
+            <a:r>
+              <a:rPr lang="pt-BR" sz="2000" b="1" dirty="0">
+                <a:solidFill>
+                  <a:srgbClr val="FF0000"/>
+                </a:solidFill>
+                <a:latin typeface="Times New Roman" panose="02020603050405020304" pitchFamily="18" charset="0"/>
+                <a:cs typeface="Times New Roman" panose="02020603050405020304" pitchFamily="18" charset="0"/>
+              </a:rPr>
+              <a:t>)</a:t>
+            </a:r>
+            <a:r>
+              <a:rPr lang="pt-BR" sz="2000" dirty="0">
+                <a:solidFill>
+                  <a:schemeClr val="tx1"/>
+                </a:solidFill>
+                <a:latin typeface="Times New Roman" panose="02020603050405020304" pitchFamily="18" charset="0"/>
+                <a:cs typeface="Times New Roman" panose="02020603050405020304" pitchFamily="18" charset="0"/>
+              </a:rPr>
+              <a:t>.</a:t>
+            </a:r>
+          </a:p>
+          <a:p>
+            <a:pPr marL="0" indent="0" algn="just">
+              <a:buNone/>
+            </a:pPr>
+            <a:endParaRPr lang="pt-BR" sz="2000" dirty="0">
+              <a:solidFill>
+                <a:schemeClr val="tx1"/>
+              </a:solidFill>
+              <a:latin typeface="Times New Roman" panose="02020603050405020304" pitchFamily="18" charset="0"/>
+              <a:cs typeface="Times New Roman" panose="02020603050405020304" pitchFamily="18" charset="0"/>
+            </a:endParaRPr>
+          </a:p>
+          <a:p>
+            <a:pPr marL="0" indent="0" algn="just">
+              <a:buNone/>
+            </a:pPr>
+            <a:r>
+              <a:rPr lang="pt-BR" sz="2000" dirty="0">
+                <a:solidFill>
+                  <a:schemeClr val="tx1"/>
+                </a:solidFill>
+                <a:latin typeface="Times New Roman" panose="02020603050405020304" pitchFamily="18" charset="0"/>
+                <a:cs typeface="Times New Roman" panose="02020603050405020304" pitchFamily="18" charset="0"/>
+              </a:rPr>
+              <a:t>Num mesmo </a:t>
+            </a:r>
+            <a:r>
+              <a:rPr lang="pt-BR" sz="2000" b="1" dirty="0">
+                <a:solidFill>
+                  <a:schemeClr val="tx1"/>
+                </a:solidFill>
+                <a:latin typeface="Times New Roman" panose="02020603050405020304" pitchFamily="18" charset="0"/>
+                <a:cs typeface="Times New Roman" panose="02020603050405020304" pitchFamily="18" charset="0"/>
+              </a:rPr>
+              <a:t>chip estão integrados CPU/GPU</a:t>
+            </a:r>
+            <a:r>
+              <a:rPr lang="pt-BR" sz="2000" dirty="0">
+                <a:solidFill>
+                  <a:schemeClr val="tx1"/>
+                </a:solidFill>
+                <a:latin typeface="Times New Roman" panose="02020603050405020304" pitchFamily="18" charset="0"/>
+                <a:cs typeface="Times New Roman" panose="02020603050405020304" pitchFamily="18" charset="0"/>
+              </a:rPr>
+              <a:t>, circuitos auxiliares (</a:t>
+            </a:r>
+            <a:r>
+              <a:rPr lang="pt-BR" sz="2000" b="1" dirty="0">
+                <a:solidFill>
+                  <a:schemeClr val="tx1"/>
+                </a:solidFill>
+                <a:latin typeface="Times New Roman" panose="02020603050405020304" pitchFamily="18" charset="0"/>
+                <a:cs typeface="Times New Roman" panose="02020603050405020304" pitchFamily="18" charset="0"/>
+              </a:rPr>
+              <a:t>periféricos I/O</a:t>
+            </a:r>
+            <a:r>
+              <a:rPr lang="pt-BR" sz="2000" dirty="0">
+                <a:solidFill>
+                  <a:schemeClr val="tx1"/>
+                </a:solidFill>
+                <a:latin typeface="Times New Roman" panose="02020603050405020304" pitchFamily="18" charset="0"/>
+                <a:cs typeface="Times New Roman" panose="02020603050405020304" pitchFamily="18" charset="0"/>
+              </a:rPr>
+              <a:t>) como memória de programa, memória de dados, interface de comunicação serial, temporizadores/contadores, </a:t>
+            </a:r>
+            <a:r>
+              <a:rPr lang="pt-BR" sz="2000" b="1" dirty="0">
+                <a:solidFill>
+                  <a:srgbClr val="FF0000"/>
+                </a:solidFill>
+                <a:latin typeface="Times New Roman" panose="02020603050405020304" pitchFamily="18" charset="0"/>
+                <a:cs typeface="Times New Roman" panose="02020603050405020304" pitchFamily="18" charset="0"/>
+              </a:rPr>
+              <a:t>portas de I/O</a:t>
+            </a:r>
+            <a:r>
+              <a:rPr lang="pt-BR" sz="2000" dirty="0">
+                <a:solidFill>
+                  <a:schemeClr val="tx1"/>
+                </a:solidFill>
+                <a:latin typeface="Times New Roman" panose="02020603050405020304" pitchFamily="18" charset="0"/>
+                <a:cs typeface="Times New Roman" panose="02020603050405020304" pitchFamily="18" charset="0"/>
+              </a:rPr>
+              <a:t>, </a:t>
+            </a:r>
+            <a:r>
+              <a:rPr lang="pt-BR" sz="2000" b="1" dirty="0">
+                <a:solidFill>
+                  <a:srgbClr val="FF0000"/>
+                </a:solidFill>
+                <a:latin typeface="Times New Roman" panose="02020603050405020304" pitchFamily="18" charset="0"/>
+                <a:cs typeface="Times New Roman" panose="02020603050405020304" pitchFamily="18" charset="0"/>
+              </a:rPr>
+              <a:t>conversores</a:t>
+            </a:r>
+            <a:r>
+              <a:rPr lang="pt-BR" sz="2000" dirty="0">
+                <a:solidFill>
+                  <a:schemeClr val="tx1"/>
+                </a:solidFill>
+                <a:latin typeface="Times New Roman" panose="02020603050405020304" pitchFamily="18" charset="0"/>
+                <a:cs typeface="Times New Roman" panose="02020603050405020304" pitchFamily="18" charset="0"/>
+              </a:rPr>
+              <a:t>, circuito de </a:t>
+            </a:r>
+            <a:r>
+              <a:rPr lang="pt-BR" sz="2000" dirty="0" err="1">
+                <a:solidFill>
+                  <a:schemeClr val="tx1"/>
+                </a:solidFill>
+                <a:latin typeface="Times New Roman" panose="02020603050405020304" pitchFamily="18" charset="0"/>
+                <a:cs typeface="Times New Roman" panose="02020603050405020304" pitchFamily="18" charset="0"/>
+              </a:rPr>
+              <a:t>clock</a:t>
+            </a:r>
+            <a:r>
+              <a:rPr lang="pt-BR" sz="2000" dirty="0">
+                <a:solidFill>
+                  <a:schemeClr val="tx1"/>
+                </a:solidFill>
+                <a:latin typeface="Times New Roman" panose="02020603050405020304" pitchFamily="18" charset="0"/>
+                <a:cs typeface="Times New Roman" panose="02020603050405020304" pitchFamily="18" charset="0"/>
+              </a:rPr>
+              <a:t>, </a:t>
+            </a:r>
+            <a:r>
+              <a:rPr lang="pt-BR" sz="2000" dirty="0" err="1">
+                <a:solidFill>
+                  <a:schemeClr val="tx1"/>
+                </a:solidFill>
+                <a:latin typeface="Times New Roman" panose="02020603050405020304" pitchFamily="18" charset="0"/>
+                <a:cs typeface="Times New Roman" panose="02020603050405020304" pitchFamily="18" charset="0"/>
+              </a:rPr>
+              <a:t>etc</a:t>
+            </a:r>
+            <a:endParaRPr lang="pt-BR" sz="2000" dirty="0">
+              <a:solidFill>
+                <a:schemeClr val="tx1"/>
+              </a:solidFill>
+              <a:latin typeface="Times New Roman" panose="02020603050405020304" pitchFamily="18" charset="0"/>
+              <a:cs typeface="Times New Roman" panose="02020603050405020304" pitchFamily="18" charset="0"/>
+            </a:endParaRPr>
+          </a:p>
+        </p:txBody>
+      </p:sp>
+    </p:spTree>
+    <p:extLst>
+      <p:ext uri="{BB962C8B-B14F-4D97-AF65-F5344CB8AC3E}">
+        <p14:creationId xmlns:p14="http://schemas.microsoft.com/office/powerpoint/2010/main" val="4046896417"/>
+      </p:ext>
+    </p:extLst>
+  </p:cSld>
+  <p:clrMapOvr>
+    <a:masterClrMapping/>
+  </p:clrMapOvr>
+  <p:transition spd="med"/>
+</p:sld>
+</file>
+
+<file path=ppt/slides/slide30.xml><?xml version="1.0" encoding="utf-8"?>
+<p:sld xmlns:a="http://schemas.openxmlformats.org/drawingml/2006/main" xmlns:r="http://schemas.openxmlformats.org/officeDocument/2006/relationships" xmlns:p="http://schemas.openxmlformats.org/presentationml/2006/main">
+  <p:cSld>
+    <p:spTree>
+      <p:nvGrpSpPr>
+        <p:cNvPr id="1" name=""/>
+        <p:cNvGrpSpPr/>
+        <p:nvPr/>
+      </p:nvGrpSpPr>
+      <p:grpSpPr>
+        <a:xfrm>
+          <a:off x="0" y="0"/>
+          <a:ext cx="0" cy="0"/>
+          <a:chOff x="0" y="0"/>
+          <a:chExt cx="0" cy="0"/>
+        </a:xfrm>
+      </p:grpSpPr>
+      <p:sp>
+        <p:nvSpPr>
+          <p:cNvPr id="6" name="Title 1"/>
+          <p:cNvSpPr>
+            <a:spLocks noGrp="1"/>
+          </p:cNvSpPr>
+          <p:nvPr>
+            <p:ph type="title"/>
+          </p:nvPr>
+        </p:nvSpPr>
+        <p:spPr>
+          <a:xfrm>
+            <a:off x="457200" y="205980"/>
+            <a:ext cx="8229600" cy="857251"/>
+          </a:xfrm>
+        </p:spPr>
+        <p:txBody>
+          <a:bodyPr>
+            <a:normAutofit/>
+          </a:bodyPr>
+          <a:lstStyle/>
+          <a:p>
+            <a:r>
+              <a:rPr lang="en-US" b="1" dirty="0" err="1">
+                <a:solidFill>
+                  <a:srgbClr val="0070C0"/>
+                </a:solidFill>
+              </a:rPr>
               <a:t>Referências</a:t>
             </a:r>
             <a:r>
@@ -11342,7 +12827,7 @@
 </p:sld>
 </file>
 
-<file path=ppt/slides/slide29.xml><?xml version="1.0" encoding="utf-8"?>
+<file path=ppt/slides/slide31.xml><?xml version="1.0" encoding="utf-8"?>
 <p:sld xmlns:a="http://schemas.openxmlformats.org/drawingml/2006/main" xmlns:r="http://schemas.openxmlformats.org/officeDocument/2006/relationships" xmlns:p="http://schemas.openxmlformats.org/presentationml/2006/main">
   <p:cSld>
     <p:spTree>
@@ -11789,380 +13274,6 @@
         </p:spPr>
       </p:pic>
     </p:spTree>
-  </p:cSld>
-  <p:clrMapOvr>
-    <a:masterClrMapping/>
-  </p:clrMapOvr>
-  <p:transition spd="med"/>
-</p:sld>
-</file>
-
-<file path=ppt/slides/slide3.xml><?xml version="1.0" encoding="utf-8"?>
-<p:sld xmlns:a="http://schemas.openxmlformats.org/drawingml/2006/main" xmlns:r="http://schemas.openxmlformats.org/officeDocument/2006/relationships" xmlns:p="http://schemas.openxmlformats.org/presentationml/2006/main">
-  <p:cSld>
-    <p:spTree>
-      <p:nvGrpSpPr>
-        <p:cNvPr id="1" name=""/>
-        <p:cNvGrpSpPr/>
-        <p:nvPr/>
-      </p:nvGrpSpPr>
-      <p:grpSpPr>
-        <a:xfrm>
-          <a:off x="0" y="0"/>
-          <a:ext cx="0" cy="0"/>
-          <a:chOff x="0" y="0"/>
-          <a:chExt cx="0" cy="0"/>
-        </a:xfrm>
-      </p:grpSpPr>
-      <p:sp>
-        <p:nvSpPr>
-          <p:cNvPr id="6" name="Title 1"/>
-          <p:cNvSpPr>
-            <a:spLocks noGrp="1"/>
-          </p:cNvSpPr>
-          <p:nvPr>
-            <p:ph type="title"/>
-          </p:nvPr>
-        </p:nvSpPr>
-        <p:spPr>
-          <a:xfrm>
-            <a:off x="457200" y="205980"/>
-            <a:ext cx="8229600" cy="857251"/>
-          </a:xfrm>
-        </p:spPr>
-        <p:txBody>
-          <a:bodyPr>
-            <a:normAutofit/>
-          </a:bodyPr>
-          <a:lstStyle/>
-          <a:p>
-            <a:r>
-              <a:rPr lang="en-US" b="1" dirty="0" err="1">
-                <a:solidFill>
-                  <a:srgbClr val="0070C0"/>
-                </a:solidFill>
-              </a:rPr>
-              <a:t>Periféricos</a:t>
-            </a:r>
-            <a:r>
-              <a:rPr lang="en-US" b="1" dirty="0">
-                <a:solidFill>
-                  <a:srgbClr val="0070C0"/>
-                </a:solidFill>
-              </a:rPr>
-              <a:t> </a:t>
-            </a:r>
-            <a:r>
-              <a:rPr lang="en-US" b="1" dirty="0" err="1">
-                <a:solidFill>
-                  <a:srgbClr val="0070C0"/>
-                </a:solidFill>
-              </a:rPr>
-              <a:t>Integrados</a:t>
-            </a:r>
-            <a:endParaRPr lang="en-US" b="1" dirty="0">
-              <a:solidFill>
-                <a:srgbClr val="0070C0"/>
-              </a:solidFill>
-            </a:endParaRPr>
-          </a:p>
-        </p:txBody>
-      </p:sp>
-      <p:sp>
-        <p:nvSpPr>
-          <p:cNvPr id="8" name="Text Placeholder 2"/>
-          <p:cNvSpPr>
-            <a:spLocks noGrp="1"/>
-          </p:cNvSpPr>
-          <p:nvPr>
-            <p:ph type="body" sz="half" idx="1"/>
-          </p:nvPr>
-        </p:nvSpPr>
-        <p:spPr>
-          <a:xfrm>
-            <a:off x="142865" y="1053846"/>
-            <a:ext cx="8865056" cy="3883674"/>
-          </a:xfrm>
-        </p:spPr>
-        <p:txBody>
-          <a:bodyPr>
-            <a:noAutofit/>
-          </a:bodyPr>
-          <a:lstStyle/>
-          <a:p>
-            <a:pPr marL="0" indent="0" algn="just">
-              <a:buNone/>
-            </a:pPr>
-            <a:r>
-              <a:rPr lang="pt-BR" sz="2000" dirty="0">
-                <a:solidFill>
-                  <a:schemeClr val="tx1"/>
-                </a:solidFill>
-                <a:latin typeface="Times New Roman" panose="02020603050405020304" pitchFamily="18" charset="0"/>
-                <a:cs typeface="Times New Roman" panose="02020603050405020304" pitchFamily="18" charset="0"/>
-              </a:rPr>
-              <a:t>São </a:t>
-            </a:r>
-            <a:r>
-              <a:rPr lang="pt-BR" sz="2000" b="1" dirty="0">
-                <a:solidFill>
-                  <a:srgbClr val="FF0000"/>
-                </a:solidFill>
-                <a:latin typeface="Times New Roman" panose="02020603050405020304" pitchFamily="18" charset="0"/>
-                <a:cs typeface="Times New Roman" panose="02020603050405020304" pitchFamily="18" charset="0"/>
-              </a:rPr>
-              <a:t>placas ou aparelhos</a:t>
-            </a:r>
-            <a:r>
-              <a:rPr lang="pt-BR" sz="2000" dirty="0">
-                <a:solidFill>
-                  <a:schemeClr val="tx1"/>
-                </a:solidFill>
-                <a:latin typeface="Times New Roman" panose="02020603050405020304" pitchFamily="18" charset="0"/>
-                <a:cs typeface="Times New Roman" panose="02020603050405020304" pitchFamily="18" charset="0"/>
-              </a:rPr>
-              <a:t> que recebem ou enviam informações para o computador. Alguns exemplos de periféricos são: Impressoras, Digitalizadores, leitores de CD – DVD, mouses, teclados, câmeras, etc.</a:t>
-            </a:r>
-          </a:p>
-          <a:p>
-            <a:pPr marL="0" indent="0" algn="just">
-              <a:buNone/>
-            </a:pPr>
-            <a:endParaRPr lang="pt-BR" sz="2000" dirty="0">
-              <a:solidFill>
-                <a:schemeClr val="tx1"/>
-              </a:solidFill>
-              <a:latin typeface="Times New Roman" panose="02020603050405020304" pitchFamily="18" charset="0"/>
-              <a:cs typeface="Times New Roman" panose="02020603050405020304" pitchFamily="18" charset="0"/>
-            </a:endParaRPr>
-          </a:p>
-          <a:p>
-            <a:pPr marL="0" indent="0" algn="just">
-              <a:buNone/>
-            </a:pPr>
-            <a:r>
-              <a:rPr lang="pt-BR" sz="2000" dirty="0">
-                <a:solidFill>
-                  <a:schemeClr val="tx1"/>
-                </a:solidFill>
-                <a:latin typeface="Times New Roman" panose="02020603050405020304" pitchFamily="18" charset="0"/>
-                <a:cs typeface="Times New Roman" panose="02020603050405020304" pitchFamily="18" charset="0"/>
-              </a:rPr>
-              <a:t>Um </a:t>
-            </a:r>
-            <a:r>
-              <a:rPr lang="pt-BR" sz="2000" b="1" dirty="0">
-                <a:solidFill>
-                  <a:schemeClr val="tx1"/>
-                </a:solidFill>
-                <a:latin typeface="Times New Roman" panose="02020603050405020304" pitchFamily="18" charset="0"/>
-                <a:cs typeface="Times New Roman" panose="02020603050405020304" pitchFamily="18" charset="0"/>
-              </a:rPr>
-              <a:t>microcontrolador</a:t>
-            </a:r>
-            <a:r>
-              <a:rPr lang="pt-BR" sz="2000" dirty="0">
-                <a:solidFill>
-                  <a:schemeClr val="tx1"/>
-                </a:solidFill>
-                <a:latin typeface="Times New Roman" panose="02020603050405020304" pitchFamily="18" charset="0"/>
-                <a:cs typeface="Times New Roman" panose="02020603050405020304" pitchFamily="18" charset="0"/>
-              </a:rPr>
-              <a:t> é, em última análise, um </a:t>
-            </a:r>
-            <a:r>
-              <a:rPr lang="pt-BR" sz="2000" b="1" dirty="0">
-                <a:solidFill>
-                  <a:srgbClr val="FF0000"/>
-                </a:solidFill>
-                <a:latin typeface="Times New Roman" panose="02020603050405020304" pitchFamily="18" charset="0"/>
-                <a:cs typeface="Times New Roman" panose="02020603050405020304" pitchFamily="18" charset="0"/>
-              </a:rPr>
-              <a:t>computador em um único chip (</a:t>
-            </a:r>
-            <a:r>
-              <a:rPr lang="pt-BR" sz="2000" b="1" dirty="0" err="1">
-                <a:solidFill>
-                  <a:srgbClr val="FF0000"/>
-                </a:solidFill>
-                <a:latin typeface="Times New Roman" panose="02020603050405020304" pitchFamily="18" charset="0"/>
-                <a:cs typeface="Times New Roman" panose="02020603050405020304" pitchFamily="18" charset="0"/>
-              </a:rPr>
-              <a:t>SoC</a:t>
-            </a:r>
-            <a:r>
-              <a:rPr lang="pt-BR" sz="2000" b="1" dirty="0">
-                <a:solidFill>
-                  <a:srgbClr val="FF0000"/>
-                </a:solidFill>
-                <a:latin typeface="Times New Roman" panose="02020603050405020304" pitchFamily="18" charset="0"/>
-                <a:cs typeface="Times New Roman" panose="02020603050405020304" pitchFamily="18" charset="0"/>
-              </a:rPr>
-              <a:t>)</a:t>
-            </a:r>
-            <a:r>
-              <a:rPr lang="pt-BR" sz="2000" dirty="0">
-                <a:solidFill>
-                  <a:schemeClr val="tx1"/>
-                </a:solidFill>
-                <a:latin typeface="Times New Roman" panose="02020603050405020304" pitchFamily="18" charset="0"/>
-                <a:cs typeface="Times New Roman" panose="02020603050405020304" pitchFamily="18" charset="0"/>
-              </a:rPr>
-              <a:t>.</a:t>
-            </a:r>
-          </a:p>
-          <a:p>
-            <a:pPr marL="0" indent="0" algn="just">
-              <a:buNone/>
-            </a:pPr>
-            <a:endParaRPr lang="pt-BR" sz="2000" dirty="0">
-              <a:solidFill>
-                <a:schemeClr val="tx1"/>
-              </a:solidFill>
-              <a:latin typeface="Times New Roman" panose="02020603050405020304" pitchFamily="18" charset="0"/>
-              <a:cs typeface="Times New Roman" panose="02020603050405020304" pitchFamily="18" charset="0"/>
-            </a:endParaRPr>
-          </a:p>
-          <a:p>
-            <a:pPr marL="0" indent="0" algn="just">
-              <a:buNone/>
-            </a:pPr>
-            <a:r>
-              <a:rPr lang="pt-BR" sz="2000" dirty="0">
-                <a:solidFill>
-                  <a:schemeClr val="tx1"/>
-                </a:solidFill>
-                <a:latin typeface="Times New Roman" panose="02020603050405020304" pitchFamily="18" charset="0"/>
-                <a:cs typeface="Times New Roman" panose="02020603050405020304" pitchFamily="18" charset="0"/>
-              </a:rPr>
-              <a:t>Num mesmo </a:t>
-            </a:r>
-            <a:r>
-              <a:rPr lang="pt-BR" sz="2000" b="1" dirty="0">
-                <a:solidFill>
-                  <a:schemeClr val="tx1"/>
-                </a:solidFill>
-                <a:latin typeface="Times New Roman" panose="02020603050405020304" pitchFamily="18" charset="0"/>
-                <a:cs typeface="Times New Roman" panose="02020603050405020304" pitchFamily="18" charset="0"/>
-              </a:rPr>
-              <a:t>chip estão integrados CPU/GPU</a:t>
-            </a:r>
-            <a:r>
-              <a:rPr lang="pt-BR" sz="2000" dirty="0">
-                <a:solidFill>
-                  <a:schemeClr val="tx1"/>
-                </a:solidFill>
-                <a:latin typeface="Times New Roman" panose="02020603050405020304" pitchFamily="18" charset="0"/>
-                <a:cs typeface="Times New Roman" panose="02020603050405020304" pitchFamily="18" charset="0"/>
-              </a:rPr>
-              <a:t>, circuitos auxiliares (</a:t>
-            </a:r>
-            <a:r>
-              <a:rPr lang="pt-BR" sz="2000" b="1" dirty="0">
-                <a:solidFill>
-                  <a:schemeClr val="tx1"/>
-                </a:solidFill>
-                <a:latin typeface="Times New Roman" panose="02020603050405020304" pitchFamily="18" charset="0"/>
-                <a:cs typeface="Times New Roman" panose="02020603050405020304" pitchFamily="18" charset="0"/>
-              </a:rPr>
-              <a:t>periféricos I/O</a:t>
-            </a:r>
-            <a:r>
-              <a:rPr lang="pt-BR" sz="2000" dirty="0">
-                <a:solidFill>
-                  <a:schemeClr val="tx1"/>
-                </a:solidFill>
-                <a:latin typeface="Times New Roman" panose="02020603050405020304" pitchFamily="18" charset="0"/>
-                <a:cs typeface="Times New Roman" panose="02020603050405020304" pitchFamily="18" charset="0"/>
-              </a:rPr>
-              <a:t>) como memória de programa, memória de dados, interface de comunicação serial, temporizadores/contadores, </a:t>
-            </a:r>
-            <a:r>
-              <a:rPr lang="pt-BR" sz="2000" b="1" dirty="0">
-                <a:solidFill>
-                  <a:srgbClr val="FF0000"/>
-                </a:solidFill>
-                <a:latin typeface="Times New Roman" panose="02020603050405020304" pitchFamily="18" charset="0"/>
-                <a:cs typeface="Times New Roman" panose="02020603050405020304" pitchFamily="18" charset="0"/>
-              </a:rPr>
-              <a:t>portas de I/O</a:t>
-            </a:r>
-            <a:r>
-              <a:rPr lang="pt-BR" sz="2000" dirty="0">
-                <a:solidFill>
-                  <a:schemeClr val="tx1"/>
-                </a:solidFill>
-                <a:latin typeface="Times New Roman" panose="02020603050405020304" pitchFamily="18" charset="0"/>
-                <a:cs typeface="Times New Roman" panose="02020603050405020304" pitchFamily="18" charset="0"/>
-              </a:rPr>
-              <a:t>, </a:t>
-            </a:r>
-            <a:r>
-              <a:rPr lang="pt-BR" sz="2000" b="1" dirty="0">
-                <a:solidFill>
-                  <a:srgbClr val="FF0000"/>
-                </a:solidFill>
-                <a:latin typeface="Times New Roman" panose="02020603050405020304" pitchFamily="18" charset="0"/>
-                <a:cs typeface="Times New Roman" panose="02020603050405020304" pitchFamily="18" charset="0"/>
-              </a:rPr>
-              <a:t>conversores</a:t>
-            </a:r>
-            <a:r>
-              <a:rPr lang="pt-BR" sz="2000" dirty="0">
-                <a:solidFill>
-                  <a:schemeClr val="tx1"/>
-                </a:solidFill>
-                <a:latin typeface="Times New Roman" panose="02020603050405020304" pitchFamily="18" charset="0"/>
-                <a:cs typeface="Times New Roman" panose="02020603050405020304" pitchFamily="18" charset="0"/>
-              </a:rPr>
-              <a:t>, circuito de </a:t>
-            </a:r>
-            <a:r>
-              <a:rPr lang="pt-BR" sz="2000" dirty="0" err="1">
-                <a:solidFill>
-                  <a:schemeClr val="tx1"/>
-                </a:solidFill>
-                <a:latin typeface="Times New Roman" panose="02020603050405020304" pitchFamily="18" charset="0"/>
-                <a:cs typeface="Times New Roman" panose="02020603050405020304" pitchFamily="18" charset="0"/>
-              </a:rPr>
-              <a:t>clock</a:t>
-            </a:r>
-            <a:r>
-              <a:rPr lang="pt-BR" sz="2000" dirty="0">
-                <a:solidFill>
-                  <a:schemeClr val="tx1"/>
-                </a:solidFill>
-                <a:latin typeface="Times New Roman" panose="02020603050405020304" pitchFamily="18" charset="0"/>
-                <a:cs typeface="Times New Roman" panose="02020603050405020304" pitchFamily="18" charset="0"/>
-              </a:rPr>
-              <a:t>, </a:t>
-            </a:r>
-            <a:r>
-              <a:rPr lang="pt-BR" sz="2000" dirty="0" err="1">
-                <a:solidFill>
-                  <a:schemeClr val="tx1"/>
-                </a:solidFill>
-                <a:latin typeface="Times New Roman" panose="02020603050405020304" pitchFamily="18" charset="0"/>
-                <a:cs typeface="Times New Roman" panose="02020603050405020304" pitchFamily="18" charset="0"/>
-              </a:rPr>
-              <a:t>etc</a:t>
-            </a:r>
-            <a:endParaRPr lang="pt-BR" sz="2000" dirty="0">
-              <a:solidFill>
-                <a:schemeClr val="tx1"/>
-              </a:solidFill>
-              <a:latin typeface="Times New Roman" panose="02020603050405020304" pitchFamily="18" charset="0"/>
-              <a:cs typeface="Times New Roman" panose="02020603050405020304" pitchFamily="18" charset="0"/>
-            </a:endParaRPr>
-          </a:p>
-        </p:txBody>
-      </p:sp>
-    </p:spTree>
-    <p:extLst>
-      <p:ext uri="{BB962C8B-B14F-4D97-AF65-F5344CB8AC3E}">
-        <p14:creationId xmlns:p14="http://schemas.microsoft.com/office/powerpoint/2010/main" val="4046896417"/>
-      </p:ext>
-    </p:extLst>
   </p:cSld>
   <p:clrMapOvr>
     <a:masterClrMapping/>

</xml_diff>

<commit_message>
Aula 05 Microcont- ajuste 20042023
</commit_message>
<xml_diff>
--- a/01 Classes/Aula 05 - Programação Microcontroladores - Periféricos Integrados - Portas e Conversores.pptx
+++ b/01 Classes/Aula 05 - Programação Microcontroladores - Periféricos Integrados - Portas e Conversores.pptx
@@ -6797,7 +6797,7 @@
                 <a:latin typeface="Times New Roman" panose="02020603050405020304" pitchFamily="18" charset="0"/>
                 <a:cs typeface="Times New Roman" panose="02020603050405020304" pitchFamily="18" charset="0"/>
               </a:rPr>
-              <a:t>USB;</a:t>
+              <a:t>USB</a:t>
             </a:r>
           </a:p>
           <a:p>
@@ -6805,46 +6805,13 @@
               <a:buFont typeface="Wingdings" panose="05000000000000000000" pitchFamily="2" charset="2"/>
               <a:buChar char="§"/>
             </a:pPr>
-            <a:r>
-              <a:rPr lang="pt-BR" sz="2000" dirty="0" err="1">
-                <a:solidFill>
-                  <a:schemeClr val="tx1"/>
-                </a:solidFill>
-                <a:latin typeface="Times New Roman" panose="02020603050405020304" pitchFamily="18" charset="0"/>
-                <a:cs typeface="Times New Roman" panose="02020603050405020304" pitchFamily="18" charset="0"/>
-              </a:rPr>
-              <a:t>IrDA</a:t>
-            </a:r>
-            <a:r>
-              <a:rPr lang="pt-BR" sz="2000" dirty="0">
-                <a:solidFill>
-                  <a:schemeClr val="tx1"/>
-                </a:solidFill>
-                <a:latin typeface="Times New Roman" panose="02020603050405020304" pitchFamily="18" charset="0"/>
-                <a:cs typeface="Times New Roman" panose="02020603050405020304" pitchFamily="18" charset="0"/>
-              </a:rPr>
-              <a:t> </a:t>
-            </a:r>
-            <a:r>
-              <a:rPr lang="pt-BR" sz="2000" dirty="0" err="1">
-                <a:solidFill>
-                  <a:schemeClr val="tx1"/>
-                </a:solidFill>
-                <a:latin typeface="Times New Roman" panose="02020603050405020304" pitchFamily="18" charset="0"/>
-                <a:cs typeface="Times New Roman" panose="02020603050405020304" pitchFamily="18" charset="0"/>
-              </a:rPr>
-              <a:t>cde</a:t>
-            </a:r>
-            <a:r>
-              <a:rPr lang="pt-BR" sz="2000" dirty="0">
-                <a:solidFill>
-                  <a:schemeClr val="tx1"/>
-                </a:solidFill>
-                <a:latin typeface="Times New Roman" panose="02020603050405020304" pitchFamily="18" charset="0"/>
-                <a:cs typeface="Times New Roman" panose="02020603050405020304" pitchFamily="18" charset="0"/>
-              </a:rPr>
-              <a:t> alta velocidade;</a:t>
-            </a:r>
+            <a:endParaRPr lang="pt-BR" sz="2000" dirty="0">
+              <a:solidFill>
+                <a:schemeClr val="tx1"/>
+              </a:solidFill>
+              <a:latin typeface="Times New Roman" panose="02020603050405020304" pitchFamily="18" charset="0"/>
+              <a:cs typeface="Times New Roman" panose="02020603050405020304" pitchFamily="18" charset="0"/>
+            </a:endParaRPr>
           </a:p>
           <a:p>
             <a:pPr algn="just">
@@ -6852,14 +6819,44 @@
               <a:buChar char="§"/>
             </a:pPr>
             <a:r>
-              <a:rPr lang="pt-BR" sz="2000" dirty="0">
-                <a:solidFill>
-                  <a:schemeClr val="tx1"/>
-                </a:solidFill>
-                <a:latin typeface="Times New Roman" panose="02020603050405020304" pitchFamily="18" charset="0"/>
-                <a:cs typeface="Times New Roman" panose="02020603050405020304" pitchFamily="18" charset="0"/>
-              </a:rPr>
-              <a:t>Ethernet;</a:t>
+              <a:rPr lang="pt-BR" sz="2000" dirty="0" err="1">
+                <a:solidFill>
+                  <a:schemeClr val="tx1"/>
+                </a:solidFill>
+                <a:latin typeface="Times New Roman" panose="02020603050405020304" pitchFamily="18" charset="0"/>
+                <a:cs typeface="Times New Roman" panose="02020603050405020304" pitchFamily="18" charset="0"/>
+              </a:rPr>
+              <a:t>IrDA</a:t>
+            </a:r>
+            <a:r>
+              <a:rPr lang="pt-BR" sz="2000" dirty="0">
+                <a:solidFill>
+                  <a:schemeClr val="tx1"/>
+                </a:solidFill>
+                <a:latin typeface="Times New Roman" panose="02020603050405020304" pitchFamily="18" charset="0"/>
+                <a:cs typeface="Times New Roman" panose="02020603050405020304" pitchFamily="18" charset="0"/>
+              </a:rPr>
+              <a:t> </a:t>
+            </a:r>
+            <a:r>
+              <a:rPr lang="pt-BR" sz="2000" dirty="0" err="1">
+                <a:solidFill>
+                  <a:schemeClr val="tx1"/>
+                </a:solidFill>
+                <a:latin typeface="Times New Roman" panose="02020603050405020304" pitchFamily="18" charset="0"/>
+                <a:cs typeface="Times New Roman" panose="02020603050405020304" pitchFamily="18" charset="0"/>
+              </a:rPr>
+              <a:t>cde</a:t>
+            </a:r>
+            <a:r>
+              <a:rPr lang="pt-BR" sz="2000" dirty="0">
+                <a:solidFill>
+                  <a:schemeClr val="tx1"/>
+                </a:solidFill>
+                <a:latin typeface="Times New Roman" panose="02020603050405020304" pitchFamily="18" charset="0"/>
+                <a:cs typeface="Times New Roman" panose="02020603050405020304" pitchFamily="18" charset="0"/>
+              </a:rPr>
+              <a:t> alta velocidade</a:t>
             </a:r>
           </a:p>
           <a:p>
@@ -6867,15 +6864,57 @@
               <a:buFont typeface="Wingdings" panose="05000000000000000000" pitchFamily="2" charset="2"/>
               <a:buChar char="§"/>
             </a:pPr>
-            <a:r>
-              <a:rPr lang="pt-BR" sz="2000" dirty="0">
-                <a:solidFill>
-                  <a:schemeClr val="tx1"/>
-                </a:solidFill>
-                <a:latin typeface="Times New Roman" panose="02020603050405020304" pitchFamily="18" charset="0"/>
-                <a:cs typeface="Times New Roman" panose="02020603050405020304" pitchFamily="18" charset="0"/>
-              </a:rPr>
-              <a:t>Controlador de memória: SRAM externa.</a:t>
+            <a:endParaRPr lang="pt-BR" sz="2000" dirty="0">
+              <a:solidFill>
+                <a:schemeClr val="tx1"/>
+              </a:solidFill>
+              <a:latin typeface="Times New Roman" panose="02020603050405020304" pitchFamily="18" charset="0"/>
+              <a:cs typeface="Times New Roman" panose="02020603050405020304" pitchFamily="18" charset="0"/>
+            </a:endParaRPr>
+          </a:p>
+          <a:p>
+            <a:pPr algn="just">
+              <a:buFont typeface="Wingdings" panose="05000000000000000000" pitchFamily="2" charset="2"/>
+              <a:buChar char="§"/>
+            </a:pPr>
+            <a:r>
+              <a:rPr lang="pt-BR" sz="2000" dirty="0">
+                <a:solidFill>
+                  <a:schemeClr val="tx1"/>
+                </a:solidFill>
+                <a:latin typeface="Times New Roman" panose="02020603050405020304" pitchFamily="18" charset="0"/>
+                <a:cs typeface="Times New Roman" panose="02020603050405020304" pitchFamily="18" charset="0"/>
+              </a:rPr>
+              <a:t>Ethernet</a:t>
+            </a:r>
+          </a:p>
+          <a:p>
+            <a:pPr algn="just">
+              <a:buFont typeface="Wingdings" panose="05000000000000000000" pitchFamily="2" charset="2"/>
+              <a:buChar char="§"/>
+            </a:pPr>
+            <a:endParaRPr lang="pt-BR" sz="2000" dirty="0">
+              <a:solidFill>
+                <a:schemeClr val="tx1"/>
+              </a:solidFill>
+              <a:latin typeface="Times New Roman" panose="02020603050405020304" pitchFamily="18" charset="0"/>
+              <a:cs typeface="Times New Roman" panose="02020603050405020304" pitchFamily="18" charset="0"/>
+            </a:endParaRPr>
+          </a:p>
+          <a:p>
+            <a:pPr algn="just">
+              <a:buFont typeface="Wingdings" panose="05000000000000000000" pitchFamily="2" charset="2"/>
+              <a:buChar char="§"/>
+            </a:pPr>
+            <a:r>
+              <a:rPr lang="pt-BR" sz="2000" dirty="0">
+                <a:solidFill>
+                  <a:schemeClr val="tx1"/>
+                </a:solidFill>
+                <a:latin typeface="Times New Roman" panose="02020603050405020304" pitchFamily="18" charset="0"/>
+                <a:cs typeface="Times New Roman" panose="02020603050405020304" pitchFamily="18" charset="0"/>
+              </a:rPr>
+              <a:t>Controlador de memória: SRAM externa</a:t>
             </a:r>
             <a:endParaRPr lang="pt-BR" sz="1800" dirty="0">
               <a:solidFill>
@@ -7057,105 +7096,7 @@
                 <a:latin typeface="Times New Roman" panose="02020603050405020304" pitchFamily="18" charset="0"/>
                 <a:cs typeface="Times New Roman" panose="02020603050405020304" pitchFamily="18" charset="0"/>
               </a:rPr>
-              <a:t>);</a:t>
-            </a:r>
-          </a:p>
-          <a:p>
-            <a:pPr algn="just">
-              <a:buFont typeface="Wingdings" panose="05000000000000000000" pitchFamily="2" charset="2"/>
-              <a:buChar char="§"/>
-            </a:pPr>
-            <a:r>
-              <a:rPr lang="pt-BR" sz="2000" b="1" dirty="0">
-                <a:solidFill>
-                  <a:schemeClr val="tx1"/>
-                </a:solidFill>
-                <a:latin typeface="Times New Roman" panose="02020603050405020304" pitchFamily="18" charset="0"/>
-                <a:cs typeface="Times New Roman" panose="02020603050405020304" pitchFamily="18" charset="0"/>
-              </a:rPr>
-              <a:t>Barramento</a:t>
-            </a:r>
-            <a:r>
-              <a:rPr lang="pt-BR" sz="2000" dirty="0">
-                <a:solidFill>
-                  <a:schemeClr val="tx1"/>
-                </a:solidFill>
-                <a:latin typeface="Times New Roman" panose="02020603050405020304" pitchFamily="18" charset="0"/>
-                <a:cs typeface="Times New Roman" panose="02020603050405020304" pitchFamily="18" charset="0"/>
-              </a:rPr>
-              <a:t> PCI e </a:t>
-            </a:r>
-            <a:r>
-              <a:rPr lang="pt-BR" sz="2000" dirty="0" err="1">
-                <a:solidFill>
-                  <a:schemeClr val="tx1"/>
-                </a:solidFill>
-                <a:latin typeface="Times New Roman" panose="02020603050405020304" pitchFamily="18" charset="0"/>
-                <a:cs typeface="Times New Roman" panose="02020603050405020304" pitchFamily="18" charset="0"/>
-              </a:rPr>
-              <a:t>PCIe</a:t>
-            </a:r>
-            <a:r>
-              <a:rPr lang="pt-BR" sz="2000" dirty="0">
-                <a:solidFill>
-                  <a:schemeClr val="tx1"/>
-                </a:solidFill>
-                <a:latin typeface="Times New Roman" panose="02020603050405020304" pitchFamily="18" charset="0"/>
-                <a:cs typeface="Times New Roman" panose="02020603050405020304" pitchFamily="18" charset="0"/>
-              </a:rPr>
-              <a:t>;</a:t>
-            </a:r>
-          </a:p>
-          <a:p>
-            <a:pPr algn="just">
-              <a:buFont typeface="Wingdings" panose="05000000000000000000" pitchFamily="2" charset="2"/>
-              <a:buChar char="§"/>
-            </a:pPr>
-            <a:r>
-              <a:rPr lang="pt-BR" sz="2000" dirty="0">
-                <a:solidFill>
-                  <a:schemeClr val="tx1"/>
-                </a:solidFill>
-                <a:latin typeface="Times New Roman" panose="02020603050405020304" pitchFamily="18" charset="0"/>
-                <a:cs typeface="Times New Roman" panose="02020603050405020304" pitchFamily="18" charset="0"/>
-              </a:rPr>
-              <a:t>Codificadores e decodificadores de vídeo;</a:t>
-            </a:r>
-          </a:p>
-          <a:p>
-            <a:pPr algn="just">
-              <a:buFont typeface="Wingdings" panose="05000000000000000000" pitchFamily="2" charset="2"/>
-              <a:buChar char="§"/>
-            </a:pPr>
-            <a:r>
-              <a:rPr lang="pt-BR" sz="2000" dirty="0">
-                <a:solidFill>
-                  <a:schemeClr val="tx1"/>
-                </a:solidFill>
-                <a:latin typeface="Times New Roman" panose="02020603050405020304" pitchFamily="18" charset="0"/>
-                <a:cs typeface="Times New Roman" panose="02020603050405020304" pitchFamily="18" charset="0"/>
-              </a:rPr>
-              <a:t>Controlador de memória: </a:t>
-            </a:r>
-            <a:r>
-              <a:rPr lang="pt-BR" sz="2000" b="1" dirty="0">
-                <a:solidFill>
-                  <a:schemeClr val="tx1"/>
-                </a:solidFill>
-                <a:latin typeface="Times New Roman" panose="02020603050405020304" pitchFamily="18" charset="0"/>
-                <a:cs typeface="Times New Roman" panose="02020603050405020304" pitchFamily="18" charset="0"/>
-              </a:rPr>
-              <a:t>DRAM/SDRAM </a:t>
-            </a:r>
-            <a:r>
-              <a:rPr lang="pt-BR" sz="2000" dirty="0">
-                <a:solidFill>
-                  <a:schemeClr val="tx1"/>
-                </a:solidFill>
-                <a:latin typeface="Times New Roman" panose="02020603050405020304" pitchFamily="18" charset="0"/>
-                <a:cs typeface="Times New Roman" panose="02020603050405020304" pitchFamily="18" charset="0"/>
-              </a:rPr>
-              <a:t>externa.</a:t>
+              <a:t>)</a:t>
             </a:r>
           </a:p>
           <a:p>
@@ -7172,9 +7113,40 @@
             </a:endParaRPr>
           </a:p>
           <a:p>
-            <a:pPr marL="0" indent="0" algn="just">
-              <a:buNone/>
-            </a:pPr>
+            <a:pPr algn="just">
+              <a:buFont typeface="Wingdings" panose="05000000000000000000" pitchFamily="2" charset="2"/>
+              <a:buChar char="§"/>
+            </a:pPr>
+            <a:r>
+              <a:rPr lang="pt-BR" sz="2000" b="1" dirty="0">
+                <a:solidFill>
+                  <a:schemeClr val="tx1"/>
+                </a:solidFill>
+                <a:latin typeface="Times New Roman" panose="02020603050405020304" pitchFamily="18" charset="0"/>
+                <a:cs typeface="Times New Roman" panose="02020603050405020304" pitchFamily="18" charset="0"/>
+              </a:rPr>
+              <a:t>Barramento</a:t>
+            </a:r>
+            <a:r>
+              <a:rPr lang="pt-BR" sz="2000" dirty="0">
+                <a:solidFill>
+                  <a:schemeClr val="tx1"/>
+                </a:solidFill>
+                <a:latin typeface="Times New Roman" panose="02020603050405020304" pitchFamily="18" charset="0"/>
+                <a:cs typeface="Times New Roman" panose="02020603050405020304" pitchFamily="18" charset="0"/>
+              </a:rPr>
+              <a:t> PCI e </a:t>
+            </a:r>
+            <a:r>
+              <a:rPr lang="pt-BR" sz="2000" dirty="0" err="1">
+                <a:solidFill>
+                  <a:schemeClr val="tx1"/>
+                </a:solidFill>
+                <a:latin typeface="Times New Roman" panose="02020603050405020304" pitchFamily="18" charset="0"/>
+                <a:cs typeface="Times New Roman" panose="02020603050405020304" pitchFamily="18" charset="0"/>
+              </a:rPr>
+              <a:t>PCIe</a:t>
+            </a:r>
             <a:endParaRPr lang="pt-BR" sz="2000" dirty="0">
               <a:solidFill>
                 <a:schemeClr val="tx1"/>
@@ -7184,30 +7156,10 @@
             </a:endParaRPr>
           </a:p>
           <a:p>
-            <a:pPr marL="0" indent="0" algn="just">
-              <a:buNone/>
-            </a:pPr>
-            <a:r>
-              <a:rPr lang="pt-BR" sz="2000" dirty="0">
-                <a:solidFill>
-                  <a:schemeClr val="tx1"/>
-                </a:solidFill>
-                <a:latin typeface="Times New Roman" panose="02020603050405020304" pitchFamily="18" charset="0"/>
-                <a:cs typeface="Times New Roman" panose="02020603050405020304" pitchFamily="18" charset="0"/>
-              </a:rPr>
-              <a:t>	 </a:t>
-            </a:r>
-            <a:r>
-              <a:rPr lang="pt-BR" sz="2000" dirty="0">
-                <a:solidFill>
-                  <a:schemeClr val="tx1"/>
-                </a:solidFill>
-                <a:latin typeface="Times New Roman" panose="02020603050405020304" pitchFamily="18" charset="0"/>
-                <a:cs typeface="Times New Roman" panose="02020603050405020304" pitchFamily="18" charset="0"/>
-                <a:hlinkClick r:id="rId3"/>
-              </a:rPr>
-              <a:t>https://www.makerhero.com/blog/introducao-as-portas-logicas/</a:t>
-            </a:r>
+            <a:pPr algn="just">
+              <a:buFont typeface="Wingdings" panose="05000000000000000000" pitchFamily="2" charset="2"/>
+              <a:buChar char="§"/>
+            </a:pPr>
             <a:endParaRPr lang="pt-BR" sz="2000" dirty="0">
               <a:solidFill>
                 <a:schemeClr val="tx1"/>
@@ -7217,10 +7169,88 @@
             </a:endParaRPr>
           </a:p>
           <a:p>
+            <a:pPr algn="just">
+              <a:buFont typeface="Wingdings" panose="05000000000000000000" pitchFamily="2" charset="2"/>
+              <a:buChar char="§"/>
+            </a:pPr>
+            <a:r>
+              <a:rPr lang="pt-BR" sz="2000" dirty="0">
+                <a:solidFill>
+                  <a:schemeClr val="tx1"/>
+                </a:solidFill>
+                <a:latin typeface="Times New Roman" panose="02020603050405020304" pitchFamily="18" charset="0"/>
+                <a:cs typeface="Times New Roman" panose="02020603050405020304" pitchFamily="18" charset="0"/>
+              </a:rPr>
+              <a:t>Codificadores e decodificadores de vídeo</a:t>
+            </a:r>
+          </a:p>
+          <a:p>
+            <a:pPr algn="just">
+              <a:buFont typeface="Wingdings" panose="05000000000000000000" pitchFamily="2" charset="2"/>
+              <a:buChar char="§"/>
+            </a:pPr>
+            <a:endParaRPr lang="pt-BR" sz="2000" dirty="0">
+              <a:solidFill>
+                <a:schemeClr val="tx1"/>
+              </a:solidFill>
+              <a:latin typeface="Times New Roman" panose="02020603050405020304" pitchFamily="18" charset="0"/>
+              <a:cs typeface="Times New Roman" panose="02020603050405020304" pitchFamily="18" charset="0"/>
+            </a:endParaRPr>
+          </a:p>
+          <a:p>
+            <a:pPr algn="just">
+              <a:buFont typeface="Wingdings" panose="05000000000000000000" pitchFamily="2" charset="2"/>
+              <a:buChar char="§"/>
+            </a:pPr>
+            <a:r>
+              <a:rPr lang="pt-BR" sz="2000" dirty="0">
+                <a:solidFill>
+                  <a:schemeClr val="tx1"/>
+                </a:solidFill>
+                <a:latin typeface="Times New Roman" panose="02020603050405020304" pitchFamily="18" charset="0"/>
+                <a:cs typeface="Times New Roman" panose="02020603050405020304" pitchFamily="18" charset="0"/>
+              </a:rPr>
+              <a:t>Controlador de memória: </a:t>
+            </a:r>
+            <a:r>
+              <a:rPr lang="pt-BR" sz="2000" b="1" dirty="0">
+                <a:solidFill>
+                  <a:schemeClr val="tx1"/>
+                </a:solidFill>
+                <a:latin typeface="Times New Roman" panose="02020603050405020304" pitchFamily="18" charset="0"/>
+                <a:cs typeface="Times New Roman" panose="02020603050405020304" pitchFamily="18" charset="0"/>
+              </a:rPr>
+              <a:t>DRAM/SDRAM </a:t>
+            </a:r>
+            <a:r>
+              <a:rPr lang="pt-BR" sz="2000" dirty="0">
+                <a:solidFill>
+                  <a:schemeClr val="tx1"/>
+                </a:solidFill>
+                <a:latin typeface="Times New Roman" panose="02020603050405020304" pitchFamily="18" charset="0"/>
+                <a:cs typeface="Times New Roman" panose="02020603050405020304" pitchFamily="18" charset="0"/>
+              </a:rPr>
+              <a:t>externa</a:t>
+            </a:r>
+          </a:p>
+          <a:p>
+            <a:pPr algn="just">
+              <a:buFont typeface="Wingdings" panose="05000000000000000000" pitchFamily="2" charset="2"/>
+              <a:buChar char="§"/>
+            </a:pPr>
+            <a:endParaRPr lang="pt-BR" sz="2000" dirty="0">
+              <a:solidFill>
+                <a:schemeClr val="tx1"/>
+              </a:solidFill>
+              <a:latin typeface="Times New Roman" panose="02020603050405020304" pitchFamily="18" charset="0"/>
+              <a:cs typeface="Times New Roman" panose="02020603050405020304" pitchFamily="18" charset="0"/>
+            </a:endParaRPr>
+          </a:p>
+          <a:p>
             <a:pPr marL="0" indent="0" algn="just">
               <a:buNone/>
             </a:pPr>
-            <a:endParaRPr lang="pt-BR" sz="1800" dirty="0">
+            <a:endParaRPr lang="pt-BR" sz="2000" dirty="0">
               <a:solidFill>
                 <a:schemeClr val="tx1"/>
               </a:solidFill>
@@ -7649,7 +7679,7 @@
                 <a:latin typeface="Times New Roman" panose="02020603050405020304" pitchFamily="18" charset="0"/>
                 <a:cs typeface="Times New Roman" panose="02020603050405020304" pitchFamily="18" charset="0"/>
               </a:rPr>
-              <a:t>Via software</a:t>
+              <a:t>Através de uma linguagem de programação</a:t>
             </a:r>
             <a:r>
               <a:rPr lang="pt-BR" sz="2000" dirty="0">
@@ -7699,47 +7729,7 @@
                 <a:latin typeface="Times New Roman" panose="02020603050405020304" pitchFamily="18" charset="0"/>
                 <a:cs typeface="Times New Roman" panose="02020603050405020304" pitchFamily="18" charset="0"/>
               </a:rPr>
-              <a:t>. Analogamente, é possível </a:t>
-            </a:r>
-            <a:r>
-              <a:rPr lang="pt-BR" sz="2000" b="1" dirty="0">
-                <a:solidFill>
-                  <a:srgbClr val="FF0000"/>
-                </a:solidFill>
-                <a:latin typeface="Times New Roman" panose="02020603050405020304" pitchFamily="18" charset="0"/>
-                <a:cs typeface="Times New Roman" panose="02020603050405020304" pitchFamily="18" charset="0"/>
-              </a:rPr>
-              <a:t>ler valores digitais</a:t>
-            </a:r>
-            <a:r>
-              <a:rPr lang="pt-BR" sz="2000" dirty="0">
-                <a:solidFill>
-                  <a:schemeClr val="tx1"/>
-                </a:solidFill>
-                <a:latin typeface="Times New Roman" panose="02020603050405020304" pitchFamily="18" charset="0"/>
-                <a:cs typeface="Times New Roman" panose="02020603050405020304" pitchFamily="18" charset="0"/>
-              </a:rPr>
-              <a:t> em uma </a:t>
-            </a:r>
-            <a:r>
-              <a:rPr lang="pt-BR" sz="2000" b="1" dirty="0">
-                <a:solidFill>
-                  <a:schemeClr val="tx1"/>
-                </a:solidFill>
-                <a:latin typeface="Times New Roman" panose="02020603050405020304" pitchFamily="18" charset="0"/>
-                <a:cs typeface="Times New Roman" panose="02020603050405020304" pitchFamily="18" charset="0"/>
-              </a:rPr>
-              <a:t>GPIO de entrada</a:t>
-            </a:r>
-            <a:r>
-              <a:rPr lang="pt-BR" sz="2000" dirty="0">
-                <a:solidFill>
-                  <a:schemeClr val="tx1"/>
-                </a:solidFill>
-                <a:latin typeface="Times New Roman" panose="02020603050405020304" pitchFamily="18" charset="0"/>
-                <a:cs typeface="Times New Roman" panose="02020603050405020304" pitchFamily="18" charset="0"/>
-              </a:rPr>
-              <a:t>.</a:t>
+              <a:t>. </a:t>
             </a:r>
           </a:p>
           <a:p>
@@ -7766,37 +7756,27 @@
                 <a:latin typeface="Times New Roman" panose="02020603050405020304" pitchFamily="18" charset="0"/>
                 <a:cs typeface="Times New Roman" panose="02020603050405020304" pitchFamily="18" charset="0"/>
               </a:rPr>
-              <a:t>No geral, não necessita de instruções especiais para acessar os dispositivos periféricos. Os mesmos comandos (</a:t>
-            </a:r>
-            <a:r>
-              <a:rPr lang="pt-BR" sz="2000" b="1" dirty="0" err="1">
-                <a:solidFill>
-                  <a:schemeClr val="tx1"/>
-                </a:solidFill>
-                <a:latin typeface="Times New Roman" panose="02020603050405020304" pitchFamily="18" charset="0"/>
-                <a:cs typeface="Times New Roman" panose="02020603050405020304" pitchFamily="18" charset="0"/>
-              </a:rPr>
-              <a:t>e.g</a:t>
+              <a:t>Analogamente, é possível </a:t>
             </a:r>
             <a:r>
               <a:rPr lang="pt-BR" sz="2000" b="1" dirty="0">
                 <a:solidFill>
-                  <a:schemeClr val="tx1"/>
-                </a:solidFill>
-                <a:latin typeface="Times New Roman" panose="02020603050405020304" pitchFamily="18" charset="0"/>
-                <a:cs typeface="Times New Roman" panose="02020603050405020304" pitchFamily="18" charset="0"/>
-              </a:rPr>
-              <a:t>, </a:t>
-            </a:r>
-            <a:r>
-              <a:rPr lang="pt-BR" sz="2000" b="1" dirty="0" err="1">
-                <a:solidFill>
-                  <a:schemeClr val="tx1"/>
-                </a:solidFill>
-                <a:latin typeface="Times New Roman" panose="02020603050405020304" pitchFamily="18" charset="0"/>
-                <a:cs typeface="Times New Roman" panose="02020603050405020304" pitchFamily="18" charset="0"/>
-              </a:rPr>
-              <a:t>load</a:t>
+                  <a:srgbClr val="FF0000"/>
+                </a:solidFill>
+                <a:latin typeface="Times New Roman" panose="02020603050405020304" pitchFamily="18" charset="0"/>
+                <a:cs typeface="Times New Roman" panose="02020603050405020304" pitchFamily="18" charset="0"/>
+              </a:rPr>
+              <a:t>ler valores digitais</a:t>
+            </a:r>
+            <a:r>
+              <a:rPr lang="pt-BR" sz="2000" dirty="0">
+                <a:solidFill>
+                  <a:schemeClr val="tx1"/>
+                </a:solidFill>
+                <a:latin typeface="Times New Roman" panose="02020603050405020304" pitchFamily="18" charset="0"/>
+                <a:cs typeface="Times New Roman" panose="02020603050405020304" pitchFamily="18" charset="0"/>
+              </a:rPr>
+              <a:t> em uma </a:t>
             </a:r>
             <a:r>
               <a:rPr lang="pt-BR" sz="2000" b="1" dirty="0">
@@ -7806,17 +7786,17 @@
                 <a:latin typeface="Times New Roman" panose="02020603050405020304" pitchFamily="18" charset="0"/>
                 <a:cs typeface="Times New Roman" panose="02020603050405020304" pitchFamily="18" charset="0"/>
               </a:rPr>
-              <a:t> e store</a:t>
-            </a:r>
-            <a:r>
-              <a:rPr lang="pt-BR" sz="2000" dirty="0">
-                <a:solidFill>
-                  <a:schemeClr val="tx1"/>
-                </a:solidFill>
-                <a:latin typeface="Times New Roman" panose="02020603050405020304" pitchFamily="18" charset="0"/>
-                <a:cs typeface="Times New Roman" panose="02020603050405020304" pitchFamily="18" charset="0"/>
-              </a:rPr>
-              <a:t>) para comunicação com a memória servem para I/O.</a:t>
+              <a:t>GPIO de entrada</a:t>
+            </a:r>
+            <a:r>
+              <a:rPr lang="pt-BR" sz="2000" dirty="0">
+                <a:solidFill>
+                  <a:schemeClr val="tx1"/>
+                </a:solidFill>
+                <a:latin typeface="Times New Roman" panose="02020603050405020304" pitchFamily="18" charset="0"/>
+                <a:cs typeface="Times New Roman" panose="02020603050405020304" pitchFamily="18" charset="0"/>
+              </a:rPr>
+              <a:t>.</a:t>
             </a:r>
           </a:p>
           <a:p>
@@ -7843,7 +7823,27 @@
                 <a:latin typeface="Times New Roman" panose="02020603050405020304" pitchFamily="18" charset="0"/>
                 <a:cs typeface="Times New Roman" panose="02020603050405020304" pitchFamily="18" charset="0"/>
               </a:rPr>
-              <a:t>Necessitam mover dados entre os registradores dos periféricos e a memória / processador.</a:t>
+              <a:t>No geral, </a:t>
+            </a:r>
+            <a:r>
+              <a:rPr lang="pt-BR" sz="2000" b="1" dirty="0">
+                <a:solidFill>
+                  <a:schemeClr val="tx1"/>
+                </a:solidFill>
+                <a:latin typeface="Times New Roman" panose="02020603050405020304" pitchFamily="18" charset="0"/>
+                <a:cs typeface="Times New Roman" panose="02020603050405020304" pitchFamily="18" charset="0"/>
+              </a:rPr>
+              <a:t>não necessita de instruções especiais</a:t>
+            </a:r>
+            <a:r>
+              <a:rPr lang="pt-BR" sz="2000" dirty="0">
+                <a:solidFill>
+                  <a:schemeClr val="tx1"/>
+                </a:solidFill>
+                <a:latin typeface="Times New Roman" panose="02020603050405020304" pitchFamily="18" charset="0"/>
+                <a:cs typeface="Times New Roman" panose="02020603050405020304" pitchFamily="18" charset="0"/>
+              </a:rPr>
+              <a:t> para acessar os dispositivos periféricos.</a:t>
             </a:r>
           </a:p>
           <a:p>
@@ -7862,37 +7862,86 @@
             <a:pPr marL="0" indent="0" algn="just">
               <a:buNone/>
             </a:pPr>
-            <a:endParaRPr lang="pt-BR" sz="2000" dirty="0">
-              <a:solidFill>
-                <a:schemeClr val="tx1"/>
-              </a:solidFill>
-              <a:latin typeface="Times New Roman" panose="02020603050405020304" pitchFamily="18" charset="0"/>
-              <a:cs typeface="Times New Roman" panose="02020603050405020304" pitchFamily="18" charset="0"/>
-            </a:endParaRPr>
-          </a:p>
-          <a:p>
-            <a:pPr marL="0" indent="0" algn="just">
-              <a:buNone/>
-            </a:pPr>
-            <a:endParaRPr lang="pt-BR" sz="2000" dirty="0">
-              <a:solidFill>
-                <a:schemeClr val="tx1"/>
-              </a:solidFill>
-              <a:latin typeface="Times New Roman" panose="02020603050405020304" pitchFamily="18" charset="0"/>
-              <a:cs typeface="Times New Roman" panose="02020603050405020304" pitchFamily="18" charset="0"/>
-            </a:endParaRPr>
-          </a:p>
-          <a:p>
-            <a:pPr marL="0" indent="0" algn="just">
-              <a:buNone/>
-            </a:pPr>
-            <a:endParaRPr lang="pt-BR" sz="2000" dirty="0">
-              <a:solidFill>
-                <a:schemeClr val="tx1"/>
-              </a:solidFill>
-              <a:latin typeface="Times New Roman" panose="02020603050405020304" pitchFamily="18" charset="0"/>
-              <a:cs typeface="Times New Roman" panose="02020603050405020304" pitchFamily="18" charset="0"/>
-            </a:endParaRPr>
+            <a:r>
+              <a:rPr lang="pt-BR" sz="2000" dirty="0">
+                <a:solidFill>
+                  <a:schemeClr val="tx1"/>
+                </a:solidFill>
+                <a:latin typeface="Times New Roman" panose="02020603050405020304" pitchFamily="18" charset="0"/>
+                <a:cs typeface="Times New Roman" panose="02020603050405020304" pitchFamily="18" charset="0"/>
+              </a:rPr>
+              <a:t>Os mesmos comandos (</a:t>
+            </a:r>
+            <a:r>
+              <a:rPr lang="pt-BR" sz="2000" b="1" dirty="0" err="1">
+                <a:solidFill>
+                  <a:schemeClr val="tx1"/>
+                </a:solidFill>
+                <a:latin typeface="Times New Roman" panose="02020603050405020304" pitchFamily="18" charset="0"/>
+                <a:cs typeface="Times New Roman" panose="02020603050405020304" pitchFamily="18" charset="0"/>
+              </a:rPr>
+              <a:t>e.g</a:t>
+            </a:r>
+            <a:r>
+              <a:rPr lang="pt-BR" sz="2000" b="1" dirty="0">
+                <a:solidFill>
+                  <a:schemeClr val="tx1"/>
+                </a:solidFill>
+                <a:latin typeface="Times New Roman" panose="02020603050405020304" pitchFamily="18" charset="0"/>
+                <a:cs typeface="Times New Roman" panose="02020603050405020304" pitchFamily="18" charset="0"/>
+              </a:rPr>
+              <a:t>, </a:t>
+            </a:r>
+            <a:r>
+              <a:rPr lang="pt-BR" sz="2000" b="1" dirty="0" err="1">
+                <a:solidFill>
+                  <a:schemeClr val="tx1"/>
+                </a:solidFill>
+                <a:latin typeface="Times New Roman" panose="02020603050405020304" pitchFamily="18" charset="0"/>
+                <a:cs typeface="Times New Roman" panose="02020603050405020304" pitchFamily="18" charset="0"/>
+              </a:rPr>
+              <a:t>load</a:t>
+            </a:r>
+            <a:r>
+              <a:rPr lang="pt-BR" sz="2000" b="1" dirty="0">
+                <a:solidFill>
+                  <a:schemeClr val="tx1"/>
+                </a:solidFill>
+                <a:latin typeface="Times New Roman" panose="02020603050405020304" pitchFamily="18" charset="0"/>
+                <a:cs typeface="Times New Roman" panose="02020603050405020304" pitchFamily="18" charset="0"/>
+              </a:rPr>
+              <a:t> e store</a:t>
+            </a:r>
+            <a:r>
+              <a:rPr lang="pt-BR" sz="2000" dirty="0">
+                <a:solidFill>
+                  <a:schemeClr val="tx1"/>
+                </a:solidFill>
+                <a:latin typeface="Times New Roman" panose="02020603050405020304" pitchFamily="18" charset="0"/>
+                <a:cs typeface="Times New Roman" panose="02020603050405020304" pitchFamily="18" charset="0"/>
+              </a:rPr>
+              <a:t>) para comunicação com a memória servem para </a:t>
+            </a:r>
+            <a:r>
+              <a:rPr lang="pt-BR" sz="2000" b="1" dirty="0">
+                <a:solidFill>
+                  <a:schemeClr val="tx1"/>
+                </a:solidFill>
+                <a:latin typeface="Times New Roman" panose="02020603050405020304" pitchFamily="18" charset="0"/>
+                <a:cs typeface="Times New Roman" panose="02020603050405020304" pitchFamily="18" charset="0"/>
+              </a:rPr>
+              <a:t>I/O</a:t>
+            </a:r>
+            <a:r>
+              <a:rPr lang="pt-BR" sz="2000" dirty="0">
+                <a:solidFill>
+                  <a:schemeClr val="tx1"/>
+                </a:solidFill>
+                <a:latin typeface="Times New Roman" panose="02020603050405020304" pitchFamily="18" charset="0"/>
+                <a:cs typeface="Times New Roman" panose="02020603050405020304" pitchFamily="18" charset="0"/>
+              </a:rPr>
+              <a:t>.</a:t>
+            </a:r>
           </a:p>
         </p:txBody>
       </p:sp>
@@ -8001,17 +8050,7 @@
                 <a:latin typeface="Times New Roman" panose="02020603050405020304" pitchFamily="18" charset="0"/>
                 <a:cs typeface="Times New Roman" panose="02020603050405020304" pitchFamily="18" charset="0"/>
               </a:rPr>
-              <a:t>Não necessita de instruções especiais para acessar os dispositivos periféricos. Os mesmos comandos (</a:t>
-            </a:r>
-            <a:r>
-              <a:rPr lang="pt-BR" sz="2000" b="1" dirty="0" err="1">
-                <a:solidFill>
-                  <a:schemeClr val="tx1"/>
-                </a:solidFill>
-                <a:latin typeface="Times New Roman" panose="02020603050405020304" pitchFamily="18" charset="0"/>
-                <a:cs typeface="Times New Roman" panose="02020603050405020304" pitchFamily="18" charset="0"/>
-              </a:rPr>
-              <a:t>e.g</a:t>
+              <a:t>Necessitam </a:t>
             </a:r>
             <a:r>
               <a:rPr lang="pt-BR" sz="2000" b="1" dirty="0">
@@ -8021,37 +8060,37 @@
                 <a:latin typeface="Times New Roman" panose="02020603050405020304" pitchFamily="18" charset="0"/>
                 <a:cs typeface="Times New Roman" panose="02020603050405020304" pitchFamily="18" charset="0"/>
               </a:rPr>
-              <a:t>, </a:t>
-            </a:r>
-            <a:r>
-              <a:rPr lang="pt-BR" sz="2000" b="1" dirty="0" err="1">
-                <a:solidFill>
-                  <a:schemeClr val="tx1"/>
-                </a:solidFill>
-                <a:latin typeface="Times New Roman" panose="02020603050405020304" pitchFamily="18" charset="0"/>
-                <a:cs typeface="Times New Roman" panose="02020603050405020304" pitchFamily="18" charset="0"/>
-              </a:rPr>
-              <a:t>load</a:t>
+              <a:t>mover dados</a:t>
+            </a:r>
+            <a:r>
+              <a:rPr lang="pt-BR" sz="2000" dirty="0">
+                <a:solidFill>
+                  <a:schemeClr val="tx1"/>
+                </a:solidFill>
+                <a:latin typeface="Times New Roman" panose="02020603050405020304" pitchFamily="18" charset="0"/>
+                <a:cs typeface="Times New Roman" panose="02020603050405020304" pitchFamily="18" charset="0"/>
+              </a:rPr>
+              <a:t> entre os </a:t>
             </a:r>
             <a:r>
               <a:rPr lang="pt-BR" sz="2000" b="1" dirty="0">
                 <a:solidFill>
-                  <a:schemeClr val="tx1"/>
-                </a:solidFill>
-                <a:latin typeface="Times New Roman" panose="02020603050405020304" pitchFamily="18" charset="0"/>
-                <a:cs typeface="Times New Roman" panose="02020603050405020304" pitchFamily="18" charset="0"/>
-              </a:rPr>
-              <a:t> e store</a:t>
-            </a:r>
-            <a:r>
-              <a:rPr lang="pt-BR" sz="2000" dirty="0">
-                <a:solidFill>
-                  <a:schemeClr val="tx1"/>
-                </a:solidFill>
-                <a:latin typeface="Times New Roman" panose="02020603050405020304" pitchFamily="18" charset="0"/>
-                <a:cs typeface="Times New Roman" panose="02020603050405020304" pitchFamily="18" charset="0"/>
-              </a:rPr>
-              <a:t>) para comunicação com a memória servem para I/O.</a:t>
+                  <a:srgbClr val="FF0000"/>
+                </a:solidFill>
+                <a:latin typeface="Times New Roman" panose="02020603050405020304" pitchFamily="18" charset="0"/>
+                <a:cs typeface="Times New Roman" panose="02020603050405020304" pitchFamily="18" charset="0"/>
+              </a:rPr>
+              <a:t>registradores dos periféricos e a memória / processador</a:t>
+            </a:r>
+            <a:r>
+              <a:rPr lang="pt-BR" sz="2000" dirty="0">
+                <a:solidFill>
+                  <a:schemeClr val="tx1"/>
+                </a:solidFill>
+                <a:latin typeface="Times New Roman" panose="02020603050405020304" pitchFamily="18" charset="0"/>
+                <a:cs typeface="Times New Roman" panose="02020603050405020304" pitchFamily="18" charset="0"/>
+              </a:rPr>
+              <a:t>.</a:t>
             </a:r>
           </a:p>
           <a:p>
@@ -8078,33 +8117,6 @@
                 <a:latin typeface="Times New Roman" panose="02020603050405020304" pitchFamily="18" charset="0"/>
                 <a:cs typeface="Times New Roman" panose="02020603050405020304" pitchFamily="18" charset="0"/>
               </a:rPr>
-              <a:t>Necessitam mover dados entre os registradores dos periféricos e a memória / processador.</a:t>
-            </a:r>
-          </a:p>
-          <a:p>
-            <a:pPr marL="0" indent="0" algn="just">
-              <a:buNone/>
-            </a:pPr>
-            <a:endParaRPr lang="pt-BR" sz="2000" dirty="0">
-              <a:solidFill>
-                <a:schemeClr val="tx1"/>
-              </a:solidFill>
-              <a:latin typeface="Times New Roman" panose="02020603050405020304" pitchFamily="18" charset="0"/>
-              <a:cs typeface="Times New Roman" panose="02020603050405020304" pitchFamily="18" charset="0"/>
-            </a:endParaRPr>
-          </a:p>
-          <a:p>
-            <a:pPr marL="0" indent="0" algn="just">
-              <a:buNone/>
-            </a:pPr>
-            <a:r>
-              <a:rPr lang="pt-BR" sz="2000" dirty="0">
-                <a:solidFill>
-                  <a:schemeClr val="tx1"/>
-                </a:solidFill>
-                <a:latin typeface="Times New Roman" panose="02020603050405020304" pitchFamily="18" charset="0"/>
-                <a:cs typeface="Times New Roman" panose="02020603050405020304" pitchFamily="18" charset="0"/>
-              </a:rPr>
               <a:t>As </a:t>
             </a:r>
             <a:r>
@@ -8135,7 +8147,7 @@
                 <a:latin typeface="Times New Roman" panose="02020603050405020304" pitchFamily="18" charset="0"/>
                 <a:cs typeface="Times New Roman" panose="02020603050405020304" pitchFamily="18" charset="0"/>
               </a:rPr>
-              <a:t>General-</a:t>
+              <a:t>General </a:t>
             </a:r>
             <a:r>
               <a:rPr lang="pt-BR" sz="2000" b="1" dirty="0" err="1">
@@ -8167,42 +8179,6 @@
               </a:rPr>
               <a:t>) possivelmente representam os elementos mais explorados de microcontroladores.</a:t>
             </a:r>
-          </a:p>
-          <a:p>
-            <a:pPr marL="0" indent="0" algn="just">
-              <a:buNone/>
-            </a:pPr>
-            <a:endParaRPr lang="pt-BR" sz="2000" dirty="0">
-              <a:solidFill>
-                <a:schemeClr val="tx1"/>
-              </a:solidFill>
-              <a:latin typeface="Times New Roman" panose="02020603050405020304" pitchFamily="18" charset="0"/>
-              <a:cs typeface="Times New Roman" panose="02020603050405020304" pitchFamily="18" charset="0"/>
-            </a:endParaRPr>
-          </a:p>
-          <a:p>
-            <a:pPr marL="0" indent="0" algn="just">
-              <a:buNone/>
-            </a:pPr>
-            <a:endParaRPr lang="pt-BR" sz="2000" dirty="0">
-              <a:solidFill>
-                <a:schemeClr val="tx1"/>
-              </a:solidFill>
-              <a:latin typeface="Times New Roman" panose="02020603050405020304" pitchFamily="18" charset="0"/>
-              <a:cs typeface="Times New Roman" panose="02020603050405020304" pitchFamily="18" charset="0"/>
-            </a:endParaRPr>
-          </a:p>
-          <a:p>
-            <a:pPr marL="0" indent="0" algn="just">
-              <a:buNone/>
-            </a:pPr>
-            <a:endParaRPr lang="pt-BR" sz="2000" dirty="0">
-              <a:solidFill>
-                <a:schemeClr val="tx1"/>
-              </a:solidFill>
-              <a:latin typeface="Times New Roman" panose="02020603050405020304" pitchFamily="18" charset="0"/>
-              <a:cs typeface="Times New Roman" panose="02020603050405020304" pitchFamily="18" charset="0"/>
-            </a:endParaRPr>
           </a:p>
         </p:txBody>
       </p:sp>
@@ -8789,8 +8765,8 @@
         </p:nvSpPr>
         <p:spPr>
           <a:xfrm>
-            <a:off x="142865" y="1395222"/>
-            <a:ext cx="8865056" cy="3542298"/>
+            <a:off x="139472" y="1063230"/>
+            <a:ext cx="8865056" cy="3874289"/>
           </a:xfrm>
         </p:spPr>
         <p:txBody>
@@ -8810,7 +8786,54 @@
                 <a:latin typeface="Times New Roman" panose="02020603050405020304" pitchFamily="18" charset="0"/>
                 <a:cs typeface="Times New Roman" panose="02020603050405020304" pitchFamily="18" charset="0"/>
               </a:rPr>
-              <a:t>Refere-se à chegada de dados à CPU. Ou seja, o dado sai de um dispositivo e vai para a CPU (registradores, memória).</a:t>
+              <a:t>Refere-se à chegada de dados à CPU. </a:t>
+            </a:r>
+          </a:p>
+          <a:p>
+            <a:pPr marL="0" indent="0" algn="just">
+              <a:buNone/>
+            </a:pPr>
+            <a:endParaRPr lang="pt-BR" sz="2000" dirty="0">
+              <a:solidFill>
+                <a:schemeClr val="tx1"/>
+              </a:solidFill>
+              <a:latin typeface="Times New Roman" panose="02020603050405020304" pitchFamily="18" charset="0"/>
+              <a:cs typeface="Times New Roman" panose="02020603050405020304" pitchFamily="18" charset="0"/>
+            </a:endParaRPr>
+          </a:p>
+          <a:p>
+            <a:pPr marL="0" indent="0" algn="just">
+              <a:buNone/>
+            </a:pPr>
+            <a:r>
+              <a:rPr lang="pt-BR" sz="2000" dirty="0">
+                <a:solidFill>
+                  <a:schemeClr val="tx1"/>
+                </a:solidFill>
+                <a:latin typeface="Times New Roman" panose="02020603050405020304" pitchFamily="18" charset="0"/>
+                <a:cs typeface="Times New Roman" panose="02020603050405020304" pitchFamily="18" charset="0"/>
+              </a:rPr>
+              <a:t>Ou seja, o </a:t>
+            </a:r>
+            <a:r>
+              <a:rPr lang="pt-BR" sz="2000" b="1" dirty="0">
+                <a:solidFill>
+                  <a:schemeClr val="tx1"/>
+                </a:solidFill>
+                <a:latin typeface="Times New Roman" panose="02020603050405020304" pitchFamily="18" charset="0"/>
+                <a:cs typeface="Times New Roman" panose="02020603050405020304" pitchFamily="18" charset="0"/>
+              </a:rPr>
+              <a:t>dado sai de um dispositivo e vai para a CPU</a:t>
+            </a:r>
+            <a:r>
+              <a:rPr lang="pt-BR" sz="2000" dirty="0">
+                <a:solidFill>
+                  <a:schemeClr val="tx1"/>
+                </a:solidFill>
+                <a:latin typeface="Times New Roman" panose="02020603050405020304" pitchFamily="18" charset="0"/>
+                <a:cs typeface="Times New Roman" panose="02020603050405020304" pitchFamily="18" charset="0"/>
+              </a:rPr>
+              <a:t> (registradores, memória).</a:t>
             </a:r>
           </a:p>
           <a:p>
@@ -9161,7 +9184,47 @@
                 <a:latin typeface="Times New Roman" panose="02020603050405020304" pitchFamily="18" charset="0"/>
                 <a:cs typeface="Times New Roman" panose="02020603050405020304" pitchFamily="18" charset="0"/>
               </a:rPr>
-              <a:t>Refere-se à saída de dados da CPU. Ou seja, o dado é gerado na CPU e enviado para uma interface ou um dispositivo.</a:t>
+              <a:t>Refere-se à </a:t>
+            </a:r>
+            <a:r>
+              <a:rPr lang="pt-BR" sz="2000" b="1" dirty="0">
+                <a:solidFill>
+                  <a:schemeClr val="tx1"/>
+                </a:solidFill>
+                <a:latin typeface="Times New Roman" panose="02020603050405020304" pitchFamily="18" charset="0"/>
+                <a:cs typeface="Times New Roman" panose="02020603050405020304" pitchFamily="18" charset="0"/>
+              </a:rPr>
+              <a:t>saída de dados da CPU</a:t>
+            </a:r>
+            <a:r>
+              <a:rPr lang="pt-BR" sz="2000" dirty="0">
+                <a:solidFill>
+                  <a:schemeClr val="tx1"/>
+                </a:solidFill>
+                <a:latin typeface="Times New Roman" panose="02020603050405020304" pitchFamily="18" charset="0"/>
+                <a:cs typeface="Times New Roman" panose="02020603050405020304" pitchFamily="18" charset="0"/>
+              </a:rPr>
+              <a:t>. Ou seja, o </a:t>
+            </a:r>
+            <a:r>
+              <a:rPr lang="pt-BR" sz="2000" b="1" dirty="0">
+                <a:solidFill>
+                  <a:srgbClr val="FF0000"/>
+                </a:solidFill>
+                <a:latin typeface="Times New Roman" panose="02020603050405020304" pitchFamily="18" charset="0"/>
+                <a:cs typeface="Times New Roman" panose="02020603050405020304" pitchFamily="18" charset="0"/>
+              </a:rPr>
+              <a:t>dado é gerado na CPU e enviado para uma interface ou um dispositivo</a:t>
+            </a:r>
+            <a:r>
+              <a:rPr lang="pt-BR" sz="2000" dirty="0">
+                <a:solidFill>
+                  <a:schemeClr val="tx1"/>
+                </a:solidFill>
+                <a:latin typeface="Times New Roman" panose="02020603050405020304" pitchFamily="18" charset="0"/>
+                <a:cs typeface="Times New Roman" panose="02020603050405020304" pitchFamily="18" charset="0"/>
+              </a:rPr>
+              <a:t>.</a:t>
             </a:r>
           </a:p>
           <a:p>

</xml_diff>

<commit_message>
arduino ajuste 03/09/2024 2024.2
</commit_message>
<xml_diff>
--- a/01 Classes/Aula 05 - Programação Microcontroladores - Periféricos Integrados - Portas e Conversores.pptx
+++ b/01 Classes/Aula 05 - Programação Microcontroladores - Periféricos Integrados - Portas e Conversores.pptx
@@ -11042,8 +11042,29 @@
                 <a:latin typeface="Times New Roman" panose="02020603050405020304" pitchFamily="18" charset="0"/>
                 <a:cs typeface="Times New Roman" panose="02020603050405020304" pitchFamily="18" charset="0"/>
               </a:rPr>
-              <a:t>)</a:t>
-            </a:r>
+              <a:t>). 				</a:t>
+            </a:r>
+            <a:r>
+              <a:rPr lang="pt-BR" sz="1800" b="1" dirty="0">
+                <a:latin typeface="Times New Roman" panose="02020603050405020304" pitchFamily="18" charset="0"/>
+                <a:cs typeface="Times New Roman" panose="02020603050405020304" pitchFamily="18" charset="0"/>
+              </a:rPr>
+              <a:t>Reproduzir </a:t>
+            </a:r>
+            <a:r>
+              <a:rPr lang="pt-BR" sz="1800" b="1" dirty="0">
+                <a:solidFill>
+                  <a:srgbClr val="FF0000"/>
+                </a:solidFill>
+                <a:latin typeface="Times New Roman" panose="02020603050405020304" pitchFamily="18" charset="0"/>
+                <a:cs typeface="Times New Roman" panose="02020603050405020304" pitchFamily="18" charset="0"/>
+              </a:rPr>
+              <a:t>projeto Arduino Uno R3</a:t>
+            </a:r>
+            <a:endParaRPr lang="pt-BR" sz="1800" b="1" dirty="0">
+              <a:latin typeface="Times New Roman" panose="02020603050405020304" pitchFamily="18" charset="0"/>
+              <a:cs typeface="Times New Roman" panose="02020603050405020304" pitchFamily="18" charset="0"/>
+            </a:endParaRPr>
           </a:p>
           <a:p>
             <a:pPr marL="0" indent="0" algn="just">
@@ -12082,48 +12103,14 @@
               <a:buNone/>
             </a:pPr>
             <a:r>
-              <a:rPr lang="pt-BR" sz="2400" dirty="0">
-                <a:latin typeface="Times New Roman" panose="02020603050405020304" pitchFamily="18" charset="0"/>
-                <a:cs typeface="Times New Roman" panose="02020603050405020304" pitchFamily="18" charset="0"/>
-              </a:rPr>
-              <a:t>Reproduzir </a:t>
-            </a:r>
-            <a:r>
-              <a:rPr lang="pt-BR" sz="2400" b="1" dirty="0">
+              <a:rPr lang="pt-BR" b="1" dirty="0">
                 <a:solidFill>
                   <a:srgbClr val="FF0000"/>
                 </a:solidFill>
                 <a:latin typeface="Times New Roman" panose="02020603050405020304" pitchFamily="18" charset="0"/>
                 <a:cs typeface="Times New Roman" panose="02020603050405020304" pitchFamily="18" charset="0"/>
               </a:rPr>
-              <a:t>projeto</a:t>
-            </a:r>
-            <a:r>
-              <a:rPr lang="pt-BR" sz="2400" dirty="0">
-                <a:solidFill>
-                  <a:srgbClr val="FF0000"/>
-                </a:solidFill>
-                <a:latin typeface="Times New Roman" panose="02020603050405020304" pitchFamily="18" charset="0"/>
-                <a:cs typeface="Times New Roman" panose="02020603050405020304" pitchFamily="18" charset="0"/>
-              </a:rPr>
-              <a:t> </a:t>
-            </a:r>
-            <a:r>
-              <a:rPr lang="pt-BR" sz="2400" b="1" dirty="0">
-                <a:solidFill>
-                  <a:srgbClr val="FF0000"/>
-                </a:solidFill>
-                <a:latin typeface="Times New Roman" panose="02020603050405020304" pitchFamily="18" charset="0"/>
-                <a:cs typeface="Times New Roman" panose="02020603050405020304" pitchFamily="18" charset="0"/>
-              </a:rPr>
-              <a:t>Arduino Uno R3 </a:t>
-            </a:r>
-            <a:r>
-              <a:rPr lang="pt-BR" sz="2400" dirty="0">
-                <a:latin typeface="Times New Roman" panose="02020603050405020304" pitchFamily="18" charset="0"/>
-                <a:cs typeface="Times New Roman" panose="02020603050405020304" pitchFamily="18" charset="0"/>
-              </a:rPr>
-              <a:t>para:</a:t>
+              <a:t>Resolver exercícios portas lógicas:</a:t>
             </a:r>
           </a:p>
           <a:p>

</xml_diff>

<commit_message>
Microcont. ajustes 16/09/2024 2024.2
</commit_message>
<xml_diff>
--- a/01 Classes/Aula 05 - Programação Microcontroladores - Periféricos Integrados - Portas e Conversores.pptx
+++ b/01 Classes/Aula 05 - Programação Microcontroladores - Periféricos Integrados - Portas e Conversores.pptx
@@ -10040,7 +10040,7 @@
                 <a:latin typeface="Times New Roman" panose="02020603050405020304" pitchFamily="18" charset="0"/>
                 <a:cs typeface="Times New Roman" panose="02020603050405020304" pitchFamily="18" charset="0"/>
               </a:rPr>
-              <a:t> e trás capacidades muito interessantes, como a </a:t>
+              <a:t> e traz capacidades muito interessantes, como a </a:t>
             </a:r>
             <a:r>
               <a:rPr lang="pt-BR" sz="2000" b="1" dirty="0">
@@ -11971,8 +11971,33 @@
                 <a:latin typeface="Times New Roman" panose="02020603050405020304" pitchFamily="18" charset="0"/>
                 <a:cs typeface="Times New Roman" panose="02020603050405020304" pitchFamily="18" charset="0"/>
               </a:rPr>
-              <a:t>}</a:t>
-            </a:r>
+              <a:t>} // um terminal do botão </a:t>
+            </a:r>
+            <a:r>
+              <a:rPr lang="pt-BR" sz="1800">
+                <a:latin typeface="Times New Roman" panose="02020603050405020304" pitchFamily="18" charset="0"/>
+                <a:cs typeface="Times New Roman" panose="02020603050405020304" pitchFamily="18" charset="0"/>
+              </a:rPr>
+              <a:t>no +,  </a:t>
+            </a:r>
+            <a:r>
+              <a:rPr lang="pt-BR" sz="1800" dirty="0">
+                <a:latin typeface="Times New Roman" panose="02020603050405020304" pitchFamily="18" charset="0"/>
+                <a:cs typeface="Times New Roman" panose="02020603050405020304" pitchFamily="18" charset="0"/>
+              </a:rPr>
+              <a:t>outro terminal </a:t>
+            </a:r>
+            <a:r>
+              <a:rPr lang="pt-BR" sz="1800">
+                <a:latin typeface="Times New Roman" panose="02020603050405020304" pitchFamily="18" charset="0"/>
+                <a:cs typeface="Times New Roman" panose="02020603050405020304" pitchFamily="18" charset="0"/>
+              </a:rPr>
+              <a:t>no –, conectando com o resistor.</a:t>
+            </a:r>
+            <a:endParaRPr lang="pt-BR" sz="1800" dirty="0">
+              <a:latin typeface="Times New Roman" panose="02020603050405020304" pitchFamily="18" charset="0"/>
+              <a:cs typeface="Times New Roman" panose="02020603050405020304" pitchFamily="18" charset="0"/>
+            </a:endParaRPr>
           </a:p>
         </p:txBody>
       </p:sp>

</xml_diff>

<commit_message>
Microcotroladores ajustes 23/09/2024 2024.2
</commit_message>
<xml_diff>
--- a/01 Classes/Aula 05 - Programação Microcontroladores - Periféricos Integrados - Portas e Conversores.pptx
+++ b/01 Classes/Aula 05 - Programação Microcontroladores - Periféricos Integrados - Portas e Conversores.pptx
@@ -5,7 +5,7 @@
     <p:sldMasterId id="2147483648" r:id="rId1"/>
   </p:sldMasterIdLst>
   <p:notesMasterIdLst>
-    <p:notesMasterId r:id="rId33"/>
+    <p:notesMasterId r:id="rId34"/>
   </p:notesMasterIdLst>
   <p:sldIdLst>
     <p:sldId id="256" r:id="rId2"/>
@@ -37,8 +37,9 @@
     <p:sldId id="334" r:id="rId28"/>
     <p:sldId id="363" r:id="rId29"/>
     <p:sldId id="362" r:id="rId30"/>
-    <p:sldId id="337" r:id="rId31"/>
-    <p:sldId id="309" r:id="rId32"/>
+    <p:sldId id="364" r:id="rId31"/>
+    <p:sldId id="337" r:id="rId32"/>
+    <p:sldId id="309" r:id="rId33"/>
   </p:sldIdLst>
   <p:sldSz cx="9144000" cy="5143500" type="screen16x9"/>
   <p:notesSz cx="6858000" cy="9144000"/>
@@ -1961,7 +1962,7 @@
     </p:spTree>
     <p:extLst>
       <p:ext uri="{BB962C8B-B14F-4D97-AF65-F5344CB8AC3E}">
-        <p14:creationId xmlns:p14="http://schemas.microsoft.com/office/powerpoint/2010/main" val="4290351292"/>
+        <p14:creationId xmlns:p14="http://schemas.microsoft.com/office/powerpoint/2010/main" val="4049290176"/>
       </p:ext>
     </p:extLst>
   </p:cSld>
@@ -2028,6 +2029,72 @@
     <p:extLst>
       <p:ext uri="{BB962C8B-B14F-4D97-AF65-F5344CB8AC3E}">
         <p14:creationId xmlns:p14="http://schemas.microsoft.com/office/powerpoint/2010/main" val="2076218858"/>
+      </p:ext>
+    </p:extLst>
+  </p:cSld>
+  <p:clrMapOvr>
+    <a:masterClrMapping/>
+  </p:clrMapOvr>
+</p:notes>
+</file>
+
+<file path=ppt/notesSlides/notesSlide30.xml><?xml version="1.0" encoding="utf-8"?>
+<p:notes xmlns:a="http://schemas.openxmlformats.org/drawingml/2006/main" xmlns:r="http://schemas.openxmlformats.org/officeDocument/2006/relationships" xmlns:p="http://schemas.openxmlformats.org/presentationml/2006/main">
+  <p:cSld>
+    <p:spTree>
+      <p:nvGrpSpPr>
+        <p:cNvPr id="1" name=""/>
+        <p:cNvGrpSpPr/>
+        <p:nvPr/>
+      </p:nvGrpSpPr>
+      <p:grpSpPr>
+        <a:xfrm>
+          <a:off x="0" y="0"/>
+          <a:ext cx="0" cy="0"/>
+          <a:chOff x="0" y="0"/>
+          <a:chExt cx="0" cy="0"/>
+        </a:xfrm>
+      </p:grpSpPr>
+      <p:sp>
+        <p:nvSpPr>
+          <p:cNvPr id="2" name="Espaço Reservado para Imagem de Slide 1"/>
+          <p:cNvSpPr>
+            <a:spLocks noGrp="1" noRot="1" noChangeAspect="1"/>
+          </p:cNvSpPr>
+          <p:nvPr>
+            <p:ph type="sldImg"/>
+          </p:nvPr>
+        </p:nvSpPr>
+        <p:spPr>
+          <a:xfrm>
+            <a:off x="381000" y="685800"/>
+            <a:ext cx="6096000" cy="3429000"/>
+          </a:xfrm>
+        </p:spPr>
+      </p:sp>
+      <p:sp>
+        <p:nvSpPr>
+          <p:cNvPr id="3" name="Espaço Reservado para Anotações 2"/>
+          <p:cNvSpPr>
+            <a:spLocks noGrp="1"/>
+          </p:cNvSpPr>
+          <p:nvPr>
+            <p:ph type="body" idx="1"/>
+          </p:nvPr>
+        </p:nvSpPr>
+        <p:spPr/>
+        <p:txBody>
+          <a:bodyPr/>
+          <a:lstStyle/>
+          <a:p>
+            <a:endParaRPr lang="pt-BR" dirty="0"/>
+          </a:p>
+        </p:txBody>
+      </p:sp>
+    </p:spTree>
+    <p:extLst>
+      <p:ext uri="{BB962C8B-B14F-4D97-AF65-F5344CB8AC3E}">
+        <p14:creationId xmlns:p14="http://schemas.microsoft.com/office/powerpoint/2010/main" val="4290351292"/>
       </p:ext>
     </p:extLst>
   </p:cSld>
@@ -12631,6 +12698,567 @@
                   <a:srgbClr val="0070C0"/>
                 </a:solidFill>
               </a:rPr>
+              <a:t>Dinâmica</a:t>
+            </a:r>
+            <a:r>
+              <a:rPr lang="en-US" b="1" dirty="0">
+                <a:solidFill>
+                  <a:srgbClr val="0070C0"/>
+                </a:solidFill>
+              </a:rPr>
+              <a:t>/</a:t>
+            </a:r>
+            <a:r>
+              <a:rPr lang="en-US" b="1" dirty="0" err="1">
+                <a:solidFill>
+                  <a:srgbClr val="0070C0"/>
+                </a:solidFill>
+              </a:rPr>
+              <a:t>Atividades</a:t>
+            </a:r>
+            <a:r>
+              <a:rPr lang="en-US" b="1" dirty="0">
+                <a:solidFill>
+                  <a:srgbClr val="0070C0"/>
+                </a:solidFill>
+              </a:rPr>
+              <a:t> - </a:t>
+            </a:r>
+            <a:r>
+              <a:rPr lang="en-US" b="1" dirty="0" err="1">
+                <a:solidFill>
+                  <a:srgbClr val="0070C0"/>
+                </a:solidFill>
+              </a:rPr>
+              <a:t>Exercícios</a:t>
+            </a:r>
+            <a:endParaRPr lang="en-US" b="1" dirty="0">
+              <a:solidFill>
+                <a:srgbClr val="0070C0"/>
+              </a:solidFill>
+            </a:endParaRPr>
+          </a:p>
+        </p:txBody>
+      </p:sp>
+      <p:sp>
+        <p:nvSpPr>
+          <p:cNvPr id="8" name="Text Placeholder 2"/>
+          <p:cNvSpPr>
+            <a:spLocks noGrp="1"/>
+          </p:cNvSpPr>
+          <p:nvPr>
+            <p:ph type="body" sz="half" idx="1"/>
+          </p:nvPr>
+        </p:nvSpPr>
+        <p:spPr>
+          <a:xfrm>
+            <a:off x="139472" y="1075930"/>
+            <a:ext cx="8865056" cy="3996450"/>
+          </a:xfrm>
+        </p:spPr>
+        <p:txBody>
+          <a:bodyPr>
+            <a:noAutofit/>
+          </a:bodyPr>
+          <a:lstStyle/>
+          <a:p>
+            <a:pPr marL="0" indent="0" algn="just">
+              <a:buNone/>
+            </a:pPr>
+            <a:r>
+              <a:rPr lang="pt-BR" sz="1800" b="1" dirty="0">
+                <a:latin typeface="Times New Roman" panose="02020603050405020304" pitchFamily="18" charset="0"/>
+                <a:cs typeface="Times New Roman" panose="02020603050405020304" pitchFamily="18" charset="0"/>
+              </a:rPr>
+              <a:t>Componentes</a:t>
+            </a:r>
+            <a:r>
+              <a:rPr lang="pt-BR" sz="1800" dirty="0">
+                <a:latin typeface="Times New Roman" panose="02020603050405020304" pitchFamily="18" charset="0"/>
+                <a:cs typeface="Times New Roman" panose="02020603050405020304" pitchFamily="18" charset="0"/>
+              </a:rPr>
+              <a:t>: 01 Placa Arduino Uno R3; 01 Protoboard; 01 </a:t>
+            </a:r>
+            <a:r>
+              <a:rPr lang="pt-BR" sz="1800" dirty="0" err="1">
+                <a:latin typeface="Times New Roman" panose="02020603050405020304" pitchFamily="18" charset="0"/>
+                <a:cs typeface="Times New Roman" panose="02020603050405020304" pitchFamily="18" charset="0"/>
+              </a:rPr>
+              <a:t>Buzzer</a:t>
+            </a:r>
+            <a:r>
+              <a:rPr lang="pt-BR" sz="1800" dirty="0">
+                <a:latin typeface="Times New Roman" panose="02020603050405020304" pitchFamily="18" charset="0"/>
+                <a:cs typeface="Times New Roman" panose="02020603050405020304" pitchFamily="18" charset="0"/>
+              </a:rPr>
+              <a:t> (piezo). </a:t>
+            </a:r>
+            <a:r>
+              <a:rPr lang="pt-BR" sz="1800" b="1" dirty="0" err="1">
+                <a:solidFill>
+                  <a:srgbClr val="FF0000"/>
+                </a:solidFill>
+                <a:latin typeface="Times New Roman" panose="02020603050405020304" pitchFamily="18" charset="0"/>
+                <a:cs typeface="Times New Roman" panose="02020603050405020304" pitchFamily="18" charset="0"/>
+              </a:rPr>
+              <a:t>Tinkercad</a:t>
+            </a:r>
+            <a:r>
+              <a:rPr lang="pt-BR" sz="1800" dirty="0">
+                <a:latin typeface="Times New Roman" panose="02020603050405020304" pitchFamily="18" charset="0"/>
+                <a:cs typeface="Times New Roman" panose="02020603050405020304" pitchFamily="18" charset="0"/>
+              </a:rPr>
+              <a:t>	</a:t>
+            </a:r>
+          </a:p>
+          <a:p>
+            <a:pPr marL="0" indent="0" algn="just">
+              <a:buNone/>
+            </a:pPr>
+            <a:r>
+              <a:rPr lang="pt-BR" sz="1800" b="1" dirty="0" err="1">
+                <a:latin typeface="Times New Roman" panose="02020603050405020304" pitchFamily="18" charset="0"/>
+                <a:cs typeface="Times New Roman" panose="02020603050405020304" pitchFamily="18" charset="0"/>
+              </a:rPr>
+              <a:t>int</a:t>
+            </a:r>
+            <a:r>
+              <a:rPr lang="pt-BR" sz="1800" b="1" dirty="0">
+                <a:latin typeface="Times New Roman" panose="02020603050405020304" pitchFamily="18" charset="0"/>
+                <a:cs typeface="Times New Roman" panose="02020603050405020304" pitchFamily="18" charset="0"/>
+              </a:rPr>
+              <a:t> </a:t>
+            </a:r>
+            <a:r>
+              <a:rPr lang="pt-BR" sz="1800" dirty="0" err="1">
+                <a:latin typeface="Times New Roman" panose="02020603050405020304" pitchFamily="18" charset="0"/>
+                <a:cs typeface="Times New Roman" panose="02020603050405020304" pitchFamily="18" charset="0"/>
+              </a:rPr>
+              <a:t>pinoLed</a:t>
+            </a:r>
+            <a:r>
+              <a:rPr lang="pt-BR" sz="1800" dirty="0">
+                <a:latin typeface="Times New Roman" panose="02020603050405020304" pitchFamily="18" charset="0"/>
+                <a:cs typeface="Times New Roman" panose="02020603050405020304" pitchFamily="18" charset="0"/>
+              </a:rPr>
+              <a:t> = 7</a:t>
+            </a:r>
+            <a:r>
+              <a:rPr lang="pt-BR" sz="1800" b="1" dirty="0">
+                <a:latin typeface="Times New Roman" panose="02020603050405020304" pitchFamily="18" charset="0"/>
+                <a:cs typeface="Times New Roman" panose="02020603050405020304" pitchFamily="18" charset="0"/>
+              </a:rPr>
+              <a:t>; </a:t>
+            </a:r>
+            <a:r>
+              <a:rPr lang="pt-BR" sz="1800" b="1" dirty="0" err="1">
+                <a:latin typeface="Times New Roman" panose="02020603050405020304" pitchFamily="18" charset="0"/>
+                <a:cs typeface="Times New Roman" panose="02020603050405020304" pitchFamily="18" charset="0"/>
+              </a:rPr>
+              <a:t>int</a:t>
+            </a:r>
+            <a:r>
+              <a:rPr lang="pt-BR" sz="1800" b="1" dirty="0">
+                <a:latin typeface="Times New Roman" panose="02020603050405020304" pitchFamily="18" charset="0"/>
+                <a:cs typeface="Times New Roman" panose="02020603050405020304" pitchFamily="18" charset="0"/>
+              </a:rPr>
+              <a:t> </a:t>
+            </a:r>
+            <a:r>
+              <a:rPr lang="pt-BR" sz="1800" dirty="0">
+                <a:latin typeface="Times New Roman" panose="02020603050405020304" pitchFamily="18" charset="0"/>
+                <a:cs typeface="Times New Roman" panose="02020603050405020304" pitchFamily="18" charset="0"/>
+              </a:rPr>
+              <a:t>i = 0</a:t>
+            </a:r>
+            <a:r>
+              <a:rPr lang="pt-BR" sz="1800" b="1" dirty="0">
+                <a:latin typeface="Times New Roman" panose="02020603050405020304" pitchFamily="18" charset="0"/>
+                <a:cs typeface="Times New Roman" panose="02020603050405020304" pitchFamily="18" charset="0"/>
+              </a:rPr>
+              <a:t>;</a:t>
+            </a:r>
+          </a:p>
+          <a:p>
+            <a:pPr marL="0" indent="0" algn="just">
+              <a:buNone/>
+            </a:pPr>
+            <a:r>
+              <a:rPr lang="pt-BR" sz="1800" b="1" dirty="0" err="1">
+                <a:solidFill>
+                  <a:srgbClr val="FF0000"/>
+                </a:solidFill>
+                <a:latin typeface="Times New Roman" panose="02020603050405020304" pitchFamily="18" charset="0"/>
+                <a:cs typeface="Times New Roman" panose="02020603050405020304" pitchFamily="18" charset="0"/>
+              </a:rPr>
+              <a:t>void</a:t>
+            </a:r>
+            <a:r>
+              <a:rPr lang="pt-BR" sz="1800" b="1" dirty="0">
+                <a:solidFill>
+                  <a:srgbClr val="FF0000"/>
+                </a:solidFill>
+                <a:latin typeface="Times New Roman" panose="02020603050405020304" pitchFamily="18" charset="0"/>
+                <a:cs typeface="Times New Roman" panose="02020603050405020304" pitchFamily="18" charset="0"/>
+              </a:rPr>
+              <a:t> setup() </a:t>
+            </a:r>
+            <a:r>
+              <a:rPr lang="pt-BR" sz="1800" dirty="0">
+                <a:latin typeface="Times New Roman" panose="02020603050405020304" pitchFamily="18" charset="0"/>
+                <a:cs typeface="Times New Roman" panose="02020603050405020304" pitchFamily="18" charset="0"/>
+              </a:rPr>
+              <a:t>{</a:t>
+            </a:r>
+          </a:p>
+          <a:p>
+            <a:pPr marL="0" indent="0" algn="just">
+              <a:buNone/>
+            </a:pPr>
+            <a:r>
+              <a:rPr lang="pt-BR" sz="1800" b="1" dirty="0">
+                <a:latin typeface="Times New Roman" panose="02020603050405020304" pitchFamily="18" charset="0"/>
+                <a:cs typeface="Times New Roman" panose="02020603050405020304" pitchFamily="18" charset="0"/>
+              </a:rPr>
+              <a:t>	</a:t>
+            </a:r>
+            <a:r>
+              <a:rPr lang="pt-BR" sz="1800" b="1" dirty="0" err="1">
+                <a:latin typeface="Times New Roman" panose="02020603050405020304" pitchFamily="18" charset="0"/>
+                <a:cs typeface="Times New Roman" panose="02020603050405020304" pitchFamily="18" charset="0"/>
+              </a:rPr>
+              <a:t>pinMode</a:t>
+            </a:r>
+            <a:r>
+              <a:rPr lang="pt-BR" sz="1800" dirty="0">
+                <a:latin typeface="Times New Roman" panose="02020603050405020304" pitchFamily="18" charset="0"/>
+                <a:cs typeface="Times New Roman" panose="02020603050405020304" pitchFamily="18" charset="0"/>
+              </a:rPr>
+              <a:t>(</a:t>
+            </a:r>
+            <a:r>
+              <a:rPr lang="pt-BR" sz="1800" dirty="0" err="1">
+                <a:latin typeface="Times New Roman" panose="02020603050405020304" pitchFamily="18" charset="0"/>
+                <a:cs typeface="Times New Roman" panose="02020603050405020304" pitchFamily="18" charset="0"/>
+              </a:rPr>
+              <a:t>pinoLed</a:t>
+            </a:r>
+            <a:r>
+              <a:rPr lang="pt-BR" sz="1800" dirty="0">
+                <a:latin typeface="Times New Roman" panose="02020603050405020304" pitchFamily="18" charset="0"/>
+                <a:cs typeface="Times New Roman" panose="02020603050405020304" pitchFamily="18" charset="0"/>
+              </a:rPr>
+              <a:t>, </a:t>
+            </a:r>
+            <a:r>
+              <a:rPr lang="pt-BR" sz="1800" b="1" dirty="0">
+                <a:solidFill>
+                  <a:srgbClr val="FF0000"/>
+                </a:solidFill>
+                <a:latin typeface="Times New Roman" panose="02020603050405020304" pitchFamily="18" charset="0"/>
+                <a:cs typeface="Times New Roman" panose="02020603050405020304" pitchFamily="18" charset="0"/>
+              </a:rPr>
+              <a:t>OUTPUT</a:t>
+            </a:r>
+            <a:r>
+              <a:rPr lang="pt-BR" sz="1800" dirty="0">
+                <a:latin typeface="Times New Roman" panose="02020603050405020304" pitchFamily="18" charset="0"/>
+                <a:cs typeface="Times New Roman" panose="02020603050405020304" pitchFamily="18" charset="0"/>
+              </a:rPr>
+              <a:t>); } // Define o pino do LED como saída </a:t>
+            </a:r>
+          </a:p>
+          <a:p>
+            <a:pPr marL="0" indent="0" algn="just">
+              <a:buNone/>
+            </a:pPr>
+            <a:r>
+              <a:rPr lang="pt-BR" sz="1800" b="1" dirty="0" err="1">
+                <a:solidFill>
+                  <a:srgbClr val="FF0000"/>
+                </a:solidFill>
+                <a:latin typeface="Times New Roman" panose="02020603050405020304" pitchFamily="18" charset="0"/>
+                <a:cs typeface="Times New Roman" panose="02020603050405020304" pitchFamily="18" charset="0"/>
+              </a:rPr>
+              <a:t>void</a:t>
+            </a:r>
+            <a:r>
+              <a:rPr lang="pt-BR" sz="1800" b="1" dirty="0">
+                <a:solidFill>
+                  <a:srgbClr val="FF0000"/>
+                </a:solidFill>
+                <a:latin typeface="Times New Roman" panose="02020603050405020304" pitchFamily="18" charset="0"/>
+                <a:cs typeface="Times New Roman" panose="02020603050405020304" pitchFamily="18" charset="0"/>
+              </a:rPr>
+              <a:t> loop() </a:t>
+            </a:r>
+            <a:r>
+              <a:rPr lang="pt-BR" sz="1800" dirty="0">
+                <a:latin typeface="Times New Roman" panose="02020603050405020304" pitchFamily="18" charset="0"/>
+                <a:cs typeface="Times New Roman" panose="02020603050405020304" pitchFamily="18" charset="0"/>
+              </a:rPr>
+              <a:t>{</a:t>
+            </a:r>
+          </a:p>
+          <a:p>
+            <a:pPr marL="0" indent="0" algn="just">
+              <a:buNone/>
+            </a:pPr>
+            <a:r>
+              <a:rPr lang="pt-BR" sz="1800" dirty="0">
+                <a:latin typeface="Times New Roman" panose="02020603050405020304" pitchFamily="18" charset="0"/>
+                <a:cs typeface="Times New Roman" panose="02020603050405020304" pitchFamily="18" charset="0"/>
+              </a:rPr>
+              <a:t> </a:t>
+            </a:r>
+            <a:r>
+              <a:rPr lang="pt-BR" sz="1800" b="1" dirty="0">
+                <a:latin typeface="Times New Roman" panose="02020603050405020304" pitchFamily="18" charset="0"/>
+                <a:cs typeface="Times New Roman" panose="02020603050405020304" pitchFamily="18" charset="0"/>
+              </a:rPr>
+              <a:t>for</a:t>
+            </a:r>
+            <a:r>
+              <a:rPr lang="pt-BR" sz="1800" dirty="0">
+                <a:latin typeface="Times New Roman" panose="02020603050405020304" pitchFamily="18" charset="0"/>
+                <a:cs typeface="Times New Roman" panose="02020603050405020304" pitchFamily="18" charset="0"/>
+              </a:rPr>
+              <a:t> (i; i &lt; 5; i++) {</a:t>
+            </a:r>
+          </a:p>
+          <a:p>
+            <a:pPr marL="0" indent="0" algn="just">
+              <a:buNone/>
+            </a:pPr>
+            <a:r>
+              <a:rPr lang="pt-BR" sz="1800" dirty="0">
+                <a:latin typeface="Times New Roman" panose="02020603050405020304" pitchFamily="18" charset="0"/>
+                <a:cs typeface="Times New Roman" panose="02020603050405020304" pitchFamily="18" charset="0"/>
+              </a:rPr>
+              <a:t>    </a:t>
+            </a:r>
+            <a:r>
+              <a:rPr lang="pt-BR" sz="1800" b="1" dirty="0" err="1">
+                <a:latin typeface="Times New Roman" panose="02020603050405020304" pitchFamily="18" charset="0"/>
+                <a:cs typeface="Times New Roman" panose="02020603050405020304" pitchFamily="18" charset="0"/>
+              </a:rPr>
+              <a:t>tone</a:t>
+            </a:r>
+            <a:r>
+              <a:rPr lang="pt-BR" sz="1800" dirty="0">
+                <a:latin typeface="Times New Roman" panose="02020603050405020304" pitchFamily="18" charset="0"/>
+                <a:cs typeface="Times New Roman" panose="02020603050405020304" pitchFamily="18" charset="0"/>
+              </a:rPr>
+              <a:t>(</a:t>
+            </a:r>
+            <a:r>
+              <a:rPr lang="pt-BR" sz="1800" dirty="0" err="1">
+                <a:latin typeface="Times New Roman" panose="02020603050405020304" pitchFamily="18" charset="0"/>
+                <a:cs typeface="Times New Roman" panose="02020603050405020304" pitchFamily="18" charset="0"/>
+              </a:rPr>
+              <a:t>pinoLed</a:t>
+            </a:r>
+            <a:r>
+              <a:rPr lang="pt-BR" sz="1800" dirty="0">
+                <a:latin typeface="Times New Roman" panose="02020603050405020304" pitchFamily="18" charset="0"/>
+                <a:cs typeface="Times New Roman" panose="02020603050405020304" pitchFamily="18" charset="0"/>
+              </a:rPr>
+              <a:t>, 200);</a:t>
+            </a:r>
+          </a:p>
+          <a:p>
+            <a:pPr marL="0" indent="0" algn="just">
+              <a:buNone/>
+            </a:pPr>
+            <a:r>
+              <a:rPr lang="pt-BR" sz="1800" dirty="0">
+                <a:latin typeface="Times New Roman" panose="02020603050405020304" pitchFamily="18" charset="0"/>
+                <a:cs typeface="Times New Roman" panose="02020603050405020304" pitchFamily="18" charset="0"/>
+              </a:rPr>
+              <a:t>    </a:t>
+            </a:r>
+            <a:r>
+              <a:rPr lang="pt-BR" sz="1800" b="1" dirty="0">
+                <a:latin typeface="Times New Roman" panose="02020603050405020304" pitchFamily="18" charset="0"/>
+                <a:cs typeface="Times New Roman" panose="02020603050405020304" pitchFamily="18" charset="0"/>
+              </a:rPr>
+              <a:t>delay</a:t>
+            </a:r>
+            <a:r>
+              <a:rPr lang="pt-BR" sz="1800" dirty="0">
+                <a:latin typeface="Times New Roman" panose="02020603050405020304" pitchFamily="18" charset="0"/>
+                <a:cs typeface="Times New Roman" panose="02020603050405020304" pitchFamily="18" charset="0"/>
+              </a:rPr>
+              <a:t>(500);</a:t>
+            </a:r>
+          </a:p>
+          <a:p>
+            <a:pPr marL="0" indent="0" algn="just">
+              <a:buNone/>
+            </a:pPr>
+            <a:r>
+              <a:rPr lang="pt-BR" sz="1800" dirty="0">
+                <a:latin typeface="Times New Roman" panose="02020603050405020304" pitchFamily="18" charset="0"/>
+                <a:cs typeface="Times New Roman" panose="02020603050405020304" pitchFamily="18" charset="0"/>
+              </a:rPr>
+              <a:t>    </a:t>
+            </a:r>
+            <a:r>
+              <a:rPr lang="pt-BR" sz="1800" b="1" dirty="0" err="1">
+                <a:latin typeface="Times New Roman" panose="02020603050405020304" pitchFamily="18" charset="0"/>
+                <a:cs typeface="Times New Roman" panose="02020603050405020304" pitchFamily="18" charset="0"/>
+              </a:rPr>
+              <a:t>noTone</a:t>
+            </a:r>
+            <a:r>
+              <a:rPr lang="pt-BR" sz="1800" dirty="0">
+                <a:latin typeface="Times New Roman" panose="02020603050405020304" pitchFamily="18" charset="0"/>
+                <a:cs typeface="Times New Roman" panose="02020603050405020304" pitchFamily="18" charset="0"/>
+              </a:rPr>
+              <a:t>(</a:t>
+            </a:r>
+            <a:r>
+              <a:rPr lang="pt-BR" sz="1800" dirty="0" err="1">
+                <a:latin typeface="Times New Roman" panose="02020603050405020304" pitchFamily="18" charset="0"/>
+                <a:cs typeface="Times New Roman" panose="02020603050405020304" pitchFamily="18" charset="0"/>
+              </a:rPr>
+              <a:t>pinoLed</a:t>
+            </a:r>
+            <a:r>
+              <a:rPr lang="pt-BR" sz="1800" dirty="0">
+                <a:latin typeface="Times New Roman" panose="02020603050405020304" pitchFamily="18" charset="0"/>
+                <a:cs typeface="Times New Roman" panose="02020603050405020304" pitchFamily="18" charset="0"/>
+              </a:rPr>
+              <a:t>);</a:t>
+            </a:r>
+          </a:p>
+          <a:p>
+            <a:pPr marL="0" indent="0" algn="just">
+              <a:buNone/>
+            </a:pPr>
+            <a:r>
+              <a:rPr lang="pt-BR" sz="1800" dirty="0">
+                <a:latin typeface="Times New Roman" panose="02020603050405020304" pitchFamily="18" charset="0"/>
+                <a:cs typeface="Times New Roman" panose="02020603050405020304" pitchFamily="18" charset="0"/>
+              </a:rPr>
+              <a:t>    </a:t>
+            </a:r>
+            <a:r>
+              <a:rPr lang="pt-BR" sz="1800" b="1" dirty="0">
+                <a:latin typeface="Times New Roman" panose="02020603050405020304" pitchFamily="18" charset="0"/>
+                <a:cs typeface="Times New Roman" panose="02020603050405020304" pitchFamily="18" charset="0"/>
+              </a:rPr>
+              <a:t>delay</a:t>
+            </a:r>
+            <a:r>
+              <a:rPr lang="pt-BR" sz="1800" dirty="0">
+                <a:latin typeface="Times New Roman" panose="02020603050405020304" pitchFamily="18" charset="0"/>
+                <a:cs typeface="Times New Roman" panose="02020603050405020304" pitchFamily="18" charset="0"/>
+              </a:rPr>
+              <a:t>(500);</a:t>
+            </a:r>
+          </a:p>
+          <a:p>
+            <a:pPr marL="0" indent="0" algn="just">
+              <a:buNone/>
+            </a:pPr>
+            <a:r>
+              <a:rPr lang="pt-BR" sz="1800" dirty="0">
+                <a:latin typeface="Times New Roman" panose="02020603050405020304" pitchFamily="18" charset="0"/>
+                <a:cs typeface="Times New Roman" panose="02020603050405020304" pitchFamily="18" charset="0"/>
+              </a:rPr>
+              <a:t>  } } // </a:t>
+            </a:r>
+            <a:r>
+              <a:rPr lang="pt-BR" sz="1800" b="1" dirty="0">
+                <a:latin typeface="Times New Roman" panose="02020603050405020304" pitchFamily="18" charset="0"/>
+                <a:cs typeface="Times New Roman" panose="02020603050405020304" pitchFamily="18" charset="0"/>
+              </a:rPr>
+              <a:t>Nota</a:t>
+            </a:r>
+            <a:r>
+              <a:rPr lang="pt-BR" sz="1800" dirty="0">
+                <a:latin typeface="Times New Roman" panose="02020603050405020304" pitchFamily="18" charset="0"/>
+                <a:cs typeface="Times New Roman" panose="02020603050405020304" pitchFamily="18" charset="0"/>
+              </a:rPr>
+              <a:t>: apresentar </a:t>
+            </a:r>
+            <a:r>
+              <a:rPr lang="pt-BR" sz="1800">
+                <a:latin typeface="Times New Roman" panose="02020603050405020304" pitchFamily="18" charset="0"/>
+                <a:cs typeface="Times New Roman" panose="02020603050405020304" pitchFamily="18" charset="0"/>
+              </a:rPr>
+              <a:t>o uso de </a:t>
+            </a:r>
+            <a:r>
+              <a:rPr lang="pt-BR" sz="1800" dirty="0">
+                <a:latin typeface="Times New Roman" panose="02020603050405020304" pitchFamily="18" charset="0"/>
+                <a:cs typeface="Times New Roman" panose="02020603050405020304" pitchFamily="18" charset="0"/>
+              </a:rPr>
+              <a:t>multímetro</a:t>
+            </a:r>
+          </a:p>
+        </p:txBody>
+      </p:sp>
+    </p:spTree>
+    <p:extLst>
+      <p:ext uri="{BB962C8B-B14F-4D97-AF65-F5344CB8AC3E}">
+        <p14:creationId xmlns:p14="http://schemas.microsoft.com/office/powerpoint/2010/main" val="3300492866"/>
+      </p:ext>
+    </p:extLst>
+  </p:cSld>
+  <p:clrMapOvr>
+    <a:masterClrMapping/>
+  </p:clrMapOvr>
+  <p:transition spd="med"/>
+</p:sld>
+</file>
+
+<file path=ppt/slides/slide31.xml><?xml version="1.0" encoding="utf-8"?>
+<p:sld xmlns:a="http://schemas.openxmlformats.org/drawingml/2006/main" xmlns:r="http://schemas.openxmlformats.org/officeDocument/2006/relationships" xmlns:p="http://schemas.openxmlformats.org/presentationml/2006/main">
+  <p:cSld>
+    <p:spTree>
+      <p:nvGrpSpPr>
+        <p:cNvPr id="1" name=""/>
+        <p:cNvGrpSpPr/>
+        <p:nvPr/>
+      </p:nvGrpSpPr>
+      <p:grpSpPr>
+        <a:xfrm>
+          <a:off x="0" y="0"/>
+          <a:ext cx="0" cy="0"/>
+          <a:chOff x="0" y="0"/>
+          <a:chExt cx="0" cy="0"/>
+        </a:xfrm>
+      </p:grpSpPr>
+      <p:sp>
+        <p:nvSpPr>
+          <p:cNvPr id="6" name="Title 1"/>
+          <p:cNvSpPr>
+            <a:spLocks noGrp="1"/>
+          </p:cNvSpPr>
+          <p:nvPr>
+            <p:ph type="title"/>
+          </p:nvPr>
+        </p:nvSpPr>
+        <p:spPr>
+          <a:xfrm>
+            <a:off x="457200" y="205980"/>
+            <a:ext cx="8229600" cy="857251"/>
+          </a:xfrm>
+        </p:spPr>
+        <p:txBody>
+          <a:bodyPr>
+            <a:normAutofit/>
+          </a:bodyPr>
+          <a:lstStyle/>
+          <a:p>
+            <a:r>
+              <a:rPr lang="en-US" b="1" dirty="0" err="1">
+                <a:solidFill>
+                  <a:srgbClr val="0070C0"/>
+                </a:solidFill>
+              </a:rPr>
               <a:t>Referências</a:t>
             </a:r>
             <a:r>
@@ -12902,7 +13530,7 @@
 </p:sld>
 </file>
 
-<file path=ppt/slides/slide31.xml><?xml version="1.0" encoding="utf-8"?>
+<file path=ppt/slides/slide32.xml><?xml version="1.0" encoding="utf-8"?>
 <p:sld xmlns:a="http://schemas.openxmlformats.org/drawingml/2006/main" xmlns:r="http://schemas.openxmlformats.org/officeDocument/2006/relationships" xmlns:p="http://schemas.openxmlformats.org/presentationml/2006/main">
   <p:cSld>
     <p:spTree>

</xml_diff>

<commit_message>
Disciplina MicroCont ... 15Abr2025
</commit_message>
<xml_diff>
--- a/01 Classes/Aula 05 - Programação Microcontroladores - Periféricos Integrados - Portas e Conversores.pptx
+++ b/01 Classes/Aula 05 - Programação Microcontroladores - Periféricos Integrados - Portas e Conversores.pptx
@@ -11057,7 +11057,7 @@
         </p:nvSpPr>
         <p:spPr>
           <a:xfrm>
-            <a:off x="139472" y="1063230"/>
+            <a:off x="139472" y="971326"/>
             <a:ext cx="8865056" cy="3996450"/>
           </a:xfrm>
         </p:spPr>
@@ -12038,33 +12038,8 @@
                 <a:latin typeface="Times New Roman" panose="02020603050405020304" pitchFamily="18" charset="0"/>
                 <a:cs typeface="Times New Roman" panose="02020603050405020304" pitchFamily="18" charset="0"/>
               </a:rPr>
-              <a:t>} // um terminal do botão </a:t>
-            </a:r>
-            <a:r>
-              <a:rPr lang="pt-BR" sz="1800">
-                <a:latin typeface="Times New Roman" panose="02020603050405020304" pitchFamily="18" charset="0"/>
-                <a:cs typeface="Times New Roman" panose="02020603050405020304" pitchFamily="18" charset="0"/>
-              </a:rPr>
-              <a:t>no +,  </a:t>
-            </a:r>
-            <a:r>
-              <a:rPr lang="pt-BR" sz="1800" dirty="0">
-                <a:latin typeface="Times New Roman" panose="02020603050405020304" pitchFamily="18" charset="0"/>
-                <a:cs typeface="Times New Roman" panose="02020603050405020304" pitchFamily="18" charset="0"/>
-              </a:rPr>
-              <a:t>outro terminal </a:t>
-            </a:r>
-            <a:r>
-              <a:rPr lang="pt-BR" sz="1800">
-                <a:latin typeface="Times New Roman" panose="02020603050405020304" pitchFamily="18" charset="0"/>
-                <a:cs typeface="Times New Roman" panose="02020603050405020304" pitchFamily="18" charset="0"/>
-              </a:rPr>
-              <a:t>no –, conectando com o resistor.</a:t>
-            </a:r>
-            <a:endParaRPr lang="pt-BR" sz="1800" dirty="0">
-              <a:latin typeface="Times New Roman" panose="02020603050405020304" pitchFamily="18" charset="0"/>
-              <a:cs typeface="Times New Roman" panose="02020603050405020304" pitchFamily="18" charset="0"/>
-            </a:endParaRPr>
+              <a:t>} // um terminal do botão no +,  outro terminal no –, conectando com o resistor.</a:t>
+            </a:r>
           </a:p>
         </p:txBody>
       </p:sp>
@@ -12834,7 +12809,7 @@
                 <a:latin typeface="Times New Roman" panose="02020603050405020304" pitchFamily="18" charset="0"/>
                 <a:cs typeface="Times New Roman" panose="02020603050405020304" pitchFamily="18" charset="0"/>
               </a:rPr>
-              <a:t>pinoLed</a:t>
+              <a:t>pinoPiezo</a:t>
             </a:r>
             <a:r>
               <a:rPr lang="pt-BR" sz="1800" dirty="0">
@@ -12941,7 +12916,7 @@
                 <a:latin typeface="Times New Roman" panose="02020603050405020304" pitchFamily="18" charset="0"/>
                 <a:cs typeface="Times New Roman" panose="02020603050405020304" pitchFamily="18" charset="0"/>
               </a:rPr>
-              <a:t>pinoLed</a:t>
+              <a:t>pinoPiezo</a:t>
             </a:r>
             <a:r>
               <a:rPr lang="pt-BR" sz="1800" dirty="0">
@@ -13056,7 +13031,7 @@
                 <a:latin typeface="Times New Roman" panose="02020603050405020304" pitchFamily="18" charset="0"/>
                 <a:cs typeface="Times New Roman" panose="02020603050405020304" pitchFamily="18" charset="0"/>
               </a:rPr>
-              <a:t>pinoLed</a:t>
+              <a:t>pinoPiezo</a:t>
             </a:r>
             <a:r>
               <a:rPr lang="pt-BR" sz="1800" dirty="0">
@@ -13122,7 +13097,7 @@
                 <a:latin typeface="Times New Roman" panose="02020603050405020304" pitchFamily="18" charset="0"/>
                 <a:cs typeface="Times New Roman" panose="02020603050405020304" pitchFamily="18" charset="0"/>
               </a:rPr>
-              <a:t>pinoLed</a:t>
+              <a:t>pinoPiezo</a:t>
             </a:r>
             <a:r>
               <a:rPr lang="pt-BR" sz="1800" dirty="0">
@@ -13181,21 +13156,7 @@
                 <a:latin typeface="Times New Roman" panose="02020603050405020304" pitchFamily="18" charset="0"/>
                 <a:cs typeface="Times New Roman" panose="02020603050405020304" pitchFamily="18" charset="0"/>
               </a:rPr>
-              <a:t>: apresentar </a:t>
-            </a:r>
-            <a:r>
-              <a:rPr lang="pt-BR" sz="1800">
-                <a:latin typeface="Times New Roman" panose="02020603050405020304" pitchFamily="18" charset="0"/>
-                <a:cs typeface="Times New Roman" panose="02020603050405020304" pitchFamily="18" charset="0"/>
-              </a:rPr>
-              <a:t>o uso de </a:t>
-            </a:r>
-            <a:r>
-              <a:rPr lang="pt-BR" sz="1800" dirty="0">
-                <a:latin typeface="Times New Roman" panose="02020603050405020304" pitchFamily="18" charset="0"/>
-                <a:cs typeface="Times New Roman" panose="02020603050405020304" pitchFamily="18" charset="0"/>
-              </a:rPr>
-              <a:t>multímetro</a:t>
+              <a:t>: apresentar o uso de multímetro</a:t>
             </a:r>
           </a:p>
         </p:txBody>

</xml_diff>